<commit_message>
Uploading Andrews and Alsea Science assets
</commit_message>
<xml_diff>
--- a/assets/hja_slides_fg.pptx
+++ b/assets/hja_slides_fg.pptx
@@ -6,8 +6,8 @@
   </p:sldMasterIdLst>
   <p:sldIdLst>
     <p:sldId id="257" r:id="rId2"/>
-    <p:sldId id="263" r:id="rId3"/>
-    <p:sldId id="262" r:id="rId4"/>
+    <p:sldId id="264" r:id="rId3"/>
+    <p:sldId id="265" r:id="rId4"/>
   </p:sldIdLst>
   <p:sldSz cx="12192000" cy="9144000"/>
   <p:notesSz cx="6858000" cy="9144000"/>
@@ -106,6 +106,11 @@
       </a:defRPr>
     </a:lvl9pPr>
   </p:defaultTextStyle>
+  <p:extLst>
+    <p:ext uri="{EFAFB233-063F-42B5-8137-9DF3F51BA10A}">
+      <p15:sldGuideLst xmlns:p15="http://schemas.microsoft.com/office/powerpoint/2012/main"/>
+    </p:ext>
+  </p:extLst>
 </p:presentation>
 </file>
 
@@ -240,7 +245,7 @@
           <a:p>
             <a:fld id="{F73E1B03-40AD-4841-BCA7-1CEAAD8F204E}" type="datetimeFigureOut">
               <a:rPr lang="en-US" smtClean="0"/>
-              <a:t>8/27/2022</a:t>
+              <a:t>8/28/2022</a:t>
             </a:fld>
             <a:endParaRPr lang="en-US"/>
           </a:p>
@@ -410,7 +415,7 @@
           <a:p>
             <a:fld id="{F73E1B03-40AD-4841-BCA7-1CEAAD8F204E}" type="datetimeFigureOut">
               <a:rPr lang="en-US" smtClean="0"/>
-              <a:t>8/27/2022</a:t>
+              <a:t>8/28/2022</a:t>
             </a:fld>
             <a:endParaRPr lang="en-US"/>
           </a:p>
@@ -590,7 +595,7 @@
           <a:p>
             <a:fld id="{F73E1B03-40AD-4841-BCA7-1CEAAD8F204E}" type="datetimeFigureOut">
               <a:rPr lang="en-US" smtClean="0"/>
-              <a:t>8/27/2022</a:t>
+              <a:t>8/28/2022</a:t>
             </a:fld>
             <a:endParaRPr lang="en-US"/>
           </a:p>
@@ -760,7 +765,7 @@
           <a:p>
             <a:fld id="{F73E1B03-40AD-4841-BCA7-1CEAAD8F204E}" type="datetimeFigureOut">
               <a:rPr lang="en-US" smtClean="0"/>
-              <a:t>8/27/2022</a:t>
+              <a:t>8/28/2022</a:t>
             </a:fld>
             <a:endParaRPr lang="en-US"/>
           </a:p>
@@ -1004,7 +1009,7 @@
           <a:p>
             <a:fld id="{F73E1B03-40AD-4841-BCA7-1CEAAD8F204E}" type="datetimeFigureOut">
               <a:rPr lang="en-US" smtClean="0"/>
-              <a:t>8/27/2022</a:t>
+              <a:t>8/28/2022</a:t>
             </a:fld>
             <a:endParaRPr lang="en-US"/>
           </a:p>
@@ -1236,7 +1241,7 @@
           <a:p>
             <a:fld id="{F73E1B03-40AD-4841-BCA7-1CEAAD8F204E}" type="datetimeFigureOut">
               <a:rPr lang="en-US" smtClean="0"/>
-              <a:t>8/27/2022</a:t>
+              <a:t>8/28/2022</a:t>
             </a:fld>
             <a:endParaRPr lang="en-US"/>
           </a:p>
@@ -1603,7 +1608,7 @@
           <a:p>
             <a:fld id="{F73E1B03-40AD-4841-BCA7-1CEAAD8F204E}" type="datetimeFigureOut">
               <a:rPr lang="en-US" smtClean="0"/>
-              <a:t>8/27/2022</a:t>
+              <a:t>8/28/2022</a:t>
             </a:fld>
             <a:endParaRPr lang="en-US"/>
           </a:p>
@@ -1721,7 +1726,7 @@
           <a:p>
             <a:fld id="{F73E1B03-40AD-4841-BCA7-1CEAAD8F204E}" type="datetimeFigureOut">
               <a:rPr lang="en-US" smtClean="0"/>
-              <a:t>8/27/2022</a:t>
+              <a:t>8/28/2022</a:t>
             </a:fld>
             <a:endParaRPr lang="en-US"/>
           </a:p>
@@ -1816,7 +1821,7 @@
           <a:p>
             <a:fld id="{F73E1B03-40AD-4841-BCA7-1CEAAD8F204E}" type="datetimeFigureOut">
               <a:rPr lang="en-US" smtClean="0"/>
-              <a:t>8/27/2022</a:t>
+              <a:t>8/28/2022</a:t>
             </a:fld>
             <a:endParaRPr lang="en-US"/>
           </a:p>
@@ -2093,7 +2098,7 @@
           <a:p>
             <a:fld id="{F73E1B03-40AD-4841-BCA7-1CEAAD8F204E}" type="datetimeFigureOut">
               <a:rPr lang="en-US" smtClean="0"/>
-              <a:t>8/27/2022</a:t>
+              <a:t>8/28/2022</a:t>
             </a:fld>
             <a:endParaRPr lang="en-US"/>
           </a:p>
@@ -2350,7 +2355,7 @@
           <a:p>
             <a:fld id="{F73E1B03-40AD-4841-BCA7-1CEAAD8F204E}" type="datetimeFigureOut">
               <a:rPr lang="en-US" smtClean="0"/>
-              <a:t>8/27/2022</a:t>
+              <a:t>8/28/2022</a:t>
             </a:fld>
             <a:endParaRPr lang="en-US"/>
           </a:p>
@@ -2563,7 +2568,7 @@
           <a:p>
             <a:fld id="{F73E1B03-40AD-4841-BCA7-1CEAAD8F204E}" type="datetimeFigureOut">
               <a:rPr lang="en-US" smtClean="0"/>
-              <a:t>8/27/2022</a:t>
+              <a:t>8/28/2022</a:t>
             </a:fld>
             <a:endParaRPr lang="en-US"/>
           </a:p>
@@ -5592,6 +5597,192 @@
       </p:grpSpPr>
       <p:sp>
         <p:nvSpPr>
+          <p:cNvPr id="119" name="Arrow: Down 118">
+            <a:extLst>
+              <a:ext uri="{FF2B5EF4-FFF2-40B4-BE49-F238E27FC236}">
+                <a16:creationId xmlns:a16="http://schemas.microsoft.com/office/drawing/2014/main" id="{E6A9F16D-2336-63FC-476A-88938B6A5E8C}"/>
+              </a:ext>
+            </a:extLst>
+          </p:cNvPr>
+          <p:cNvSpPr/>
+          <p:nvPr/>
+        </p:nvSpPr>
+        <p:spPr>
+          <a:xfrm>
+            <a:off x="9323056" y="1718343"/>
+            <a:ext cx="727364" cy="6543199"/>
+          </a:xfrm>
+          <a:prstGeom prst="downArrow">
+            <a:avLst/>
+          </a:prstGeom>
+          <a:solidFill>
+            <a:schemeClr val="accent5">
+              <a:lumMod val="20000"/>
+              <a:lumOff val="80000"/>
+            </a:schemeClr>
+          </a:solidFill>
+          <a:ln>
+            <a:noFill/>
+          </a:ln>
+          <a:effectLst>
+            <a:outerShdw blurRad="50800" dist="38100" dir="2700000" algn="tl" rotWithShape="0">
+              <a:prstClr val="black">
+                <a:alpha val="40000"/>
+              </a:prstClr>
+            </a:outerShdw>
+          </a:effectLst>
+        </p:spPr>
+        <p:style>
+          <a:lnRef idx="2">
+            <a:schemeClr val="accent1">
+              <a:shade val="50000"/>
+            </a:schemeClr>
+          </a:lnRef>
+          <a:fillRef idx="1">
+            <a:schemeClr val="accent1"/>
+          </a:fillRef>
+          <a:effectRef idx="0">
+            <a:schemeClr val="accent1"/>
+          </a:effectRef>
+          <a:fontRef idx="minor">
+            <a:schemeClr val="lt1"/>
+          </a:fontRef>
+        </p:style>
+        <p:txBody>
+          <a:bodyPr rtlCol="0" anchor="ctr"/>
+          <a:lstStyle/>
+          <a:p>
+            <a:pPr algn="ctr"/>
+            <a:endParaRPr lang="en-US"/>
+          </a:p>
+        </p:txBody>
+      </p:sp>
+      <p:sp>
+        <p:nvSpPr>
+          <p:cNvPr id="92" name="Arrow: Down 91">
+            <a:extLst>
+              <a:ext uri="{FF2B5EF4-FFF2-40B4-BE49-F238E27FC236}">
+                <a16:creationId xmlns:a16="http://schemas.microsoft.com/office/drawing/2014/main" id="{D8D5C9CD-4115-4493-F2C9-EBDC5DE50EAA}"/>
+              </a:ext>
+            </a:extLst>
+          </p:cNvPr>
+          <p:cNvSpPr/>
+          <p:nvPr/>
+        </p:nvSpPr>
+        <p:spPr>
+          <a:xfrm>
+            <a:off x="5663170" y="1345080"/>
+            <a:ext cx="727364" cy="6543199"/>
+          </a:xfrm>
+          <a:prstGeom prst="downArrow">
+            <a:avLst/>
+          </a:prstGeom>
+          <a:solidFill>
+            <a:schemeClr val="accent5">
+              <a:lumMod val="20000"/>
+              <a:lumOff val="80000"/>
+            </a:schemeClr>
+          </a:solidFill>
+          <a:ln>
+            <a:noFill/>
+          </a:ln>
+          <a:effectLst>
+            <a:outerShdw blurRad="50800" dist="38100" dir="2700000" algn="tl" rotWithShape="0">
+              <a:prstClr val="black">
+                <a:alpha val="40000"/>
+              </a:prstClr>
+            </a:outerShdw>
+          </a:effectLst>
+        </p:spPr>
+        <p:style>
+          <a:lnRef idx="2">
+            <a:schemeClr val="accent1">
+              <a:shade val="50000"/>
+            </a:schemeClr>
+          </a:lnRef>
+          <a:fillRef idx="1">
+            <a:schemeClr val="accent1"/>
+          </a:fillRef>
+          <a:effectRef idx="0">
+            <a:schemeClr val="accent1"/>
+          </a:effectRef>
+          <a:fontRef idx="minor">
+            <a:schemeClr val="lt1"/>
+          </a:fontRef>
+        </p:style>
+        <p:txBody>
+          <a:bodyPr rtlCol="0" anchor="ctr"/>
+          <a:lstStyle/>
+          <a:p>
+            <a:pPr algn="ctr"/>
+            <a:endParaRPr lang="en-US"/>
+          </a:p>
+        </p:txBody>
+      </p:sp>
+      <p:sp>
+        <p:nvSpPr>
+          <p:cNvPr id="2" name="Arrow: Down 1">
+            <a:extLst>
+              <a:ext uri="{FF2B5EF4-FFF2-40B4-BE49-F238E27FC236}">
+                <a16:creationId xmlns:a16="http://schemas.microsoft.com/office/drawing/2014/main" id="{118D8B49-2ECF-D714-A02C-7F5620FA4F0A}"/>
+              </a:ext>
+            </a:extLst>
+          </p:cNvPr>
+          <p:cNvSpPr/>
+          <p:nvPr/>
+        </p:nvSpPr>
+        <p:spPr>
+          <a:xfrm>
+            <a:off x="1559887" y="1318444"/>
+            <a:ext cx="727364" cy="5075684"/>
+          </a:xfrm>
+          <a:prstGeom prst="downArrow">
+            <a:avLst/>
+          </a:prstGeom>
+          <a:solidFill>
+            <a:schemeClr val="accent5">
+              <a:lumMod val="20000"/>
+              <a:lumOff val="80000"/>
+            </a:schemeClr>
+          </a:solidFill>
+          <a:ln>
+            <a:noFill/>
+          </a:ln>
+          <a:effectLst>
+            <a:outerShdw blurRad="50800" dist="38100" dir="2700000" algn="tl" rotWithShape="0">
+              <a:prstClr val="black">
+                <a:alpha val="40000"/>
+              </a:prstClr>
+            </a:outerShdw>
+          </a:effectLst>
+        </p:spPr>
+        <p:style>
+          <a:lnRef idx="2">
+            <a:schemeClr val="accent1">
+              <a:shade val="50000"/>
+            </a:schemeClr>
+          </a:lnRef>
+          <a:fillRef idx="1">
+            <a:schemeClr val="accent1"/>
+          </a:fillRef>
+          <a:effectRef idx="0">
+            <a:schemeClr val="accent1"/>
+          </a:effectRef>
+          <a:fontRef idx="minor">
+            <a:schemeClr val="lt1"/>
+          </a:fontRef>
+        </p:style>
+        <p:txBody>
+          <a:bodyPr rtlCol="0" anchor="ctr"/>
+          <a:lstStyle/>
+          <a:p>
+            <a:pPr algn="ctr"/>
+            <a:endParaRPr lang="en-US"/>
+          </a:p>
+        </p:txBody>
+      </p:sp>
+      <p:sp>
+        <p:nvSpPr>
           <p:cNvPr id="4" name="Trapezoid 3">
             <a:extLst>
               <a:ext uri="{FF2B5EF4-FFF2-40B4-BE49-F238E27FC236}">
@@ -5604,7 +5795,7 @@
         </p:nvSpPr>
         <p:spPr>
           <a:xfrm rot="10800000">
-            <a:off x="4894521" y="1314054"/>
+            <a:off x="736479" y="3839543"/>
             <a:ext cx="2604977" cy="1137684"/>
           </a:xfrm>
           <a:prstGeom prst="trapezoid">
@@ -5682,7 +5873,7 @@
         </p:nvSpPr>
         <p:spPr>
           <a:xfrm>
-            <a:off x="340241" y="1314054"/>
+            <a:off x="736481" y="1451214"/>
             <a:ext cx="2604977" cy="1137684"/>
           </a:xfrm>
           <a:prstGeom prst="trapezoid">
@@ -5728,13 +5919,17 @@
         </p:nvSpPr>
         <p:spPr>
           <a:xfrm>
-            <a:off x="2922869" y="1528953"/>
-            <a:ext cx="2158849" cy="707886"/>
+            <a:off x="736481" y="2798722"/>
+            <a:ext cx="2604977" cy="830997"/>
           </a:xfrm>
           <a:prstGeom prst="rect">
             <a:avLst/>
           </a:prstGeom>
-          <a:noFill/>
+          <a:solidFill>
+            <a:schemeClr val="bg1">
+              <a:lumMod val="95000"/>
+            </a:schemeClr>
+          </a:solidFill>
         </p:spPr>
         <p:txBody>
           <a:bodyPr wrap="square" rtlCol="0">
@@ -5757,25 +5952,25 @@
           </a:lstStyle>
           <a:p>
             <a:r>
-              <a:rPr lang="en-US" sz="1000" b="1" dirty="0"/>
+              <a:rPr lang="en-US" b="1" dirty="0"/>
               <a:t>Shape Format</a:t>
             </a:r>
           </a:p>
           <a:p>
             <a:r>
-              <a:rPr lang="en-US" sz="1000" dirty="0"/>
+              <a:rPr lang="en-US" dirty="0"/>
               <a:t>	Rotate -&gt; Flip Vertical</a:t>
             </a:r>
           </a:p>
           <a:p>
             <a:r>
-              <a:rPr lang="en-US" sz="1000" dirty="0"/>
+              <a:rPr lang="en-US" dirty="0"/>
               <a:t>	Shape Outline -&gt; No Outline</a:t>
             </a:r>
           </a:p>
           <a:p>
             <a:r>
-              <a:rPr lang="en-US" sz="1000" dirty="0"/>
+              <a:rPr lang="en-US" dirty="0"/>
               <a:t>	Shape Fill -&gt; Gradient</a:t>
             </a:r>
           </a:p>
@@ -5795,7 +5990,7 @@
         </p:nvSpPr>
         <p:spPr>
           <a:xfrm rot="10800000">
-            <a:off x="9369099" y="1314052"/>
+            <a:off x="624707" y="6394128"/>
             <a:ext cx="2743199" cy="1137685"/>
           </a:xfrm>
           <a:prstGeom prst="trapezoid">
@@ -5876,13 +6071,17 @@
         </p:nvSpPr>
         <p:spPr>
           <a:xfrm>
-            <a:off x="7423985" y="1528952"/>
-            <a:ext cx="2158849" cy="400110"/>
+            <a:off x="782764" y="5434263"/>
+            <a:ext cx="2512405" cy="461665"/>
           </a:xfrm>
           <a:prstGeom prst="rect">
             <a:avLst/>
           </a:prstGeom>
-          <a:noFill/>
+          <a:solidFill>
+            <a:schemeClr val="bg1">
+              <a:lumMod val="95000"/>
+            </a:schemeClr>
+          </a:solidFill>
         </p:spPr>
         <p:txBody>
           <a:bodyPr wrap="square" rtlCol="0">
@@ -5905,13 +6104,13 @@
           </a:lstStyle>
           <a:p>
             <a:r>
-              <a:rPr lang="en-US" sz="1000" b="1" dirty="0"/>
+              <a:rPr lang="en-US" b="1" dirty="0"/>
               <a:t>Shape Format</a:t>
             </a:r>
           </a:p>
           <a:p>
             <a:r>
-              <a:rPr lang="en-US" sz="1000" dirty="0"/>
+              <a:rPr lang="en-US" dirty="0"/>
               <a:t>	Shape Effects -&gt; Soft Edges</a:t>
             </a:r>
           </a:p>
@@ -5919,10 +6118,64 @@
       </p:sp>
       <p:sp>
         <p:nvSpPr>
-          <p:cNvPr id="9" name="Isosceles Triangle 8">
+          <p:cNvPr id="45" name="TextBox 44">
             <a:extLst>
               <a:ext uri="{FF2B5EF4-FFF2-40B4-BE49-F238E27FC236}">
-                <a16:creationId xmlns:a16="http://schemas.microsoft.com/office/drawing/2014/main" id="{79A87D25-8D3B-9B53-B8A6-1985EC4C6D4E}"/>
+                <a16:creationId xmlns:a16="http://schemas.microsoft.com/office/drawing/2014/main" id="{AC11127A-D588-B3EB-CEF0-6184262B301B}"/>
+              </a:ext>
+            </a:extLst>
+          </p:cNvPr>
+          <p:cNvSpPr txBox="1"/>
+          <p:nvPr/>
+        </p:nvSpPr>
+        <p:spPr>
+          <a:xfrm>
+            <a:off x="959544" y="989490"/>
+            <a:ext cx="2158849" cy="276999"/>
+          </a:xfrm>
+          <a:prstGeom prst="rect">
+            <a:avLst/>
+          </a:prstGeom>
+          <a:solidFill>
+            <a:schemeClr val="bg1">
+              <a:lumMod val="95000"/>
+            </a:schemeClr>
+          </a:solidFill>
+        </p:spPr>
+        <p:txBody>
+          <a:bodyPr wrap="square" rtlCol="0">
+            <a:spAutoFit/>
+          </a:bodyPr>
+          <a:lstStyle>
+            <a:defPPr>
+              <a:defRPr lang="en-US"/>
+            </a:defPPr>
+            <a:lvl1pPr>
+              <a:defRPr sz="1200">
+                <a:solidFill>
+                  <a:schemeClr val="tx1">
+                    <a:lumMod val="65000"/>
+                    <a:lumOff val="35000"/>
+                  </a:schemeClr>
+                </a:solidFill>
+              </a:defRPr>
+            </a:lvl1pPr>
+          </a:lstStyle>
+          <a:p>
+            <a:r>
+              <a:rPr lang="en-US" b="1" dirty="0"/>
+              <a:t>Insert -&gt; Shapes</a:t>
+            </a:r>
+            <a:endParaRPr lang="en-US" dirty="0"/>
+          </a:p>
+        </p:txBody>
+      </p:sp>
+      <p:sp>
+        <p:nvSpPr>
+          <p:cNvPr id="3" name="Isosceles Triangle 2">
+            <a:extLst>
+              <a:ext uri="{FF2B5EF4-FFF2-40B4-BE49-F238E27FC236}">
+                <a16:creationId xmlns:a16="http://schemas.microsoft.com/office/drawing/2014/main" id="{B7CF4716-1CDF-4220-C91E-495D01707644}"/>
               </a:ext>
             </a:extLst>
           </p:cNvPr>
@@ -5931,7 +6184,7 @@
         </p:nvSpPr>
         <p:spPr>
           <a:xfrm rot="19790613">
-            <a:off x="5276976" y="3306688"/>
+            <a:off x="5386293" y="3755185"/>
             <a:ext cx="625196" cy="576324"/>
           </a:xfrm>
           <a:prstGeom prst="triangle">
@@ -5964,10 +6217,10 @@
       </p:sp>
       <p:sp>
         <p:nvSpPr>
-          <p:cNvPr id="10" name="Isosceles Triangle 9">
+          <p:cNvPr id="12" name="Isosceles Triangle 11">
             <a:extLst>
               <a:ext uri="{FF2B5EF4-FFF2-40B4-BE49-F238E27FC236}">
-                <a16:creationId xmlns:a16="http://schemas.microsoft.com/office/drawing/2014/main" id="{D89163AB-C629-F1FF-231C-0EF3C080A347}"/>
+                <a16:creationId xmlns:a16="http://schemas.microsoft.com/office/drawing/2014/main" id="{D4891ED4-653F-09BE-66A3-26EBB13C4B23}"/>
               </a:ext>
             </a:extLst>
           </p:cNvPr>
@@ -5976,7 +6229,7 @@
         </p:nvSpPr>
         <p:spPr>
           <a:xfrm rot="525550">
-            <a:off x="6133023" y="3380598"/>
+            <a:off x="6242340" y="3829095"/>
             <a:ext cx="588674" cy="531312"/>
           </a:xfrm>
           <a:prstGeom prst="triangle">
@@ -6009,10 +6262,10 @@
       </p:sp>
       <p:sp>
         <p:nvSpPr>
-          <p:cNvPr id="11" name="Isosceles Triangle 10">
+          <p:cNvPr id="13" name="Isosceles Triangle 12">
             <a:extLst>
               <a:ext uri="{FF2B5EF4-FFF2-40B4-BE49-F238E27FC236}">
-                <a16:creationId xmlns:a16="http://schemas.microsoft.com/office/drawing/2014/main" id="{C594D673-5075-0A34-1D45-2B225D51C083}"/>
+                <a16:creationId xmlns:a16="http://schemas.microsoft.com/office/drawing/2014/main" id="{4BFAA72A-9C36-92FB-1AE9-C8280AABEAA7}"/>
               </a:ext>
             </a:extLst>
           </p:cNvPr>
@@ -6021,7 +6274,7 @@
         </p:nvSpPr>
         <p:spPr>
           <a:xfrm rot="3778520">
-            <a:off x="5740339" y="3936418"/>
+            <a:off x="5849656" y="4384915"/>
             <a:ext cx="607018" cy="515255"/>
           </a:xfrm>
           <a:prstGeom prst="triangle">
@@ -6054,10 +6307,10 @@
       </p:sp>
       <p:grpSp>
         <p:nvGrpSpPr>
-          <p:cNvPr id="34" name="Group 33">
+          <p:cNvPr id="14" name="Group 13">
             <a:extLst>
               <a:ext uri="{FF2B5EF4-FFF2-40B4-BE49-F238E27FC236}">
-                <a16:creationId xmlns:a16="http://schemas.microsoft.com/office/drawing/2014/main" id="{40B5B5A0-E567-683D-D8E5-8662A1BBFAAF}"/>
+                <a16:creationId xmlns:a16="http://schemas.microsoft.com/office/drawing/2014/main" id="{5D9D7E66-63D4-8228-1061-A4C8998010B1}"/>
               </a:ext>
             </a:extLst>
           </p:cNvPr>
@@ -6066,7 +6319,7 @@
         </p:nvGrpSpPr>
         <p:grpSpPr>
           <a:xfrm>
-            <a:off x="11031405" y="3817023"/>
+            <a:off x="5823323" y="8065385"/>
             <a:ext cx="581239" cy="560320"/>
             <a:chOff x="2694311" y="2261902"/>
             <a:chExt cx="1066824" cy="1028270"/>
@@ -6074,10 +6327,10 @@
         </p:grpSpPr>
         <p:sp>
           <p:nvSpPr>
-            <p:cNvPr id="35" name="Isosceles Triangle 34">
+            <p:cNvPr id="15" name="Isosceles Triangle 14">
               <a:extLst>
                 <a:ext uri="{FF2B5EF4-FFF2-40B4-BE49-F238E27FC236}">
-                  <a16:creationId xmlns:a16="http://schemas.microsoft.com/office/drawing/2014/main" id="{14D9F5CF-1470-CD77-A165-E7B21A106A67}"/>
+                  <a16:creationId xmlns:a16="http://schemas.microsoft.com/office/drawing/2014/main" id="{622F5B50-1601-9EF7-00D2-C3FD38E69657}"/>
                 </a:ext>
               </a:extLst>
             </p:cNvPr>
@@ -6119,10 +6372,10 @@
         </p:sp>
         <p:sp>
           <p:nvSpPr>
-            <p:cNvPr id="36" name="Isosceles Triangle 35">
+            <p:cNvPr id="16" name="Isosceles Triangle 15">
               <a:extLst>
                 <a:ext uri="{FF2B5EF4-FFF2-40B4-BE49-F238E27FC236}">
-                  <a16:creationId xmlns:a16="http://schemas.microsoft.com/office/drawing/2014/main" id="{997917D8-359A-3387-A096-7B79CA7CDA9A}"/>
+                  <a16:creationId xmlns:a16="http://schemas.microsoft.com/office/drawing/2014/main" id="{9B2CA089-3EF3-E3EB-9AEC-AE7C1F8753D2}"/>
                 </a:ext>
               </a:extLst>
             </p:cNvPr>
@@ -6164,10 +6417,10 @@
         </p:sp>
         <p:sp>
           <p:nvSpPr>
-            <p:cNvPr id="37" name="Isosceles Triangle 36">
+            <p:cNvPr id="17" name="Isosceles Triangle 16">
               <a:extLst>
                 <a:ext uri="{FF2B5EF4-FFF2-40B4-BE49-F238E27FC236}">
-                  <a16:creationId xmlns:a16="http://schemas.microsoft.com/office/drawing/2014/main" id="{39F618F1-EBDF-E5FA-04F4-34D33D96FA39}"/>
+                  <a16:creationId xmlns:a16="http://schemas.microsoft.com/office/drawing/2014/main" id="{9A0DCCA5-527E-0825-A0E0-6C66E00BDA30}"/>
                 </a:ext>
               </a:extLst>
             </p:cNvPr>
@@ -6209,10 +6462,10 @@
         </p:sp>
         <p:sp>
           <p:nvSpPr>
-            <p:cNvPr id="38" name="Isosceles Triangle 37">
+            <p:cNvPr id="18" name="Isosceles Triangle 17">
               <a:extLst>
                 <a:ext uri="{FF2B5EF4-FFF2-40B4-BE49-F238E27FC236}">
-                  <a16:creationId xmlns:a16="http://schemas.microsoft.com/office/drawing/2014/main" id="{0466E66B-BA14-DC9C-9DDC-A5B4810FE449}"/>
+                  <a16:creationId xmlns:a16="http://schemas.microsoft.com/office/drawing/2014/main" id="{F5E01B70-7D90-E080-FB59-1F7CC9BA2709}"/>
                 </a:ext>
               </a:extLst>
             </p:cNvPr>
@@ -6254,10 +6507,10 @@
         </p:sp>
         <p:sp>
           <p:nvSpPr>
-            <p:cNvPr id="39" name="Isosceles Triangle 38">
+            <p:cNvPr id="19" name="Isosceles Triangle 18">
               <a:extLst>
                 <a:ext uri="{FF2B5EF4-FFF2-40B4-BE49-F238E27FC236}">
-                  <a16:creationId xmlns:a16="http://schemas.microsoft.com/office/drawing/2014/main" id="{D391858C-024D-21BE-5CFF-60529CDBC2DC}"/>
+                  <a16:creationId xmlns:a16="http://schemas.microsoft.com/office/drawing/2014/main" id="{2C9B4116-78FE-25F9-FCF7-FFA59E5E12C9}"/>
                 </a:ext>
               </a:extLst>
             </p:cNvPr>
@@ -6298,10 +6551,10 @@
         </p:sp>
         <p:sp>
           <p:nvSpPr>
-            <p:cNvPr id="40" name="Isosceles Triangle 39">
+            <p:cNvPr id="20" name="Isosceles Triangle 19">
               <a:extLst>
                 <a:ext uri="{FF2B5EF4-FFF2-40B4-BE49-F238E27FC236}">
-                  <a16:creationId xmlns:a16="http://schemas.microsoft.com/office/drawing/2014/main" id="{35D4CA0C-1960-196D-B57D-F5939B9A6F92}"/>
+                  <a16:creationId xmlns:a16="http://schemas.microsoft.com/office/drawing/2014/main" id="{BED2C806-8E42-0C96-6446-F16CA6DFCEF0}"/>
                 </a:ext>
               </a:extLst>
             </p:cNvPr>
@@ -6342,10 +6595,10 @@
         </p:sp>
         <p:sp>
           <p:nvSpPr>
-            <p:cNvPr id="41" name="Isosceles Triangle 40">
+            <p:cNvPr id="21" name="Isosceles Triangle 20">
               <a:extLst>
                 <a:ext uri="{FF2B5EF4-FFF2-40B4-BE49-F238E27FC236}">
-                  <a16:creationId xmlns:a16="http://schemas.microsoft.com/office/drawing/2014/main" id="{4D71E9A7-752B-C5B5-6FD3-BC90F6A7871A}"/>
+                  <a16:creationId xmlns:a16="http://schemas.microsoft.com/office/drawing/2014/main" id="{864E9D6F-4C0F-8E12-B87A-939BDD13A95F}"/>
                 </a:ext>
               </a:extLst>
             </p:cNvPr>
@@ -6386,10 +6639,10 @@
         </p:sp>
         <p:sp>
           <p:nvSpPr>
-            <p:cNvPr id="42" name="Isosceles Triangle 41">
+            <p:cNvPr id="22" name="Isosceles Triangle 21">
               <a:extLst>
                 <a:ext uri="{FF2B5EF4-FFF2-40B4-BE49-F238E27FC236}">
-                  <a16:creationId xmlns:a16="http://schemas.microsoft.com/office/drawing/2014/main" id="{4BB300A9-7E2C-4D13-B2F5-0685F7B6720C}"/>
+                  <a16:creationId xmlns:a16="http://schemas.microsoft.com/office/drawing/2014/main" id="{8D956A26-1397-5F1C-DBD7-81EF4A10B370}"/>
                 </a:ext>
               </a:extLst>
             </p:cNvPr>
@@ -6430,10 +6683,10 @@
         </p:sp>
         <p:sp>
           <p:nvSpPr>
-            <p:cNvPr id="43" name="Isosceles Triangle 42">
+            <p:cNvPr id="23" name="Isosceles Triangle 22">
               <a:extLst>
                 <a:ext uri="{FF2B5EF4-FFF2-40B4-BE49-F238E27FC236}">
-                  <a16:creationId xmlns:a16="http://schemas.microsoft.com/office/drawing/2014/main" id="{66BEFFA5-0329-15FF-1E20-1C5B52AF8738}"/>
+                  <a16:creationId xmlns:a16="http://schemas.microsoft.com/office/drawing/2014/main" id="{4007E1AC-A027-33AD-DB85-0977099DF8E7}"/>
                 </a:ext>
               </a:extLst>
             </p:cNvPr>
@@ -6474,10 +6727,10 @@
         </p:sp>
         <p:sp>
           <p:nvSpPr>
-            <p:cNvPr id="44" name="Isosceles Triangle 43">
+            <p:cNvPr id="24" name="Isosceles Triangle 23">
               <a:extLst>
                 <a:ext uri="{FF2B5EF4-FFF2-40B4-BE49-F238E27FC236}">
-                  <a16:creationId xmlns:a16="http://schemas.microsoft.com/office/drawing/2014/main" id="{7CC1DEE9-CF67-23E4-8ACD-24B7FEA6A27A}"/>
+                  <a16:creationId xmlns:a16="http://schemas.microsoft.com/office/drawing/2014/main" id="{DF319FF0-1ADC-4150-A598-54164A84E797}"/>
                 </a:ext>
               </a:extLst>
             </p:cNvPr>
@@ -6519,110 +6772,10 @@
       </p:grpSp>
       <p:sp>
         <p:nvSpPr>
-          <p:cNvPr id="45" name="TextBox 44">
+          <p:cNvPr id="25" name="Isosceles Triangle 24">
             <a:extLst>
               <a:ext uri="{FF2B5EF4-FFF2-40B4-BE49-F238E27FC236}">
-                <a16:creationId xmlns:a16="http://schemas.microsoft.com/office/drawing/2014/main" id="{AC11127A-D588-B3EB-CEF0-6184262B301B}"/>
-              </a:ext>
-            </a:extLst>
-          </p:cNvPr>
-          <p:cNvSpPr txBox="1"/>
-          <p:nvPr/>
-        </p:nvSpPr>
-        <p:spPr>
-          <a:xfrm>
-            <a:off x="563304" y="904285"/>
-            <a:ext cx="2158849" cy="246221"/>
-          </a:xfrm>
-          <a:prstGeom prst="rect">
-            <a:avLst/>
-          </a:prstGeom>
-          <a:noFill/>
-        </p:spPr>
-        <p:txBody>
-          <a:bodyPr wrap="square" rtlCol="0">
-            <a:spAutoFit/>
-          </a:bodyPr>
-          <a:lstStyle>
-            <a:defPPr>
-              <a:defRPr lang="en-US"/>
-            </a:defPPr>
-            <a:lvl1pPr>
-              <a:defRPr sz="1200">
-                <a:solidFill>
-                  <a:schemeClr val="tx1">
-                    <a:lumMod val="65000"/>
-                    <a:lumOff val="35000"/>
-                  </a:schemeClr>
-                </a:solidFill>
-              </a:defRPr>
-            </a:lvl1pPr>
-          </a:lstStyle>
-          <a:p>
-            <a:r>
-              <a:rPr lang="en-US" sz="1000" b="1" dirty="0"/>
-              <a:t>Insert -&gt; Shapes</a:t>
-            </a:r>
-            <a:endParaRPr lang="en-US" sz="1000" dirty="0"/>
-          </a:p>
-        </p:txBody>
-      </p:sp>
-      <p:sp>
-        <p:nvSpPr>
-          <p:cNvPr id="46" name="TextBox 45">
-            <a:extLst>
-              <a:ext uri="{FF2B5EF4-FFF2-40B4-BE49-F238E27FC236}">
-                <a16:creationId xmlns:a16="http://schemas.microsoft.com/office/drawing/2014/main" id="{97F146AC-A466-B946-83AD-5731933C7889}"/>
-              </a:ext>
-            </a:extLst>
-          </p:cNvPr>
-          <p:cNvSpPr txBox="1"/>
-          <p:nvPr/>
-        </p:nvSpPr>
-        <p:spPr>
-          <a:xfrm>
-            <a:off x="538485" y="2729610"/>
-            <a:ext cx="2158849" cy="246221"/>
-          </a:xfrm>
-          <a:prstGeom prst="rect">
-            <a:avLst/>
-          </a:prstGeom>
-          <a:noFill/>
-        </p:spPr>
-        <p:txBody>
-          <a:bodyPr wrap="square" rtlCol="0">
-            <a:spAutoFit/>
-          </a:bodyPr>
-          <a:lstStyle>
-            <a:defPPr>
-              <a:defRPr lang="en-US"/>
-            </a:defPPr>
-            <a:lvl1pPr>
-              <a:defRPr sz="1200">
-                <a:solidFill>
-                  <a:schemeClr val="tx1">
-                    <a:lumMod val="65000"/>
-                    <a:lumOff val="35000"/>
-                  </a:schemeClr>
-                </a:solidFill>
-              </a:defRPr>
-            </a:lvl1pPr>
-          </a:lstStyle>
-          <a:p>
-            <a:r>
-              <a:rPr lang="en-US" sz="1000" b="1" dirty="0"/>
-              <a:t>Insert -&gt; Shapes</a:t>
-            </a:r>
-            <a:endParaRPr lang="en-US" sz="1000" dirty="0"/>
-          </a:p>
-        </p:txBody>
-      </p:sp>
-      <p:sp>
-        <p:nvSpPr>
-          <p:cNvPr id="47" name="Isosceles Triangle 46">
-            <a:extLst>
-              <a:ext uri="{FF2B5EF4-FFF2-40B4-BE49-F238E27FC236}">
-                <a16:creationId xmlns:a16="http://schemas.microsoft.com/office/drawing/2014/main" id="{7D831875-AA94-8813-27F4-E7D35BB04FDE}"/>
+                <a16:creationId xmlns:a16="http://schemas.microsoft.com/office/drawing/2014/main" id="{05C6E013-9D58-46FB-3BF8-E6562DD38A3C}"/>
               </a:ext>
             </a:extLst>
           </p:cNvPr>
@@ -6631,7 +6784,7 @@
         </p:nvSpPr>
         <p:spPr>
           <a:xfrm>
-            <a:off x="868680" y="3385573"/>
+            <a:off x="5532120" y="1451215"/>
             <a:ext cx="960120" cy="842088"/>
           </a:xfrm>
           <a:prstGeom prst="triangle">
@@ -6665,10 +6818,10 @@
       </p:sp>
       <p:sp>
         <p:nvSpPr>
-          <p:cNvPr id="48" name="TextBox 47">
+          <p:cNvPr id="26" name="TextBox 25">
             <a:extLst>
               <a:ext uri="{FF2B5EF4-FFF2-40B4-BE49-F238E27FC236}">
-                <a16:creationId xmlns:a16="http://schemas.microsoft.com/office/drawing/2014/main" id="{1737CA0F-7BF4-27E5-706A-3553BA59D68A}"/>
+                <a16:creationId xmlns:a16="http://schemas.microsoft.com/office/drawing/2014/main" id="{D10657C1-3A9F-F845-8A4F-A257530B89AB}"/>
               </a:ext>
             </a:extLst>
           </p:cNvPr>
@@ -6677,13 +6830,17 @@
         </p:nvSpPr>
         <p:spPr>
           <a:xfrm>
-            <a:off x="3062723" y="3494528"/>
-            <a:ext cx="2158849" cy="707886"/>
+            <a:off x="5068842" y="2798722"/>
+            <a:ext cx="2158849" cy="830997"/>
           </a:xfrm>
           <a:prstGeom prst="rect">
             <a:avLst/>
           </a:prstGeom>
-          <a:noFill/>
+          <a:solidFill>
+            <a:schemeClr val="bg1">
+              <a:lumMod val="95000"/>
+            </a:schemeClr>
+          </a:solidFill>
         </p:spPr>
         <p:txBody>
           <a:bodyPr wrap="square" rtlCol="0">
@@ -6694,7 +6851,7 @@
               <a:defRPr lang="en-US"/>
             </a:defPPr>
             <a:lvl1pPr>
-              <a:defRPr sz="1200">
+              <a:defRPr sz="1200" b="1">
                 <a:solidFill>
                   <a:schemeClr val="tx1">
                     <a:lumMod val="65000"/>
@@ -6706,41 +6863,40 @@
           </a:lstStyle>
           <a:p>
             <a:r>
-              <a:rPr lang="en-US" sz="1000" b="1" dirty="0"/>
+              <a:rPr lang="en-US" dirty="0"/>
               <a:t>Shape Format</a:t>
             </a:r>
           </a:p>
           <a:p>
             <a:r>
-              <a:rPr lang="en-US" sz="1000" dirty="0"/>
-              <a:t>	Shape Fill -&gt; Gradient</a:t>
-            </a:r>
-          </a:p>
-          <a:p>
-            <a:r>
-              <a:rPr lang="en-US" sz="1000" dirty="0"/>
+              <a:rPr lang="en-US" dirty="0"/>
+              <a:t>	</a:t>
+            </a:r>
+            <a:r>
+              <a:rPr lang="en-US" b="0" dirty="0"/>
+              <a:t>Shape Fill -&gt; Gradient</a:t>
+            </a:r>
+          </a:p>
+          <a:p>
+            <a:r>
+              <a:rPr lang="en-US" b="0" dirty="0"/>
               <a:t>	Shape Effects -&gt; Shadow</a:t>
             </a:r>
           </a:p>
           <a:p>
             <a:r>
-              <a:rPr lang="en-US" sz="1000" b="1" dirty="0"/>
-              <a:t>Ctrl + D </a:t>
-            </a:r>
-            <a:r>
-              <a:rPr lang="en-US" sz="1000" dirty="0"/>
-              <a:t>(Duplicate)</a:t>
-            </a:r>
-            <a:endParaRPr lang="en-US" sz="1000" b="1" dirty="0"/>
-          </a:p>
-        </p:txBody>
-      </p:sp>
-      <p:sp>
-        <p:nvSpPr>
-          <p:cNvPr id="49" name="Isosceles Triangle 48">
+              <a:rPr lang="en-US" b="0" dirty="0"/>
+              <a:t>Ctrl + D (Duplicate)</a:t>
+            </a:r>
+          </a:p>
+        </p:txBody>
+      </p:sp>
+      <p:sp>
+        <p:nvSpPr>
+          <p:cNvPr id="27" name="Isosceles Triangle 26">
             <a:extLst>
               <a:ext uri="{FF2B5EF4-FFF2-40B4-BE49-F238E27FC236}">
-                <a16:creationId xmlns:a16="http://schemas.microsoft.com/office/drawing/2014/main" id="{708738D8-E1E0-64FD-DF36-7A8E914FA61E}"/>
+                <a16:creationId xmlns:a16="http://schemas.microsoft.com/office/drawing/2014/main" id="{54CCFD9B-6E37-0C19-8E0D-D7DEF9BB71FB}"/>
               </a:ext>
             </a:extLst>
           </p:cNvPr>
@@ -6749,7 +6905,7 @@
         </p:nvSpPr>
         <p:spPr>
           <a:xfrm>
-            <a:off x="7115244" y="3713379"/>
+            <a:off x="5253435" y="5500442"/>
             <a:ext cx="625196" cy="576324"/>
           </a:xfrm>
           <a:prstGeom prst="triangle">
@@ -6782,10 +6938,10 @@
       </p:sp>
       <p:sp>
         <p:nvSpPr>
-          <p:cNvPr id="51" name="Isosceles Triangle 50">
+          <p:cNvPr id="28" name="Isosceles Triangle 27">
             <a:extLst>
               <a:ext uri="{FF2B5EF4-FFF2-40B4-BE49-F238E27FC236}">
-                <a16:creationId xmlns:a16="http://schemas.microsoft.com/office/drawing/2014/main" id="{81037597-EB14-827E-ADA7-59AB1655C297}"/>
+                <a16:creationId xmlns:a16="http://schemas.microsoft.com/office/drawing/2014/main" id="{66038533-9D1E-348E-16B4-198E13F873EF}"/>
               </a:ext>
             </a:extLst>
           </p:cNvPr>
@@ -6794,7 +6950,7 @@
         </p:nvSpPr>
         <p:spPr>
           <a:xfrm rot="3778520">
-            <a:off x="7206783" y="3768529"/>
+            <a:off x="5344974" y="5555592"/>
             <a:ext cx="607018" cy="515255"/>
           </a:xfrm>
           <a:prstGeom prst="triangle">
@@ -6827,10 +6983,10 @@
       </p:sp>
       <p:sp>
         <p:nvSpPr>
-          <p:cNvPr id="63" name="Isosceles Triangle 62">
+          <p:cNvPr id="29" name="Isosceles Triangle 28">
             <a:extLst>
               <a:ext uri="{FF2B5EF4-FFF2-40B4-BE49-F238E27FC236}">
-                <a16:creationId xmlns:a16="http://schemas.microsoft.com/office/drawing/2014/main" id="{89683A4D-B8D3-6CC6-806C-3D742C2DF467}"/>
+                <a16:creationId xmlns:a16="http://schemas.microsoft.com/office/drawing/2014/main" id="{FC3C07CD-A7A4-3D14-177B-E7E362F89D2C}"/>
               </a:ext>
             </a:extLst>
           </p:cNvPr>
@@ -6839,7 +6995,7 @@
         </p:nvSpPr>
         <p:spPr>
           <a:xfrm rot="1667647">
-            <a:off x="7205161" y="3735394"/>
+            <a:off x="5343352" y="5522457"/>
             <a:ext cx="588674" cy="531312"/>
           </a:xfrm>
           <a:prstGeom prst="triangle">
@@ -6872,10 +7028,10 @@
       </p:sp>
       <p:sp>
         <p:nvSpPr>
-          <p:cNvPr id="64" name="TextBox 63">
+          <p:cNvPr id="30" name="TextBox 29">
             <a:extLst>
               <a:ext uri="{FF2B5EF4-FFF2-40B4-BE49-F238E27FC236}">
-                <a16:creationId xmlns:a16="http://schemas.microsoft.com/office/drawing/2014/main" id="{60008F2C-61B3-148F-8793-FFB80E463477}"/>
+                <a16:creationId xmlns:a16="http://schemas.microsoft.com/office/drawing/2014/main" id="{61EFC9B3-BD09-9CDC-C254-64BCF2E23774}"/>
               </a:ext>
             </a:extLst>
           </p:cNvPr>
@@ -6884,8 +7040,8 @@
         </p:nvSpPr>
         <p:spPr>
           <a:xfrm>
-            <a:off x="7021625" y="3298419"/>
-            <a:ext cx="945397" cy="400110"/>
+            <a:off x="5135525" y="5044846"/>
+            <a:ext cx="1036371" cy="461665"/>
           </a:xfrm>
           <a:prstGeom prst="rect">
             <a:avLst/>
@@ -6913,24 +7069,18 @@
           </a:lstStyle>
           <a:p>
             <a:r>
-              <a:rPr lang="en-US" sz="1000" i="1" dirty="0"/>
-              <a:t>Superimpose</a:t>
-            </a:r>
-          </a:p>
-          <a:p>
-            <a:r>
-              <a:rPr lang="en-US" sz="1000" i="1" dirty="0"/>
-              <a:t> and rotate</a:t>
-            </a:r>
-          </a:p>
-        </p:txBody>
-      </p:sp>
-      <p:sp>
-        <p:nvSpPr>
-          <p:cNvPr id="65" name="TextBox 64">
+              <a:rPr lang="en-US" i="1" dirty="0"/>
+              <a:t>Superimpose; rotate</a:t>
+            </a:r>
+          </a:p>
+        </p:txBody>
+      </p:sp>
+      <p:sp>
+        <p:nvSpPr>
+          <p:cNvPr id="31" name="TextBox 30">
             <a:extLst>
               <a:ext uri="{FF2B5EF4-FFF2-40B4-BE49-F238E27FC236}">
-                <a16:creationId xmlns:a16="http://schemas.microsoft.com/office/drawing/2014/main" id="{ABEF0DB2-158D-E693-DCD8-54FFAB0552DB}"/>
+                <a16:creationId xmlns:a16="http://schemas.microsoft.com/office/drawing/2014/main" id="{F29B7BBC-06E1-C047-DFD3-48E9B76FBA5E}"/>
               </a:ext>
             </a:extLst>
           </p:cNvPr>
@@ -6939,8 +7089,8 @@
         </p:nvSpPr>
         <p:spPr>
           <a:xfrm>
-            <a:off x="8890609" y="3294473"/>
-            <a:ext cx="2158849" cy="246221"/>
+            <a:off x="5099211" y="6459308"/>
+            <a:ext cx="2158849" cy="276999"/>
           </a:xfrm>
           <a:prstGeom prst="rect">
             <a:avLst/>
@@ -6968,23 +7118,23 @@
           </a:lstStyle>
           <a:p>
             <a:r>
-              <a:rPr lang="en-US" sz="1000" b="1" dirty="0"/>
+              <a:rPr lang="en-US" b="1" dirty="0"/>
               <a:t>Ctrl + D </a:t>
             </a:r>
             <a:r>
-              <a:rPr lang="en-US" sz="1000" dirty="0"/>
+              <a:rPr lang="en-US" dirty="0"/>
               <a:t>(Duplicate) + Resize</a:t>
             </a:r>
-            <a:endParaRPr lang="en-US" sz="1000" b="1" dirty="0"/>
-          </a:p>
-        </p:txBody>
-      </p:sp>
-      <p:sp>
-        <p:nvSpPr>
-          <p:cNvPr id="66" name="TextBox 65">
+            <a:endParaRPr lang="en-US" b="1" dirty="0"/>
+          </a:p>
+        </p:txBody>
+      </p:sp>
+      <p:sp>
+        <p:nvSpPr>
+          <p:cNvPr id="32" name="TextBox 31">
             <a:extLst>
               <a:ext uri="{FF2B5EF4-FFF2-40B4-BE49-F238E27FC236}">
-                <a16:creationId xmlns:a16="http://schemas.microsoft.com/office/drawing/2014/main" id="{1FCFAD57-A878-D5D2-CFE7-B31D8DAB367E}"/>
+                <a16:creationId xmlns:a16="http://schemas.microsoft.com/office/drawing/2014/main" id="{DC1B274D-C105-41A6-264F-DF6F36862687}"/>
               </a:ext>
             </a:extLst>
           </p:cNvPr>
@@ -6993,8 +7143,8 @@
         </p:nvSpPr>
         <p:spPr>
           <a:xfrm>
-            <a:off x="8094595" y="3294473"/>
-            <a:ext cx="945397" cy="246221"/>
+            <a:off x="6258003" y="5059056"/>
+            <a:ext cx="1036371" cy="276999"/>
           </a:xfrm>
           <a:prstGeom prst="rect">
             <a:avLst/>
@@ -7022,7 +7172,7 @@
           </a:lstStyle>
           <a:p>
             <a:r>
-              <a:rPr lang="en-US" sz="1000" i="1" dirty="0"/>
+              <a:rPr lang="en-US" i="1" dirty="0"/>
               <a:t>Group</a:t>
             </a:r>
           </a:p>
@@ -7030,10 +7180,10 @@
       </p:sp>
       <p:grpSp>
         <p:nvGrpSpPr>
-          <p:cNvPr id="70" name="Group 69">
+          <p:cNvPr id="33" name="Group 32">
             <a:extLst>
               <a:ext uri="{FF2B5EF4-FFF2-40B4-BE49-F238E27FC236}">
-                <a16:creationId xmlns:a16="http://schemas.microsoft.com/office/drawing/2014/main" id="{CF4699DC-A317-40A2-CD75-8F3A5331A195}"/>
+                <a16:creationId xmlns:a16="http://schemas.microsoft.com/office/drawing/2014/main" id="{D117FE19-3414-4227-0B06-E498F77A529E}"/>
               </a:ext>
             </a:extLst>
           </p:cNvPr>
@@ -7042,7 +7192,7 @@
         </p:nvGrpSpPr>
         <p:grpSpPr>
           <a:xfrm>
-            <a:off x="8012802" y="3698769"/>
+            <a:off x="6150993" y="5485832"/>
             <a:ext cx="678591" cy="616287"/>
             <a:chOff x="7267644" y="4222395"/>
             <a:chExt cx="678591" cy="616287"/>
@@ -7050,10 +7200,10 @@
         </p:grpSpPr>
         <p:sp>
           <p:nvSpPr>
-            <p:cNvPr id="67" name="Isosceles Triangle 66">
+            <p:cNvPr id="50" name="Isosceles Triangle 49">
               <a:extLst>
                 <a:ext uri="{FF2B5EF4-FFF2-40B4-BE49-F238E27FC236}">
-                  <a16:creationId xmlns:a16="http://schemas.microsoft.com/office/drawing/2014/main" id="{979847C7-D43E-68EF-2C3F-1638B464A4F9}"/>
+                  <a16:creationId xmlns:a16="http://schemas.microsoft.com/office/drawing/2014/main" id="{D9F52FDB-1F5D-4720-8A62-7EBFCAAB9F55}"/>
                 </a:ext>
               </a:extLst>
             </p:cNvPr>
@@ -7095,10 +7245,10 @@
         </p:sp>
         <p:sp>
           <p:nvSpPr>
-            <p:cNvPr id="68" name="Isosceles Triangle 67">
+            <p:cNvPr id="52" name="Isosceles Triangle 51">
               <a:extLst>
                 <a:ext uri="{FF2B5EF4-FFF2-40B4-BE49-F238E27FC236}">
-                  <a16:creationId xmlns:a16="http://schemas.microsoft.com/office/drawing/2014/main" id="{5914B6D5-3B86-78A6-A3E1-1E830634C9EF}"/>
+                  <a16:creationId xmlns:a16="http://schemas.microsoft.com/office/drawing/2014/main" id="{F9A9180B-E783-4361-113A-6EEFB899CA12}"/>
                 </a:ext>
               </a:extLst>
             </p:cNvPr>
@@ -7140,10 +7290,10 @@
         </p:sp>
         <p:sp>
           <p:nvSpPr>
-            <p:cNvPr id="69" name="Isosceles Triangle 68">
+            <p:cNvPr id="53" name="Isosceles Triangle 52">
               <a:extLst>
                 <a:ext uri="{FF2B5EF4-FFF2-40B4-BE49-F238E27FC236}">
-                  <a16:creationId xmlns:a16="http://schemas.microsoft.com/office/drawing/2014/main" id="{FE8DD66E-5506-D875-AB21-07128940F848}"/>
+                  <a16:creationId xmlns:a16="http://schemas.microsoft.com/office/drawing/2014/main" id="{850524E8-F164-A842-ECEF-336AB5F2D8E5}"/>
                 </a:ext>
               </a:extLst>
             </p:cNvPr>
@@ -7186,10 +7336,10 @@
       </p:grpSp>
       <p:grpSp>
         <p:nvGrpSpPr>
-          <p:cNvPr id="71" name="Group 70">
+          <p:cNvPr id="54" name="Group 53">
             <a:extLst>
               <a:ext uri="{FF2B5EF4-FFF2-40B4-BE49-F238E27FC236}">
-                <a16:creationId xmlns:a16="http://schemas.microsoft.com/office/drawing/2014/main" id="{47BEA2CA-B613-857D-366B-9B560B93C4F8}"/>
+                <a16:creationId xmlns:a16="http://schemas.microsoft.com/office/drawing/2014/main" id="{44C08574-4A35-0C1C-FC8C-91598AA3B11B}"/>
               </a:ext>
             </a:extLst>
           </p:cNvPr>
@@ -7198,7 +7348,7 @@
         </p:nvGrpSpPr>
         <p:grpSpPr>
           <a:xfrm>
-            <a:off x="9109299" y="3643818"/>
+            <a:off x="5317901" y="6808653"/>
             <a:ext cx="482098" cy="440905"/>
             <a:chOff x="7267644" y="4222395"/>
             <a:chExt cx="678591" cy="616287"/>
@@ -7206,10 +7356,10 @@
         </p:grpSpPr>
         <p:sp>
           <p:nvSpPr>
-            <p:cNvPr id="72" name="Isosceles Triangle 71">
+            <p:cNvPr id="55" name="Isosceles Triangle 54">
               <a:extLst>
                 <a:ext uri="{FF2B5EF4-FFF2-40B4-BE49-F238E27FC236}">
-                  <a16:creationId xmlns:a16="http://schemas.microsoft.com/office/drawing/2014/main" id="{CB877C0E-9A8B-A2FF-F360-79131925A8B5}"/>
+                  <a16:creationId xmlns:a16="http://schemas.microsoft.com/office/drawing/2014/main" id="{1D1F1AD8-F147-83BE-A763-AABAD8D2FCA8}"/>
                 </a:ext>
               </a:extLst>
             </p:cNvPr>
@@ -7251,10 +7401,10 @@
         </p:sp>
         <p:sp>
           <p:nvSpPr>
-            <p:cNvPr id="73" name="Isosceles Triangle 72">
+            <p:cNvPr id="56" name="Isosceles Triangle 55">
               <a:extLst>
                 <a:ext uri="{FF2B5EF4-FFF2-40B4-BE49-F238E27FC236}">
-                  <a16:creationId xmlns:a16="http://schemas.microsoft.com/office/drawing/2014/main" id="{AF27E591-3A46-A2EF-CF63-12374FF47676}"/>
+                  <a16:creationId xmlns:a16="http://schemas.microsoft.com/office/drawing/2014/main" id="{BD06D455-6D28-BC81-E62C-D702D10BB545}"/>
                 </a:ext>
               </a:extLst>
             </p:cNvPr>
@@ -7296,10 +7446,10 @@
         </p:sp>
         <p:sp>
           <p:nvSpPr>
-            <p:cNvPr id="74" name="Isosceles Triangle 73">
+            <p:cNvPr id="57" name="Isosceles Triangle 56">
               <a:extLst>
                 <a:ext uri="{FF2B5EF4-FFF2-40B4-BE49-F238E27FC236}">
-                  <a16:creationId xmlns:a16="http://schemas.microsoft.com/office/drawing/2014/main" id="{BA1A76F0-92E1-116A-5798-90B6D751FD4C}"/>
+                  <a16:creationId xmlns:a16="http://schemas.microsoft.com/office/drawing/2014/main" id="{26C5E7D1-B6B0-5655-5442-FC8D5D9E0570}"/>
                 </a:ext>
               </a:extLst>
             </p:cNvPr>
@@ -7342,10 +7492,10 @@
       </p:grpSp>
       <p:grpSp>
         <p:nvGrpSpPr>
-          <p:cNvPr id="75" name="Group 74">
+          <p:cNvPr id="58" name="Group 57">
             <a:extLst>
               <a:ext uri="{FF2B5EF4-FFF2-40B4-BE49-F238E27FC236}">
-                <a16:creationId xmlns:a16="http://schemas.microsoft.com/office/drawing/2014/main" id="{0E523FF5-9BF4-3D28-A3BA-C79DA67F86EC}"/>
+                <a16:creationId xmlns:a16="http://schemas.microsoft.com/office/drawing/2014/main" id="{73FA9E60-AE2D-D566-24A7-F0E4C6BF8A1E}"/>
               </a:ext>
             </a:extLst>
           </p:cNvPr>
@@ -7354,7 +7504,7 @@
         </p:nvGrpSpPr>
         <p:grpSpPr>
           <a:xfrm>
-            <a:off x="9970033" y="3779935"/>
+            <a:off x="6178635" y="6944770"/>
             <a:ext cx="252361" cy="246221"/>
             <a:chOff x="7267644" y="4222395"/>
             <a:chExt cx="678591" cy="616287"/>
@@ -7362,10 +7512,10 @@
         </p:grpSpPr>
         <p:sp>
           <p:nvSpPr>
-            <p:cNvPr id="76" name="Isosceles Triangle 75">
+            <p:cNvPr id="59" name="Isosceles Triangle 58">
               <a:extLst>
                 <a:ext uri="{FF2B5EF4-FFF2-40B4-BE49-F238E27FC236}">
-                  <a16:creationId xmlns:a16="http://schemas.microsoft.com/office/drawing/2014/main" id="{24F05523-B02D-A0E7-977F-613DC2E48171}"/>
+                  <a16:creationId xmlns:a16="http://schemas.microsoft.com/office/drawing/2014/main" id="{55B6E912-D69B-E8CA-33A8-EEE1F9073AC6}"/>
                 </a:ext>
               </a:extLst>
             </p:cNvPr>
@@ -7407,10 +7557,10 @@
         </p:sp>
         <p:sp>
           <p:nvSpPr>
-            <p:cNvPr id="77" name="Isosceles Triangle 76">
+            <p:cNvPr id="60" name="Isosceles Triangle 59">
               <a:extLst>
                 <a:ext uri="{FF2B5EF4-FFF2-40B4-BE49-F238E27FC236}">
-                  <a16:creationId xmlns:a16="http://schemas.microsoft.com/office/drawing/2014/main" id="{011CC320-A0A8-F682-538A-16E8790BEE29}"/>
+                  <a16:creationId xmlns:a16="http://schemas.microsoft.com/office/drawing/2014/main" id="{01557162-A32D-229C-5ABB-AB2C305CF0CC}"/>
                 </a:ext>
               </a:extLst>
             </p:cNvPr>
@@ -7452,10 +7602,10 @@
         </p:sp>
         <p:sp>
           <p:nvSpPr>
-            <p:cNvPr id="78" name="Isosceles Triangle 77">
+            <p:cNvPr id="61" name="Isosceles Triangle 60">
               <a:extLst>
                 <a:ext uri="{FF2B5EF4-FFF2-40B4-BE49-F238E27FC236}">
-                  <a16:creationId xmlns:a16="http://schemas.microsoft.com/office/drawing/2014/main" id="{01E9DFAA-FEBB-992F-868F-78007F8631F7}"/>
+                  <a16:creationId xmlns:a16="http://schemas.microsoft.com/office/drawing/2014/main" id="{F8C98AC0-F207-C721-2D5F-3C74F2A745A3}"/>
                 </a:ext>
               </a:extLst>
             </p:cNvPr>
@@ -7498,10 +7648,10 @@
       </p:grpSp>
       <p:sp>
         <p:nvSpPr>
-          <p:cNvPr id="79" name="TextBox 78">
+          <p:cNvPr id="62" name="TextBox 61">
             <a:extLst>
               <a:ext uri="{FF2B5EF4-FFF2-40B4-BE49-F238E27FC236}">
-                <a16:creationId xmlns:a16="http://schemas.microsoft.com/office/drawing/2014/main" id="{05EF2C39-BB21-9CBC-5B4E-B46B5E4D6B3C}"/>
+                <a16:creationId xmlns:a16="http://schemas.microsoft.com/office/drawing/2014/main" id="{BE66B2EA-958A-641F-59D1-1D6409778855}"/>
               </a:ext>
             </a:extLst>
           </p:cNvPr>
@@ -7510,7 +7660,7 @@
         </p:nvSpPr>
         <p:spPr>
           <a:xfrm>
-            <a:off x="10864111" y="3283452"/>
+            <a:off x="5095052" y="7721972"/>
             <a:ext cx="945397" cy="400110"/>
           </a:xfrm>
           <a:prstGeom prst="rect">
@@ -7553,10 +7703,113 @@
       </p:sp>
       <p:sp>
         <p:nvSpPr>
-          <p:cNvPr id="80" name="Freeform: Shape 79">
+          <p:cNvPr id="85" name="TextBox 84">
             <a:extLst>
               <a:ext uri="{FF2B5EF4-FFF2-40B4-BE49-F238E27FC236}">
-                <a16:creationId xmlns:a16="http://schemas.microsoft.com/office/drawing/2014/main" id="{4E56EFED-85D1-FEF3-5BA4-4CCD7EB38FDF}"/>
+                <a16:creationId xmlns:a16="http://schemas.microsoft.com/office/drawing/2014/main" id="{76756AE1-2012-0B6C-B45D-F3D32EB07721}"/>
+              </a:ext>
+            </a:extLst>
+          </p:cNvPr>
+          <p:cNvSpPr txBox="1"/>
+          <p:nvPr/>
+        </p:nvSpPr>
+        <p:spPr>
+          <a:xfrm>
+            <a:off x="6541858" y="8427117"/>
+            <a:ext cx="1031428" cy="400110"/>
+          </a:xfrm>
+          <a:prstGeom prst="rect">
+            <a:avLst/>
+          </a:prstGeom>
+          <a:noFill/>
+        </p:spPr>
+        <p:txBody>
+          <a:bodyPr wrap="square" rtlCol="0">
+            <a:spAutoFit/>
+          </a:bodyPr>
+          <a:lstStyle>
+            <a:defPPr>
+              <a:defRPr lang="en-US"/>
+            </a:defPPr>
+            <a:lvl1pPr>
+              <a:defRPr sz="1200">
+                <a:solidFill>
+                  <a:schemeClr val="tx1">
+                    <a:lumMod val="65000"/>
+                    <a:lumOff val="35000"/>
+                  </a:schemeClr>
+                </a:solidFill>
+              </a:defRPr>
+            </a:lvl1pPr>
+          </a:lstStyle>
+          <a:p>
+            <a:r>
+              <a:rPr lang="en-US" sz="1000" i="1" dirty="0"/>
+              <a:t>Duplicate and resize as needed</a:t>
+            </a:r>
+          </a:p>
+        </p:txBody>
+      </p:sp>
+      <p:sp>
+        <p:nvSpPr>
+          <p:cNvPr id="91" name="TextBox 90">
+            <a:extLst>
+              <a:ext uri="{FF2B5EF4-FFF2-40B4-BE49-F238E27FC236}">
+                <a16:creationId xmlns:a16="http://schemas.microsoft.com/office/drawing/2014/main" id="{187DC1C3-0638-56DD-A415-A221B737A747}"/>
+              </a:ext>
+            </a:extLst>
+          </p:cNvPr>
+          <p:cNvSpPr txBox="1"/>
+          <p:nvPr/>
+        </p:nvSpPr>
+        <p:spPr>
+          <a:xfrm>
+            <a:off x="5077927" y="989490"/>
+            <a:ext cx="2158849" cy="276999"/>
+          </a:xfrm>
+          <a:prstGeom prst="rect">
+            <a:avLst/>
+          </a:prstGeom>
+          <a:solidFill>
+            <a:schemeClr val="bg1">
+              <a:lumMod val="95000"/>
+            </a:schemeClr>
+          </a:solidFill>
+        </p:spPr>
+        <p:txBody>
+          <a:bodyPr wrap="square" rtlCol="0">
+            <a:spAutoFit/>
+          </a:bodyPr>
+          <a:lstStyle>
+            <a:defPPr>
+              <a:defRPr lang="en-US"/>
+            </a:defPPr>
+            <a:lvl1pPr>
+              <a:defRPr sz="1200">
+                <a:solidFill>
+                  <a:schemeClr val="tx1">
+                    <a:lumMod val="65000"/>
+                    <a:lumOff val="35000"/>
+                  </a:schemeClr>
+                </a:solidFill>
+              </a:defRPr>
+            </a:lvl1pPr>
+          </a:lstStyle>
+          <a:p>
+            <a:r>
+              <a:rPr lang="en-US" b="1" dirty="0"/>
+              <a:t>Insert -&gt; Shapes</a:t>
+            </a:r>
+            <a:endParaRPr lang="en-US" dirty="0"/>
+          </a:p>
+        </p:txBody>
+      </p:sp>
+      <p:sp>
+        <p:nvSpPr>
+          <p:cNvPr id="93" name="Freeform: Shape 92">
+            <a:extLst>
+              <a:ext uri="{FF2B5EF4-FFF2-40B4-BE49-F238E27FC236}">
+                <a16:creationId xmlns:a16="http://schemas.microsoft.com/office/drawing/2014/main" id="{D5674A76-26A2-7E98-7CA0-2FF54C34D028}"/>
               </a:ext>
             </a:extLst>
           </p:cNvPr>
@@ -7565,7 +7818,7 @@
         </p:nvSpPr>
         <p:spPr>
           <a:xfrm>
-            <a:off x="340241" y="5909896"/>
+            <a:off x="8481935" y="1811625"/>
             <a:ext cx="2752673" cy="699117"/>
           </a:xfrm>
           <a:custGeom>
@@ -7838,10 +8091,10 @@
       </p:sp>
       <p:sp>
         <p:nvSpPr>
-          <p:cNvPr id="81" name="TextBox 80">
+          <p:cNvPr id="102" name="TextBox 101">
             <a:extLst>
               <a:ext uri="{FF2B5EF4-FFF2-40B4-BE49-F238E27FC236}">
-                <a16:creationId xmlns:a16="http://schemas.microsoft.com/office/drawing/2014/main" id="{5A71A325-25D5-54BA-691D-645C6E866400}"/>
+                <a16:creationId xmlns:a16="http://schemas.microsoft.com/office/drawing/2014/main" id="{68A4E074-3E3F-BDDF-95F9-208D1C7064B6}"/>
               </a:ext>
             </a:extLst>
           </p:cNvPr>
@@ -7850,13 +8103,17 @@
         </p:nvSpPr>
         <p:spPr>
           <a:xfrm>
-            <a:off x="538485" y="5279093"/>
-            <a:ext cx="2384384" cy="553998"/>
+            <a:off x="8531396" y="943189"/>
+            <a:ext cx="2384384" cy="646331"/>
           </a:xfrm>
           <a:prstGeom prst="rect">
             <a:avLst/>
           </a:prstGeom>
-          <a:noFill/>
+          <a:solidFill>
+            <a:schemeClr val="bg1">
+              <a:lumMod val="95000"/>
+            </a:schemeClr>
+          </a:solidFill>
         </p:spPr>
         <p:txBody>
           <a:bodyPr wrap="square" rtlCol="0">
@@ -7879,23 +8136,23 @@
           </a:lstStyle>
           <a:p>
             <a:r>
-              <a:rPr lang="en-US" sz="1000" b="1" dirty="0"/>
+              <a:rPr lang="en-US" b="1" dirty="0"/>
               <a:t>Insert -&gt; Shapes</a:t>
             </a:r>
           </a:p>
           <a:p>
             <a:r>
-              <a:rPr lang="en-US" sz="1000" b="1" dirty="0"/>
+              <a:rPr lang="en-US" b="1" dirty="0"/>
               <a:t>	</a:t>
             </a:r>
             <a:r>
-              <a:rPr lang="en-US" sz="1000" dirty="0"/>
+              <a:rPr lang="en-US" dirty="0"/>
               <a:t>Curve</a:t>
             </a:r>
           </a:p>
           <a:p>
             <a:r>
-              <a:rPr lang="en-US" sz="1000" i="1" dirty="0"/>
+              <a:rPr lang="en-US" i="1" dirty="0"/>
               <a:t>Draw your free shape</a:t>
             </a:r>
           </a:p>
@@ -7903,59 +8160,10 @@
       </p:sp>
       <p:sp>
         <p:nvSpPr>
-          <p:cNvPr id="82" name="TextBox 81">
+          <p:cNvPr id="104" name="Trapezoid 103">
             <a:extLst>
               <a:ext uri="{FF2B5EF4-FFF2-40B4-BE49-F238E27FC236}">
-                <a16:creationId xmlns:a16="http://schemas.microsoft.com/office/drawing/2014/main" id="{2A76607B-BC93-8B00-3B6D-0FBF2EB7557C}"/>
-              </a:ext>
-            </a:extLst>
-          </p:cNvPr>
-          <p:cNvSpPr txBox="1"/>
-          <p:nvPr/>
-        </p:nvSpPr>
-        <p:spPr>
-          <a:xfrm>
-            <a:off x="3520690" y="5231120"/>
-            <a:ext cx="2384384" cy="246221"/>
-          </a:xfrm>
-          <a:prstGeom prst="rect">
-            <a:avLst/>
-          </a:prstGeom>
-          <a:noFill/>
-        </p:spPr>
-        <p:txBody>
-          <a:bodyPr wrap="square" rtlCol="0">
-            <a:spAutoFit/>
-          </a:bodyPr>
-          <a:lstStyle>
-            <a:defPPr>
-              <a:defRPr lang="en-US"/>
-            </a:defPPr>
-            <a:lvl1pPr>
-              <a:defRPr sz="1200">
-                <a:solidFill>
-                  <a:schemeClr val="tx1">
-                    <a:lumMod val="65000"/>
-                    <a:lumOff val="35000"/>
-                  </a:schemeClr>
-                </a:solidFill>
-              </a:defRPr>
-            </a:lvl1pPr>
-          </a:lstStyle>
-          <a:p>
-            <a:r>
-              <a:rPr lang="en-US" sz="1000" b="1" dirty="0"/>
-              <a:t>Insert -&gt; Shapes</a:t>
-            </a:r>
-          </a:p>
-        </p:txBody>
-      </p:sp>
-      <p:sp>
-        <p:nvSpPr>
-          <p:cNvPr id="83" name="Trapezoid 82">
-            <a:extLst>
-              <a:ext uri="{FF2B5EF4-FFF2-40B4-BE49-F238E27FC236}">
-                <a16:creationId xmlns:a16="http://schemas.microsoft.com/office/drawing/2014/main" id="{9AEE932D-4638-1183-A76F-0CB959CD1039}"/>
+                <a16:creationId xmlns:a16="http://schemas.microsoft.com/office/drawing/2014/main" id="{DEAE7F36-F5A9-E3B7-3E0D-FAA0FB95E0EE}"/>
               </a:ext>
             </a:extLst>
           </p:cNvPr>
@@ -7964,7 +8172,7 @@
         </p:nvSpPr>
         <p:spPr>
           <a:xfrm>
-            <a:off x="3689733" y="5537767"/>
+            <a:off x="8839742" y="3281465"/>
             <a:ext cx="446680" cy="400111"/>
           </a:xfrm>
           <a:prstGeom prst="trapezoid">
@@ -8000,10 +8208,10 @@
       </p:sp>
       <p:sp>
         <p:nvSpPr>
-          <p:cNvPr id="84" name="Trapezoid 83">
+          <p:cNvPr id="105" name="Trapezoid 104">
             <a:extLst>
               <a:ext uri="{FF2B5EF4-FFF2-40B4-BE49-F238E27FC236}">
-                <a16:creationId xmlns:a16="http://schemas.microsoft.com/office/drawing/2014/main" id="{BF31B40B-0758-A7F8-0E38-D93F154FC5A7}"/>
+                <a16:creationId xmlns:a16="http://schemas.microsoft.com/office/drawing/2014/main" id="{757AB7FB-2666-1D76-81C5-1DDEFBCFD387}"/>
               </a:ext>
             </a:extLst>
           </p:cNvPr>
@@ -8012,7 +8220,7 @@
         </p:nvSpPr>
         <p:spPr>
           <a:xfrm>
-            <a:off x="4020065" y="6126551"/>
+            <a:off x="9723588" y="3268035"/>
             <a:ext cx="453801" cy="413541"/>
           </a:xfrm>
           <a:prstGeom prst="trapezoid">
@@ -8048,10 +8256,10 @@
       </p:sp>
       <p:sp>
         <p:nvSpPr>
-          <p:cNvPr id="86" name="TextBox 85">
+          <p:cNvPr id="106" name="TextBox 105">
             <a:extLst>
               <a:ext uri="{FF2B5EF4-FFF2-40B4-BE49-F238E27FC236}">
-                <a16:creationId xmlns:a16="http://schemas.microsoft.com/office/drawing/2014/main" id="{6AEDC551-C205-6A41-D36B-0AF80B1A69B3}"/>
+                <a16:creationId xmlns:a16="http://schemas.microsoft.com/office/drawing/2014/main" id="{B04F4E2D-0349-7FC3-8E7C-AC70EA918332}"/>
               </a:ext>
             </a:extLst>
           </p:cNvPr>
@@ -8060,8 +8268,8 @@
         </p:nvSpPr>
         <p:spPr>
           <a:xfrm>
-            <a:off x="5652102" y="5211323"/>
-            <a:ext cx="945397" cy="553998"/>
+            <a:off x="8644164" y="3903813"/>
+            <a:ext cx="2022526" cy="461665"/>
           </a:xfrm>
           <a:prstGeom prst="rect">
             <a:avLst/>
@@ -8089,13 +8297,13 @@
           </a:lstStyle>
           <a:p>
             <a:r>
-              <a:rPr lang="en-US" sz="1000" i="1" dirty="0"/>
+              <a:rPr lang="en-US" i="1" dirty="0"/>
               <a:t>Place squares at both ends,</a:t>
             </a:r>
           </a:p>
           <a:p>
             <a:r>
-              <a:rPr lang="en-US" sz="1000" i="1" dirty="0"/>
+              <a:rPr lang="en-US" i="1" dirty="0"/>
               <a:t>Select All</a:t>
             </a:r>
           </a:p>
@@ -8103,10 +8311,10 @@
       </p:sp>
       <p:sp>
         <p:nvSpPr>
-          <p:cNvPr id="87" name="Freeform: Shape 86">
+          <p:cNvPr id="107" name="Freeform: Shape 106">
             <a:extLst>
               <a:ext uri="{FF2B5EF4-FFF2-40B4-BE49-F238E27FC236}">
-                <a16:creationId xmlns:a16="http://schemas.microsoft.com/office/drawing/2014/main" id="{B1483586-1BF5-0021-C599-B35C483E3ACB}"/>
+                <a16:creationId xmlns:a16="http://schemas.microsoft.com/office/drawing/2014/main" id="{46029A87-6CFA-DD2B-2950-D6969EEE4947}"/>
               </a:ext>
             </a:extLst>
           </p:cNvPr>
@@ -8115,7 +8323,7 @@
         </p:nvSpPr>
         <p:spPr>
           <a:xfrm>
-            <a:off x="5390087" y="5903264"/>
+            <a:off x="9088264" y="4701981"/>
             <a:ext cx="2061169" cy="478186"/>
           </a:xfrm>
           <a:custGeom>
@@ -8388,10 +8596,10 @@
       </p:sp>
       <p:sp>
         <p:nvSpPr>
-          <p:cNvPr id="88" name="Trapezoid 87">
+          <p:cNvPr id="108" name="Trapezoid 107">
             <a:extLst>
               <a:ext uri="{FF2B5EF4-FFF2-40B4-BE49-F238E27FC236}">
-                <a16:creationId xmlns:a16="http://schemas.microsoft.com/office/drawing/2014/main" id="{951B3737-FAAE-4B96-A28C-DD5E0C970115}"/>
+                <a16:creationId xmlns:a16="http://schemas.microsoft.com/office/drawing/2014/main" id="{13CC25A1-F1D5-79BE-D864-4AD9F76C67B6}"/>
               </a:ext>
             </a:extLst>
           </p:cNvPr>
@@ -8400,7 +8608,7 @@
         </p:nvSpPr>
         <p:spPr>
           <a:xfrm>
-            <a:off x="5063036" y="5895245"/>
+            <a:off x="8761213" y="4693962"/>
             <a:ext cx="446680" cy="494223"/>
           </a:xfrm>
           <a:prstGeom prst="trapezoid">
@@ -8436,10 +8644,10 @@
       </p:sp>
       <p:sp>
         <p:nvSpPr>
-          <p:cNvPr id="89" name="Trapezoid 88">
+          <p:cNvPr id="109" name="Trapezoid 108">
             <a:extLst>
               <a:ext uri="{FF2B5EF4-FFF2-40B4-BE49-F238E27FC236}">
-                <a16:creationId xmlns:a16="http://schemas.microsoft.com/office/drawing/2014/main" id="{609701B6-C006-26E2-E503-1AE5FF5F37CD}"/>
+                <a16:creationId xmlns:a16="http://schemas.microsoft.com/office/drawing/2014/main" id="{E059C6A5-661B-3388-3BCD-6C9A854C349F}"/>
               </a:ext>
             </a:extLst>
           </p:cNvPr>
@@ -8448,7 +8656,7 @@
         </p:nvSpPr>
         <p:spPr>
           <a:xfrm>
-            <a:off x="7151716" y="5856213"/>
+            <a:off x="10849893" y="4654930"/>
             <a:ext cx="599080" cy="553999"/>
           </a:xfrm>
           <a:prstGeom prst="trapezoid">
@@ -8484,10 +8692,10 @@
       </p:sp>
       <p:sp>
         <p:nvSpPr>
-          <p:cNvPr id="90" name="TextBox 89">
+          <p:cNvPr id="110" name="TextBox 109">
             <a:extLst>
               <a:ext uri="{FF2B5EF4-FFF2-40B4-BE49-F238E27FC236}">
-                <a16:creationId xmlns:a16="http://schemas.microsoft.com/office/drawing/2014/main" id="{91287C8E-24EC-E1E0-AA25-2F8ACC675320}"/>
+                <a16:creationId xmlns:a16="http://schemas.microsoft.com/office/drawing/2014/main" id="{FE947F01-E0A5-F44B-7D59-A05EB2A6FB6E}"/>
               </a:ext>
             </a:extLst>
           </p:cNvPr>
@@ -8496,13 +8704,17 @@
         </p:nvSpPr>
         <p:spPr>
           <a:xfrm>
-            <a:off x="7866040" y="5641889"/>
-            <a:ext cx="2158849" cy="400110"/>
+            <a:off x="8644164" y="5524688"/>
+            <a:ext cx="2692067" cy="461665"/>
           </a:xfrm>
           <a:prstGeom prst="rect">
             <a:avLst/>
           </a:prstGeom>
-          <a:noFill/>
+          <a:solidFill>
+            <a:schemeClr val="bg1">
+              <a:lumMod val="95000"/>
+            </a:schemeClr>
+          </a:solidFill>
         </p:spPr>
         <p:txBody>
           <a:bodyPr wrap="square" rtlCol="0">
@@ -8525,13 +8737,13 @@
           </a:lstStyle>
           <a:p>
             <a:r>
-              <a:rPr lang="en-US" sz="1000" b="1" dirty="0"/>
+              <a:rPr lang="en-US" b="1" dirty="0"/>
               <a:t>Shape Format</a:t>
             </a:r>
           </a:p>
           <a:p>
             <a:r>
-              <a:rPr lang="en-US" sz="1000" dirty="0"/>
+              <a:rPr lang="en-US" dirty="0"/>
               <a:t>	Merge Shapes-&gt; Fragment</a:t>
             </a:r>
           </a:p>
@@ -8539,10 +8751,10 @@
       </p:sp>
       <p:sp>
         <p:nvSpPr>
-          <p:cNvPr id="98" name="Freeform: Shape 97">
+          <p:cNvPr id="111" name="Freeform: Shape 110">
             <a:extLst>
               <a:ext uri="{FF2B5EF4-FFF2-40B4-BE49-F238E27FC236}">
-                <a16:creationId xmlns:a16="http://schemas.microsoft.com/office/drawing/2014/main" id="{BD102AD4-21B3-4228-49A8-5A3523C2431C}"/>
+                <a16:creationId xmlns:a16="http://schemas.microsoft.com/office/drawing/2014/main" id="{C42F8C56-013B-092F-0CEB-5F9D0A210F34}"/>
               </a:ext>
             </a:extLst>
           </p:cNvPr>
@@ -8551,7 +8763,7 @@
         </p:nvSpPr>
         <p:spPr>
           <a:xfrm>
-            <a:off x="11598616" y="5349013"/>
+            <a:off x="10517700" y="6406212"/>
             <a:ext cx="155270" cy="492931"/>
           </a:xfrm>
           <a:custGeom>
@@ -8670,10 +8882,10 @@
       </p:sp>
       <p:sp>
         <p:nvSpPr>
-          <p:cNvPr id="97" name="Freeform: Shape 96">
+          <p:cNvPr id="112" name="Freeform: Shape 111">
             <a:extLst>
               <a:ext uri="{FF2B5EF4-FFF2-40B4-BE49-F238E27FC236}">
-                <a16:creationId xmlns:a16="http://schemas.microsoft.com/office/drawing/2014/main" id="{422ACB92-045D-BA52-5503-8519CA7B226B}"/>
+                <a16:creationId xmlns:a16="http://schemas.microsoft.com/office/drawing/2014/main" id="{114FC3D0-ECAA-DD68-59E7-2ED180497ABC}"/>
               </a:ext>
             </a:extLst>
           </p:cNvPr>
@@ -8682,7 +8894,7 @@
         </p:nvSpPr>
         <p:spPr>
           <a:xfrm>
-            <a:off x="10252009" y="5527294"/>
+            <a:off x="9171093" y="6584493"/>
             <a:ext cx="170179" cy="118232"/>
           </a:xfrm>
           <a:custGeom>
@@ -8801,10 +9013,10 @@
       </p:sp>
       <p:sp>
         <p:nvSpPr>
-          <p:cNvPr id="96" name="Freeform: Shape 95">
+          <p:cNvPr id="113" name="Freeform: Shape 112">
             <a:extLst>
               <a:ext uri="{FF2B5EF4-FFF2-40B4-BE49-F238E27FC236}">
-                <a16:creationId xmlns:a16="http://schemas.microsoft.com/office/drawing/2014/main" id="{04D22514-B84D-5B47-F1EB-66C0F261419C}"/>
+                <a16:creationId xmlns:a16="http://schemas.microsoft.com/office/drawing/2014/main" id="{533C18CB-E7B3-FD39-CD65-6BC1D959034D}"/>
               </a:ext>
             </a:extLst>
           </p:cNvPr>
@@ -8813,7 +9025,7 @@
         </p:nvSpPr>
         <p:spPr>
           <a:xfrm>
-            <a:off x="11598616" y="5290397"/>
+            <a:off x="10517700" y="6347596"/>
             <a:ext cx="436522" cy="582128"/>
           </a:xfrm>
           <a:custGeom>
@@ -8964,10 +9176,10 @@
       </p:sp>
       <p:sp>
         <p:nvSpPr>
-          <p:cNvPr id="95" name="Freeform: Shape 94">
+          <p:cNvPr id="114" name="Freeform: Shape 113">
             <a:extLst>
               <a:ext uri="{FF2B5EF4-FFF2-40B4-BE49-F238E27FC236}">
-                <a16:creationId xmlns:a16="http://schemas.microsoft.com/office/drawing/2014/main" id="{11C79DAF-4D4D-AEA3-2C75-F1667879B53D}"/>
+                <a16:creationId xmlns:a16="http://schemas.microsoft.com/office/drawing/2014/main" id="{BAE9EB97-0639-8BD9-1AD1-23D5A8AFA741}"/>
               </a:ext>
             </a:extLst>
           </p:cNvPr>
@@ -8976,7 +9188,7 @@
         </p:nvSpPr>
         <p:spPr>
           <a:xfrm>
-            <a:off x="10096713" y="5341297"/>
+            <a:off x="9015797" y="6398496"/>
             <a:ext cx="325475" cy="519317"/>
           </a:xfrm>
           <a:custGeom>
@@ -9127,10 +9339,10 @@
       </p:sp>
       <p:sp>
         <p:nvSpPr>
-          <p:cNvPr id="94" name="Freeform: Shape 93">
+          <p:cNvPr id="115" name="Freeform: Shape 114">
             <a:extLst>
               <a:ext uri="{FF2B5EF4-FFF2-40B4-BE49-F238E27FC236}">
-                <a16:creationId xmlns:a16="http://schemas.microsoft.com/office/drawing/2014/main" id="{3D196C7A-21F5-6F89-83D7-0EA73AC566D2}"/>
+                <a16:creationId xmlns:a16="http://schemas.microsoft.com/office/drawing/2014/main" id="{AA3508BE-23A9-87C2-26E9-8D3BC093A14F}"/>
               </a:ext>
             </a:extLst>
           </p:cNvPr>
@@ -9139,7 +9351,7 @@
         </p:nvSpPr>
         <p:spPr>
           <a:xfrm>
-            <a:off x="10422187" y="5341296"/>
+            <a:off x="9341271" y="6398495"/>
             <a:ext cx="1176429" cy="502467"/>
           </a:xfrm>
           <a:custGeom>
@@ -9412,10 +9624,10 @@
       </p:sp>
       <p:sp>
         <p:nvSpPr>
-          <p:cNvPr id="99" name="TextBox 98">
+          <p:cNvPr id="116" name="TextBox 115">
             <a:extLst>
               <a:ext uri="{FF2B5EF4-FFF2-40B4-BE49-F238E27FC236}">
-                <a16:creationId xmlns:a16="http://schemas.microsoft.com/office/drawing/2014/main" id="{1DF364E6-79B1-60C6-ECFF-B07336F74257}"/>
+                <a16:creationId xmlns:a16="http://schemas.microsoft.com/office/drawing/2014/main" id="{750D8AC7-6D06-FE15-91C3-EEB80A8912C2}"/>
               </a:ext>
             </a:extLst>
           </p:cNvPr>
@@ -9424,8 +9636,8 @@
         </p:nvSpPr>
         <p:spPr>
           <a:xfrm>
-            <a:off x="10477444" y="5933113"/>
-            <a:ext cx="945397" cy="400110"/>
+            <a:off x="9385572" y="7129407"/>
+            <a:ext cx="945397" cy="461665"/>
           </a:xfrm>
           <a:prstGeom prst="rect">
             <a:avLst/>
@@ -9453,7 +9665,7 @@
           </a:lstStyle>
           <a:p>
             <a:r>
-              <a:rPr lang="en-US" sz="1000" i="1" dirty="0"/>
+              <a:rPr lang="en-US" i="1" dirty="0"/>
               <a:t>Delete extra fragments</a:t>
             </a:r>
           </a:p>
@@ -9461,10 +9673,10 @@
       </p:sp>
       <p:sp>
         <p:nvSpPr>
-          <p:cNvPr id="100" name="Freeform: Shape 99">
+          <p:cNvPr id="117" name="Freeform: Shape 116">
             <a:extLst>
               <a:ext uri="{FF2B5EF4-FFF2-40B4-BE49-F238E27FC236}">
-                <a16:creationId xmlns:a16="http://schemas.microsoft.com/office/drawing/2014/main" id="{F9ADACBE-22BE-03E9-BDA3-F8EF7487D391}"/>
+                <a16:creationId xmlns:a16="http://schemas.microsoft.com/office/drawing/2014/main" id="{9A156FE7-CAC1-157A-A9BF-114B1F62E4B5}"/>
               </a:ext>
             </a:extLst>
           </p:cNvPr>
@@ -9473,7 +9685,7 @@
         </p:nvSpPr>
         <p:spPr>
           <a:xfrm>
-            <a:off x="10304290" y="6328613"/>
+            <a:off x="9309265" y="8139131"/>
             <a:ext cx="1176429" cy="502467"/>
           </a:xfrm>
           <a:custGeom>
@@ -9716,6 +9928,15 @@
               </a:path>
             </a:pathLst>
           </a:custGeom>
+          <a:solidFill>
+            <a:schemeClr val="accent1">
+              <a:lumMod val="40000"/>
+              <a:lumOff val="60000"/>
+            </a:schemeClr>
+          </a:solidFill>
+          <a:ln>
+            <a:noFill/>
+          </a:ln>
         </p:spPr>
         <p:style>
           <a:lnRef idx="2">
@@ -9746,10 +9967,10 @@
       </p:sp>
       <p:sp>
         <p:nvSpPr>
-          <p:cNvPr id="101" name="TextBox 100">
+          <p:cNvPr id="118" name="TextBox 117">
             <a:extLst>
               <a:ext uri="{FF2B5EF4-FFF2-40B4-BE49-F238E27FC236}">
-                <a16:creationId xmlns:a16="http://schemas.microsoft.com/office/drawing/2014/main" id="{74B83F86-6E0F-0690-756A-7B1437F69967}"/>
+                <a16:creationId xmlns:a16="http://schemas.microsoft.com/office/drawing/2014/main" id="{0E4CC558-9892-ED78-9E56-B782F057407E}"/>
               </a:ext>
             </a:extLst>
           </p:cNvPr>
@@ -9758,13 +9979,17 @@
         </p:nvSpPr>
         <p:spPr>
           <a:xfrm>
-            <a:off x="10864112" y="4542496"/>
-            <a:ext cx="1031428" cy="400110"/>
+            <a:off x="8644164" y="2798722"/>
+            <a:ext cx="2158849" cy="276999"/>
           </a:xfrm>
           <a:prstGeom prst="rect">
             <a:avLst/>
           </a:prstGeom>
-          <a:noFill/>
+          <a:solidFill>
+            <a:schemeClr val="bg1">
+              <a:lumMod val="95000"/>
+            </a:schemeClr>
+          </a:solidFill>
         </p:spPr>
         <p:txBody>
           <a:bodyPr wrap="square" rtlCol="0">
@@ -9787,16 +10012,17 @@
           </a:lstStyle>
           <a:p>
             <a:r>
-              <a:rPr lang="en-US" sz="1000" i="1" dirty="0"/>
-              <a:t>Duplicate and resize as needed</a:t>
-            </a:r>
+              <a:rPr lang="en-US" b="1" dirty="0"/>
+              <a:t>Insert -&gt; Shapes</a:t>
+            </a:r>
+            <a:endParaRPr lang="en-US" dirty="0"/>
           </a:p>
         </p:txBody>
       </p:sp>
     </p:spTree>
     <p:extLst>
       <p:ext uri="{BB962C8B-B14F-4D97-AF65-F5344CB8AC3E}">
-        <p14:creationId xmlns:p14="http://schemas.microsoft.com/office/powerpoint/2010/main" val="1504918110"/>
+        <p14:creationId xmlns:p14="http://schemas.microsoft.com/office/powerpoint/2010/main" val="1626891677"/>
       </p:ext>
     </p:extLst>
   </p:cSld>
@@ -9823,597 +10049,10 @@
           <a:chExt cx="0" cy="0"/>
         </a:xfrm>
       </p:grpSpPr>
-      <p:sp>
-        <p:nvSpPr>
-          <p:cNvPr id="6" name="Rectangle: Rounded Corners 5">
-            <a:extLst>
-              <a:ext uri="{FF2B5EF4-FFF2-40B4-BE49-F238E27FC236}">
-                <a16:creationId xmlns:a16="http://schemas.microsoft.com/office/drawing/2014/main" id="{D501BE1E-ABD1-4ADB-9886-F98D1D152089}"/>
-              </a:ext>
-            </a:extLst>
-          </p:cNvPr>
-          <p:cNvSpPr/>
-          <p:nvPr/>
-        </p:nvSpPr>
-        <p:spPr>
-          <a:xfrm>
-            <a:off x="8267486" y="3366719"/>
-            <a:ext cx="3459167" cy="447510"/>
-          </a:xfrm>
-          <a:prstGeom prst="roundRect">
-            <a:avLst/>
-          </a:prstGeom>
-          <a:solidFill>
-            <a:schemeClr val="accent2">
-              <a:lumMod val="75000"/>
-            </a:schemeClr>
-          </a:solidFill>
-          <a:ln>
-            <a:noFill/>
-          </a:ln>
-        </p:spPr>
-        <p:style>
-          <a:lnRef idx="2">
-            <a:schemeClr val="accent1">
-              <a:shade val="50000"/>
-            </a:schemeClr>
-          </a:lnRef>
-          <a:fillRef idx="1">
-            <a:schemeClr val="accent1"/>
-          </a:fillRef>
-          <a:effectRef idx="0">
-            <a:schemeClr val="accent1"/>
-          </a:effectRef>
-          <a:fontRef idx="minor">
-            <a:schemeClr val="lt1"/>
-          </a:fontRef>
-        </p:style>
-        <p:txBody>
-          <a:bodyPr rtlCol="0" anchor="ctr"/>
-          <a:lstStyle/>
-          <a:p>
-            <a:pPr algn="ctr"/>
-            <a:endParaRPr lang="en-US"/>
-          </a:p>
-        </p:txBody>
-      </p:sp>
-      <p:sp>
-        <p:nvSpPr>
-          <p:cNvPr id="54" name="Trapezoid 53">
-            <a:extLst>
-              <a:ext uri="{FF2B5EF4-FFF2-40B4-BE49-F238E27FC236}">
-                <a16:creationId xmlns:a16="http://schemas.microsoft.com/office/drawing/2014/main" id="{FC048B2B-FFC2-4D93-8364-935B279B5413}"/>
-              </a:ext>
-            </a:extLst>
-          </p:cNvPr>
-          <p:cNvSpPr/>
-          <p:nvPr/>
-        </p:nvSpPr>
-        <p:spPr>
-          <a:xfrm rot="10638806">
-            <a:off x="2895186" y="1974739"/>
-            <a:ext cx="4314118" cy="1565250"/>
-          </a:xfrm>
-          <a:prstGeom prst="trapezoid">
-            <a:avLst>
-              <a:gd name="adj" fmla="val 28903"/>
-            </a:avLst>
-          </a:prstGeom>
-          <a:gradFill flip="none" rotWithShape="1">
-            <a:gsLst>
-              <a:gs pos="0">
-                <a:srgbClr val="996633">
-                  <a:shade val="30000"/>
-                  <a:satMod val="115000"/>
-                </a:srgbClr>
-              </a:gs>
-              <a:gs pos="50000">
-                <a:srgbClr val="996633">
-                  <a:shade val="67500"/>
-                  <a:satMod val="115000"/>
-                </a:srgbClr>
-              </a:gs>
-              <a:gs pos="100000">
-                <a:srgbClr val="996633">
-                  <a:shade val="100000"/>
-                  <a:satMod val="115000"/>
-                </a:srgbClr>
-              </a:gs>
-            </a:gsLst>
-            <a:lin ang="5400000" scaled="1"/>
-            <a:tileRect/>
-          </a:gradFill>
-          <a:ln>
-            <a:noFill/>
-          </a:ln>
-          <a:effectLst/>
-        </p:spPr>
-        <p:style>
-          <a:lnRef idx="2">
-            <a:schemeClr val="accent1">
-              <a:shade val="50000"/>
-            </a:schemeClr>
-          </a:lnRef>
-          <a:fillRef idx="1">
-            <a:schemeClr val="accent1"/>
-          </a:fillRef>
-          <a:effectRef idx="0">
-            <a:schemeClr val="accent1"/>
-          </a:effectRef>
-          <a:fontRef idx="minor">
-            <a:schemeClr val="lt1"/>
-          </a:fontRef>
-        </p:style>
-        <p:txBody>
-          <a:bodyPr rot="0" spcFirstLastPara="0" vertOverflow="overflow" horzOverflow="overflow" vert="horz" wrap="square" lIns="91440" tIns="45720" rIns="91440" bIns="45720" numCol="1" spcCol="0" rtlCol="0" fromWordArt="0" anchor="ctr" anchorCtr="0" forceAA="0" compatLnSpc="1">
-            <a:prstTxWarp prst="textNoShape">
-              <a:avLst/>
-            </a:prstTxWarp>
-            <a:noAutofit/>
-          </a:bodyPr>
-          <a:lstStyle/>
-          <a:p>
-            <a:pPr algn="ctr"/>
-            <a:endParaRPr lang="en-US"/>
-          </a:p>
-        </p:txBody>
-      </p:sp>
-      <p:sp>
-        <p:nvSpPr>
-          <p:cNvPr id="55" name="Trapezoid 54">
-            <a:extLst>
-              <a:ext uri="{FF2B5EF4-FFF2-40B4-BE49-F238E27FC236}">
-                <a16:creationId xmlns:a16="http://schemas.microsoft.com/office/drawing/2014/main" id="{6A25DF6B-F8CE-4E8A-B91A-2421A69FAE65}"/>
-              </a:ext>
-            </a:extLst>
-          </p:cNvPr>
-          <p:cNvSpPr/>
-          <p:nvPr/>
-        </p:nvSpPr>
-        <p:spPr>
-          <a:xfrm rot="182664">
-            <a:off x="2826690" y="3662291"/>
-            <a:ext cx="4466493" cy="1687394"/>
-          </a:xfrm>
-          <a:prstGeom prst="trapezoid">
-            <a:avLst>
-              <a:gd name="adj" fmla="val 31820"/>
-            </a:avLst>
-          </a:prstGeom>
-          <a:gradFill flip="none" rotWithShape="1">
-            <a:gsLst>
-              <a:gs pos="0">
-                <a:srgbClr val="996633">
-                  <a:shade val="30000"/>
-                  <a:satMod val="115000"/>
-                </a:srgbClr>
-              </a:gs>
-              <a:gs pos="50000">
-                <a:srgbClr val="996633">
-                  <a:shade val="67500"/>
-                  <a:satMod val="115000"/>
-                </a:srgbClr>
-              </a:gs>
-              <a:gs pos="100000">
-                <a:srgbClr val="996633">
-                  <a:shade val="100000"/>
-                  <a:satMod val="115000"/>
-                </a:srgbClr>
-              </a:gs>
-            </a:gsLst>
-            <a:lin ang="5400000" scaled="1"/>
-            <a:tileRect/>
-          </a:gradFill>
-          <a:ln>
-            <a:noFill/>
-          </a:ln>
-          <a:effectLst/>
-        </p:spPr>
-        <p:style>
-          <a:lnRef idx="2">
-            <a:schemeClr val="accent1">
-              <a:shade val="50000"/>
-            </a:schemeClr>
-          </a:lnRef>
-          <a:fillRef idx="1">
-            <a:schemeClr val="accent1"/>
-          </a:fillRef>
-          <a:effectRef idx="0">
-            <a:schemeClr val="accent1"/>
-          </a:effectRef>
-          <a:fontRef idx="minor">
-            <a:schemeClr val="lt1"/>
-          </a:fontRef>
-        </p:style>
-        <p:txBody>
-          <a:bodyPr rot="0" spcFirstLastPara="0" vertOverflow="overflow" horzOverflow="overflow" vert="horz" wrap="square" lIns="91440" tIns="45720" rIns="91440" bIns="45720" numCol="1" spcCol="0" rtlCol="0" fromWordArt="0" anchor="ctr" anchorCtr="0" forceAA="0" compatLnSpc="1">
-            <a:prstTxWarp prst="textNoShape">
-              <a:avLst/>
-            </a:prstTxWarp>
-            <a:noAutofit/>
-          </a:bodyPr>
-          <a:lstStyle/>
-          <a:p>
-            <a:pPr algn="ctr"/>
-            <a:endParaRPr lang="en-US"/>
-          </a:p>
-        </p:txBody>
-      </p:sp>
-      <p:sp>
-        <p:nvSpPr>
-          <p:cNvPr id="499" name="Freeform: Shape 498">
-            <a:extLst>
-              <a:ext uri="{FF2B5EF4-FFF2-40B4-BE49-F238E27FC236}">
-                <a16:creationId xmlns:a16="http://schemas.microsoft.com/office/drawing/2014/main" id="{FD023574-B892-4488-82E5-B209D985F129}"/>
-              </a:ext>
-            </a:extLst>
-          </p:cNvPr>
-          <p:cNvSpPr/>
-          <p:nvPr/>
-        </p:nvSpPr>
-        <p:spPr>
-          <a:xfrm>
-            <a:off x="8296914" y="2602309"/>
-            <a:ext cx="3429739" cy="764411"/>
-          </a:xfrm>
-          <a:custGeom>
-            <a:avLst/>
-            <a:gdLst>
-              <a:gd name="connsiteX0" fmla="*/ 3344175 w 3344175"/>
-              <a:gd name="connsiteY0" fmla="*/ 0 h 764411"/>
-              <a:gd name="connsiteX1" fmla="*/ 3344175 w 3344175"/>
-              <a:gd name="connsiteY1" fmla="*/ 764411 h 764411"/>
-              <a:gd name="connsiteX2" fmla="*/ 3337121 w 3344175"/>
-              <a:gd name="connsiteY2" fmla="*/ 754689 h 764411"/>
-              <a:gd name="connsiteX3" fmla="*/ 3169509 w 3344175"/>
-              <a:gd name="connsiteY3" fmla="*/ 498897 h 764411"/>
-              <a:gd name="connsiteX4" fmla="*/ 2682812 w 3344175"/>
-              <a:gd name="connsiteY4" fmla="*/ 580013 h 764411"/>
-              <a:gd name="connsiteX5" fmla="*/ 2262483 w 3344175"/>
-              <a:gd name="connsiteY5" fmla="*/ 344039 h 764411"/>
-              <a:gd name="connsiteX6" fmla="*/ 1569309 w 3344175"/>
-              <a:gd name="connsiteY6" fmla="*/ 417781 h 764411"/>
-              <a:gd name="connsiteX7" fmla="*/ 1311212 w 3344175"/>
-              <a:gd name="connsiteY7" fmla="*/ 292420 h 764411"/>
-              <a:gd name="connsiteX8" fmla="*/ 802393 w 3344175"/>
-              <a:gd name="connsiteY8" fmla="*/ 403033 h 764411"/>
-              <a:gd name="connsiteX9" fmla="*/ 382064 w 3344175"/>
-              <a:gd name="connsiteY9" fmla="*/ 321917 h 764411"/>
-              <a:gd name="connsiteX10" fmla="*/ 2481 w 3344175"/>
-              <a:gd name="connsiteY10" fmla="*/ 378224 h 764411"/>
-              <a:gd name="connsiteX11" fmla="*/ 0 w 3344175"/>
-              <a:gd name="connsiteY11" fmla="*/ 378817 h 764411"/>
-              <a:gd name="connsiteX12" fmla="*/ 0 w 3344175"/>
-              <a:gd name="connsiteY12" fmla="*/ 149790 h 764411"/>
-              <a:gd name="connsiteX13" fmla="*/ 60768 w 3344175"/>
-              <a:gd name="connsiteY13" fmla="*/ 159339 h 764411"/>
-              <a:gd name="connsiteX14" fmla="*/ 359941 w 3344175"/>
-              <a:gd name="connsiteY14" fmla="*/ 226052 h 764411"/>
-              <a:gd name="connsiteX15" fmla="*/ 699154 w 3344175"/>
-              <a:gd name="connsiteY15" fmla="*/ 137562 h 764411"/>
-              <a:gd name="connsiteX16" fmla="*/ 942503 w 3344175"/>
-              <a:gd name="connsiteY16" fmla="*/ 211304 h 764411"/>
-              <a:gd name="connsiteX17" fmla="*/ 1274341 w 3344175"/>
-              <a:gd name="connsiteY17" fmla="*/ 108065 h 764411"/>
-              <a:gd name="connsiteX18" fmla="*/ 1547186 w 3344175"/>
-              <a:gd name="connsiteY18" fmla="*/ 262923 h 764411"/>
-              <a:gd name="connsiteX19" fmla="*/ 2048632 w 3344175"/>
-              <a:gd name="connsiteY19" fmla="*/ 78568 h 764411"/>
-              <a:gd name="connsiteX20" fmla="*/ 2306728 w 3344175"/>
-              <a:gd name="connsiteY20" fmla="*/ 174433 h 764411"/>
-              <a:gd name="connsiteX21" fmla="*/ 2616445 w 3344175"/>
-              <a:gd name="connsiteY21" fmla="*/ 63820 h 764411"/>
-              <a:gd name="connsiteX22" fmla="*/ 2911412 w 3344175"/>
-              <a:gd name="connsiteY22" fmla="*/ 159684 h 764411"/>
-              <a:gd name="connsiteX23" fmla="*/ 3243251 w 3344175"/>
-              <a:gd name="connsiteY23" fmla="*/ 34323 h 764411"/>
-              <a:gd name="connsiteX24" fmla="*/ 3343609 w 3344175"/>
-              <a:gd name="connsiteY24" fmla="*/ 217 h 764411"/>
-              <a:gd name="connsiteX25" fmla="*/ 3344175 w 3344175"/>
-              <a:gd name="connsiteY25" fmla="*/ 0 h 764411"/>
-            </a:gdLst>
-            <a:ahLst/>
-            <a:cxnLst>
-              <a:cxn ang="0">
-                <a:pos x="connsiteX0" y="connsiteY0"/>
-              </a:cxn>
-              <a:cxn ang="0">
-                <a:pos x="connsiteX1" y="connsiteY1"/>
-              </a:cxn>
-              <a:cxn ang="0">
-                <a:pos x="connsiteX2" y="connsiteY2"/>
-              </a:cxn>
-              <a:cxn ang="0">
-                <a:pos x="connsiteX3" y="connsiteY3"/>
-              </a:cxn>
-              <a:cxn ang="0">
-                <a:pos x="connsiteX4" y="connsiteY4"/>
-              </a:cxn>
-              <a:cxn ang="0">
-                <a:pos x="connsiteX5" y="connsiteY5"/>
-              </a:cxn>
-              <a:cxn ang="0">
-                <a:pos x="connsiteX6" y="connsiteY6"/>
-              </a:cxn>
-              <a:cxn ang="0">
-                <a:pos x="connsiteX7" y="connsiteY7"/>
-              </a:cxn>
-              <a:cxn ang="0">
-                <a:pos x="connsiteX8" y="connsiteY8"/>
-              </a:cxn>
-              <a:cxn ang="0">
-                <a:pos x="connsiteX9" y="connsiteY9"/>
-              </a:cxn>
-              <a:cxn ang="0">
-                <a:pos x="connsiteX10" y="connsiteY10"/>
-              </a:cxn>
-              <a:cxn ang="0">
-                <a:pos x="connsiteX11" y="connsiteY11"/>
-              </a:cxn>
-              <a:cxn ang="0">
-                <a:pos x="connsiteX12" y="connsiteY12"/>
-              </a:cxn>
-              <a:cxn ang="0">
-                <a:pos x="connsiteX13" y="connsiteY13"/>
-              </a:cxn>
-              <a:cxn ang="0">
-                <a:pos x="connsiteX14" y="connsiteY14"/>
-              </a:cxn>
-              <a:cxn ang="0">
-                <a:pos x="connsiteX15" y="connsiteY15"/>
-              </a:cxn>
-              <a:cxn ang="0">
-                <a:pos x="connsiteX16" y="connsiteY16"/>
-              </a:cxn>
-              <a:cxn ang="0">
-                <a:pos x="connsiteX17" y="connsiteY17"/>
-              </a:cxn>
-              <a:cxn ang="0">
-                <a:pos x="connsiteX18" y="connsiteY18"/>
-              </a:cxn>
-              <a:cxn ang="0">
-                <a:pos x="connsiteX19" y="connsiteY19"/>
-              </a:cxn>
-              <a:cxn ang="0">
-                <a:pos x="connsiteX20" y="connsiteY20"/>
-              </a:cxn>
-              <a:cxn ang="0">
-                <a:pos x="connsiteX21" y="connsiteY21"/>
-              </a:cxn>
-              <a:cxn ang="0">
-                <a:pos x="connsiteX22" y="connsiteY22"/>
-              </a:cxn>
-              <a:cxn ang="0">
-                <a:pos x="connsiteX23" y="connsiteY23"/>
-              </a:cxn>
-              <a:cxn ang="0">
-                <a:pos x="connsiteX24" y="connsiteY24"/>
-              </a:cxn>
-              <a:cxn ang="0">
-                <a:pos x="connsiteX25" y="connsiteY25"/>
-              </a:cxn>
-            </a:cxnLst>
-            <a:rect l="l" t="t" r="r" b="b"/>
-            <a:pathLst>
-              <a:path w="3344175" h="764411">
-                <a:moveTo>
-                  <a:pt x="3344175" y="0"/>
-                </a:moveTo>
-                <a:lnTo>
-                  <a:pt x="3344175" y="764411"/>
-                </a:lnTo>
-                <a:lnTo>
-                  <a:pt x="3337121" y="754689"/>
-                </a:lnTo>
-                <a:cubicBezTo>
-                  <a:pt x="3273209" y="648301"/>
-                  <a:pt x="3257846" y="534232"/>
-                  <a:pt x="3169509" y="498897"/>
-                </a:cubicBezTo>
-                <a:cubicBezTo>
-                  <a:pt x="3028170" y="442362"/>
-                  <a:pt x="2833983" y="605823"/>
-                  <a:pt x="2682812" y="580013"/>
-                </a:cubicBezTo>
-                <a:cubicBezTo>
-                  <a:pt x="2531641" y="554203"/>
-                  <a:pt x="2448067" y="371078"/>
-                  <a:pt x="2262483" y="344039"/>
-                </a:cubicBezTo>
-                <a:cubicBezTo>
-                  <a:pt x="2076899" y="317000"/>
-                  <a:pt x="1727854" y="426384"/>
-                  <a:pt x="1569309" y="417781"/>
-                </a:cubicBezTo>
-                <a:cubicBezTo>
-                  <a:pt x="1410764" y="409178"/>
-                  <a:pt x="1439031" y="294878"/>
-                  <a:pt x="1311212" y="292420"/>
-                </a:cubicBezTo>
-                <a:cubicBezTo>
-                  <a:pt x="1183393" y="289962"/>
-                  <a:pt x="957251" y="398117"/>
-                  <a:pt x="802393" y="403033"/>
-                </a:cubicBezTo>
-                <a:cubicBezTo>
-                  <a:pt x="647535" y="407949"/>
-                  <a:pt x="517257" y="325604"/>
-                  <a:pt x="382064" y="321917"/>
-                </a:cubicBezTo>
-                <a:cubicBezTo>
-                  <a:pt x="263770" y="318691"/>
-                  <a:pt x="53260" y="366277"/>
-                  <a:pt x="2481" y="378224"/>
-                </a:cubicBezTo>
-                <a:lnTo>
-                  <a:pt x="0" y="378817"/>
-                </a:lnTo>
-                <a:lnTo>
-                  <a:pt x="0" y="149790"/>
-                </a:lnTo>
-                <a:lnTo>
-                  <a:pt x="60768" y="159339"/>
-                </a:lnTo>
-                <a:cubicBezTo>
-                  <a:pt x="158073" y="182959"/>
-                  <a:pt x="268686" y="226974"/>
-                  <a:pt x="359941" y="226052"/>
-                </a:cubicBezTo>
-                <a:cubicBezTo>
-                  <a:pt x="481615" y="224823"/>
-                  <a:pt x="602060" y="140020"/>
-                  <a:pt x="699154" y="137562"/>
-                </a:cubicBezTo>
-                <a:cubicBezTo>
-                  <a:pt x="796248" y="135104"/>
-                  <a:pt x="846639" y="216220"/>
-                  <a:pt x="942503" y="211304"/>
-                </a:cubicBezTo>
-                <a:cubicBezTo>
-                  <a:pt x="1038367" y="206388"/>
-                  <a:pt x="1173561" y="99462"/>
-                  <a:pt x="1274341" y="108065"/>
-                </a:cubicBezTo>
-                <a:cubicBezTo>
-                  <a:pt x="1375121" y="116668"/>
-                  <a:pt x="1418138" y="267839"/>
-                  <a:pt x="1547186" y="262923"/>
-                </a:cubicBezTo>
-                <a:cubicBezTo>
-                  <a:pt x="1676234" y="258007"/>
-                  <a:pt x="1922042" y="93316"/>
-                  <a:pt x="2048632" y="78568"/>
-                </a:cubicBezTo>
-                <a:cubicBezTo>
-                  <a:pt x="2175222" y="63820"/>
-                  <a:pt x="2212093" y="176891"/>
-                  <a:pt x="2306728" y="174433"/>
-                </a:cubicBezTo>
-                <a:cubicBezTo>
-                  <a:pt x="2401363" y="171975"/>
-                  <a:pt x="2515664" y="66278"/>
-                  <a:pt x="2616445" y="63820"/>
-                </a:cubicBezTo>
-                <a:cubicBezTo>
-                  <a:pt x="2717226" y="61362"/>
-                  <a:pt x="2806944" y="164600"/>
-                  <a:pt x="2911412" y="159684"/>
-                </a:cubicBezTo>
-                <a:cubicBezTo>
-                  <a:pt x="3015880" y="154768"/>
-                  <a:pt x="3087164" y="76110"/>
-                  <a:pt x="3243251" y="34323"/>
-                </a:cubicBezTo>
-                <a:cubicBezTo>
-                  <a:pt x="3282273" y="23876"/>
-                  <a:pt x="3312922" y="12201"/>
-                  <a:pt x="3343609" y="217"/>
-                </a:cubicBezTo>
-                <a:lnTo>
-                  <a:pt x="3344175" y="0"/>
-                </a:lnTo>
-                <a:close/>
-              </a:path>
-            </a:pathLst>
-          </a:custGeom>
-          <a:solidFill>
-            <a:srgbClr val="5B9BD5">
-              <a:alpha val="60000"/>
-            </a:srgbClr>
-          </a:solidFill>
-          <a:ln>
-            <a:noFill/>
-          </a:ln>
-        </p:spPr>
-        <p:style>
-          <a:lnRef idx="2">
-            <a:schemeClr val="accent1">
-              <a:shade val="50000"/>
-            </a:schemeClr>
-          </a:lnRef>
-          <a:fillRef idx="1">
-            <a:schemeClr val="accent1"/>
-          </a:fillRef>
-          <a:effectRef idx="0">
-            <a:schemeClr val="accent1"/>
-          </a:effectRef>
-          <a:fontRef idx="minor">
-            <a:schemeClr val="lt1"/>
-          </a:fontRef>
-        </p:style>
-        <p:txBody>
-          <a:bodyPr rtlCol="0" anchor="ctr"/>
-          <a:lstStyle/>
-          <a:p>
-            <a:pPr algn="ctr"/>
-            <a:endParaRPr lang="en-US"/>
-          </a:p>
-        </p:txBody>
-      </p:sp>
-      <p:pic>
-        <p:nvPicPr>
-          <p:cNvPr id="8" name="Picture 7">
-            <a:extLst>
-              <a:ext uri="{FF2B5EF4-FFF2-40B4-BE49-F238E27FC236}">
-                <a16:creationId xmlns:a16="http://schemas.microsoft.com/office/drawing/2014/main" id="{50EC60BA-6428-4A39-827C-E98A115256EE}"/>
-              </a:ext>
-            </a:extLst>
-          </p:cNvPr>
-          <p:cNvPicPr>
-            <a:picLocks noChangeAspect="1"/>
-          </p:cNvPicPr>
-          <p:nvPr/>
-        </p:nvPicPr>
-        <p:blipFill>
-          <a:blip r:embed="rId2"/>
-          <a:stretch>
-            <a:fillRect/>
-          </a:stretch>
-        </p:blipFill>
-        <p:spPr>
-          <a:xfrm>
-            <a:off x="2597420" y="3433864"/>
-            <a:ext cx="4822354" cy="2225233"/>
-          </a:xfrm>
-          <a:prstGeom prst="rect">
-            <a:avLst/>
-          </a:prstGeom>
-        </p:spPr>
-      </p:pic>
-      <p:pic>
-        <p:nvPicPr>
-          <p:cNvPr id="10" name="Picture 9">
-            <a:extLst>
-              <a:ext uri="{FF2B5EF4-FFF2-40B4-BE49-F238E27FC236}">
-                <a16:creationId xmlns:a16="http://schemas.microsoft.com/office/drawing/2014/main" id="{6E496A6E-DBB7-4E8E-9236-9924D58C8CC1}"/>
-              </a:ext>
-            </a:extLst>
-          </p:cNvPr>
-          <p:cNvPicPr>
-            <a:picLocks noChangeAspect="1"/>
-          </p:cNvPicPr>
-          <p:nvPr/>
-        </p:nvPicPr>
-        <p:blipFill>
-          <a:blip r:embed="rId3"/>
-          <a:stretch>
-            <a:fillRect/>
-          </a:stretch>
-        </p:blipFill>
-        <p:spPr>
-          <a:xfrm>
-            <a:off x="2616127" y="1408907"/>
-            <a:ext cx="4718713" cy="2231329"/>
-          </a:xfrm>
-          <a:prstGeom prst="rect">
-            <a:avLst/>
-          </a:prstGeom>
-        </p:spPr>
-      </p:pic>
     </p:spTree>
     <p:extLst>
       <p:ext uri="{BB962C8B-B14F-4D97-AF65-F5344CB8AC3E}">
-        <p14:creationId xmlns:p14="http://schemas.microsoft.com/office/powerpoint/2010/main" val="2737388701"/>
+        <p14:creationId xmlns:p14="http://schemas.microsoft.com/office/powerpoint/2010/main" val="2555299821"/>
       </p:ext>
     </p:extLst>
   </p:cSld>

</xml_diff>

<commit_message>
image for hja research project
</commit_message>
<xml_diff>
--- a/assets/hja_slides_fg.pptx
+++ b/assets/hja_slides_fg.pptx
@@ -8,6 +8,7 @@
     <p:sldId id="257" r:id="rId2"/>
     <p:sldId id="264" r:id="rId3"/>
     <p:sldId id="265" r:id="rId4"/>
+    <p:sldId id="266" r:id="rId5"/>
   </p:sldIdLst>
   <p:sldSz cx="12192000" cy="9144000"/>
   <p:notesSz cx="6858000" cy="9144000"/>
@@ -314,7 +315,7 @@
           <a:p>
             <a:fld id="{F73E1B03-40AD-4841-BCA7-1CEAAD8F204E}" type="datetimeFigureOut">
               <a:rPr lang="en-US" smtClean="0"/>
-              <a:t>9/6/2022</a:t>
+              <a:t>10/8/22</a:t>
             </a:fld>
             <a:endParaRPr lang="en-US"/>
           </a:p>
@@ -484,7 +485,7 @@
           <a:p>
             <a:fld id="{F73E1B03-40AD-4841-BCA7-1CEAAD8F204E}" type="datetimeFigureOut">
               <a:rPr lang="en-US" smtClean="0"/>
-              <a:t>9/6/2022</a:t>
+              <a:t>10/8/22</a:t>
             </a:fld>
             <a:endParaRPr lang="en-US"/>
           </a:p>
@@ -664,7 +665,7 @@
           <a:p>
             <a:fld id="{F73E1B03-40AD-4841-BCA7-1CEAAD8F204E}" type="datetimeFigureOut">
               <a:rPr lang="en-US" smtClean="0"/>
-              <a:t>9/6/2022</a:t>
+              <a:t>10/8/22</a:t>
             </a:fld>
             <a:endParaRPr lang="en-US"/>
           </a:p>
@@ -834,7 +835,7 @@
           <a:p>
             <a:fld id="{F73E1B03-40AD-4841-BCA7-1CEAAD8F204E}" type="datetimeFigureOut">
               <a:rPr lang="en-US" smtClean="0"/>
-              <a:t>9/6/2022</a:t>
+              <a:t>10/8/22</a:t>
             </a:fld>
             <a:endParaRPr lang="en-US"/>
           </a:p>
@@ -1078,7 +1079,7 @@
           <a:p>
             <a:fld id="{F73E1B03-40AD-4841-BCA7-1CEAAD8F204E}" type="datetimeFigureOut">
               <a:rPr lang="en-US" smtClean="0"/>
-              <a:t>9/6/2022</a:t>
+              <a:t>10/8/22</a:t>
             </a:fld>
             <a:endParaRPr lang="en-US"/>
           </a:p>
@@ -1310,7 +1311,7 @@
           <a:p>
             <a:fld id="{F73E1B03-40AD-4841-BCA7-1CEAAD8F204E}" type="datetimeFigureOut">
               <a:rPr lang="en-US" smtClean="0"/>
-              <a:t>9/6/2022</a:t>
+              <a:t>10/8/22</a:t>
             </a:fld>
             <a:endParaRPr lang="en-US"/>
           </a:p>
@@ -1677,7 +1678,7 @@
           <a:p>
             <a:fld id="{F73E1B03-40AD-4841-BCA7-1CEAAD8F204E}" type="datetimeFigureOut">
               <a:rPr lang="en-US" smtClean="0"/>
-              <a:t>9/6/2022</a:t>
+              <a:t>10/8/22</a:t>
             </a:fld>
             <a:endParaRPr lang="en-US"/>
           </a:p>
@@ -1795,7 +1796,7 @@
           <a:p>
             <a:fld id="{F73E1B03-40AD-4841-BCA7-1CEAAD8F204E}" type="datetimeFigureOut">
               <a:rPr lang="en-US" smtClean="0"/>
-              <a:t>9/6/2022</a:t>
+              <a:t>10/8/22</a:t>
             </a:fld>
             <a:endParaRPr lang="en-US"/>
           </a:p>
@@ -1890,7 +1891,7 @@
           <a:p>
             <a:fld id="{F73E1B03-40AD-4841-BCA7-1CEAAD8F204E}" type="datetimeFigureOut">
               <a:rPr lang="en-US" smtClean="0"/>
-              <a:t>9/6/2022</a:t>
+              <a:t>10/8/22</a:t>
             </a:fld>
             <a:endParaRPr lang="en-US"/>
           </a:p>
@@ -2167,7 +2168,7 @@
           <a:p>
             <a:fld id="{F73E1B03-40AD-4841-BCA7-1CEAAD8F204E}" type="datetimeFigureOut">
               <a:rPr lang="en-US" smtClean="0"/>
-              <a:t>9/6/2022</a:t>
+              <a:t>10/8/22</a:t>
             </a:fld>
             <a:endParaRPr lang="en-US"/>
           </a:p>
@@ -2424,7 +2425,7 @@
           <a:p>
             <a:fld id="{F73E1B03-40AD-4841-BCA7-1CEAAD8F204E}" type="datetimeFigureOut">
               <a:rPr lang="en-US" smtClean="0"/>
-              <a:t>9/6/2022</a:t>
+              <a:t>10/8/22</a:t>
             </a:fld>
             <a:endParaRPr lang="en-US"/>
           </a:p>
@@ -2637,7 +2638,7 @@
           <a:p>
             <a:fld id="{F73E1B03-40AD-4841-BCA7-1CEAAD8F204E}" type="datetimeFigureOut">
               <a:rPr lang="en-US" smtClean="0"/>
-              <a:t>9/6/2022</a:t>
+              <a:t>10/8/22</a:t>
             </a:fld>
             <a:endParaRPr lang="en-US"/>
           </a:p>
@@ -10144,6 +10145,2372 @@
 </p:sld>
 </file>
 
+<file path=ppt/slides/slide4.xml><?xml version="1.0" encoding="utf-8"?>
+<p:sld xmlns:a="http://schemas.openxmlformats.org/drawingml/2006/main" xmlns:r="http://schemas.openxmlformats.org/officeDocument/2006/relationships" xmlns:p="http://schemas.openxmlformats.org/presentationml/2006/main">
+  <p:cSld>
+    <p:spTree>
+      <p:nvGrpSpPr>
+        <p:cNvPr id="1" name=""/>
+        <p:cNvGrpSpPr/>
+        <p:nvPr/>
+      </p:nvGrpSpPr>
+      <p:grpSpPr>
+        <a:xfrm>
+          <a:off x="0" y="0"/>
+          <a:ext cx="0" cy="0"/>
+          <a:chOff x="0" y="0"/>
+          <a:chExt cx="0" cy="0"/>
+        </a:xfrm>
+      </p:grpSpPr>
+      <p:sp>
+        <p:nvSpPr>
+          <p:cNvPr id="62" name="Rectangle: Rounded Corners 61">
+            <a:extLst>
+              <a:ext uri="{FF2B5EF4-FFF2-40B4-BE49-F238E27FC236}">
+                <a16:creationId xmlns:a16="http://schemas.microsoft.com/office/drawing/2014/main" id="{C7BED987-A83E-B044-D1C3-AF21C8DDFA92}"/>
+              </a:ext>
+            </a:extLst>
+          </p:cNvPr>
+          <p:cNvSpPr/>
+          <p:nvPr/>
+        </p:nvSpPr>
+        <p:spPr>
+          <a:xfrm>
+            <a:off x="1993990" y="1631558"/>
+            <a:ext cx="8729330" cy="5880883"/>
+          </a:xfrm>
+          <a:prstGeom prst="roundRect">
+            <a:avLst>
+              <a:gd name="adj" fmla="val 5670"/>
+            </a:avLst>
+          </a:prstGeom>
+          <a:solidFill>
+            <a:schemeClr val="bg1">
+              <a:lumMod val="95000"/>
+            </a:schemeClr>
+          </a:solidFill>
+          <a:ln>
+            <a:noFill/>
+          </a:ln>
+          <a:effectLst>
+            <a:outerShdw blurRad="50800" dist="38100" dir="2700000" sx="101000" sy="101000" algn="tl" rotWithShape="0">
+              <a:prstClr val="black">
+                <a:alpha val="40000"/>
+              </a:prstClr>
+            </a:outerShdw>
+          </a:effectLst>
+        </p:spPr>
+        <p:style>
+          <a:lnRef idx="2">
+            <a:schemeClr val="accent1">
+              <a:shade val="50000"/>
+            </a:schemeClr>
+          </a:lnRef>
+          <a:fillRef idx="1">
+            <a:schemeClr val="accent1"/>
+          </a:fillRef>
+          <a:effectRef idx="0">
+            <a:schemeClr val="accent1"/>
+          </a:effectRef>
+          <a:fontRef idx="minor">
+            <a:schemeClr val="lt1"/>
+          </a:fontRef>
+        </p:style>
+        <p:txBody>
+          <a:bodyPr rtlCol="0" anchor="ctr"/>
+          <a:lstStyle/>
+          <a:p>
+            <a:pPr algn="ctr"/>
+            <a:endParaRPr lang="en-US"/>
+          </a:p>
+        </p:txBody>
+      </p:sp>
+      <p:grpSp>
+        <p:nvGrpSpPr>
+          <p:cNvPr id="6" name="Group 5">
+            <a:extLst>
+              <a:ext uri="{FF2B5EF4-FFF2-40B4-BE49-F238E27FC236}">
+                <a16:creationId xmlns:a16="http://schemas.microsoft.com/office/drawing/2014/main" id="{A27C99DC-D8FB-9304-1C04-5B3D3D3C91EA}"/>
+              </a:ext>
+            </a:extLst>
+          </p:cNvPr>
+          <p:cNvGrpSpPr/>
+          <p:nvPr/>
+        </p:nvGrpSpPr>
+        <p:grpSpPr>
+          <a:xfrm>
+            <a:off x="8396475" y="2989571"/>
+            <a:ext cx="1077191" cy="3142044"/>
+            <a:chOff x="7550259" y="933675"/>
+            <a:chExt cx="1077191" cy="3142044"/>
+          </a:xfrm>
+        </p:grpSpPr>
+        <p:cxnSp>
+          <p:nvCxnSpPr>
+            <p:cNvPr id="7" name="Straight Arrow Connector 6">
+              <a:extLst>
+                <a:ext uri="{FF2B5EF4-FFF2-40B4-BE49-F238E27FC236}">
+                  <a16:creationId xmlns:a16="http://schemas.microsoft.com/office/drawing/2014/main" id="{6C2EE9FD-4DD7-C494-9181-F3598BD8EF40}"/>
+                </a:ext>
+              </a:extLst>
+            </p:cNvPr>
+            <p:cNvCxnSpPr>
+              <a:cxnSpLocks/>
+            </p:cNvCxnSpPr>
+            <p:nvPr/>
+          </p:nvCxnSpPr>
+          <p:spPr>
+            <a:xfrm>
+              <a:off x="7554373" y="933675"/>
+              <a:ext cx="1073077" cy="1"/>
+            </a:xfrm>
+            <a:prstGeom prst="straightConnector1">
+              <a:avLst/>
+            </a:prstGeom>
+            <a:ln w="12700">
+              <a:solidFill>
+                <a:schemeClr val="tx1">
+                  <a:lumMod val="50000"/>
+                  <a:lumOff val="50000"/>
+                </a:schemeClr>
+              </a:solidFill>
+              <a:tailEnd type="triangle"/>
+            </a:ln>
+          </p:spPr>
+          <p:style>
+            <a:lnRef idx="1">
+              <a:schemeClr val="dk1"/>
+            </a:lnRef>
+            <a:fillRef idx="0">
+              <a:schemeClr val="dk1"/>
+            </a:fillRef>
+            <a:effectRef idx="0">
+              <a:schemeClr val="dk1"/>
+            </a:effectRef>
+            <a:fontRef idx="minor">
+              <a:schemeClr val="tx1"/>
+            </a:fontRef>
+          </p:style>
+        </p:cxnSp>
+        <p:cxnSp>
+          <p:nvCxnSpPr>
+            <p:cNvPr id="8" name="Straight Arrow Connector 7">
+              <a:extLst>
+                <a:ext uri="{FF2B5EF4-FFF2-40B4-BE49-F238E27FC236}">
+                  <a16:creationId xmlns:a16="http://schemas.microsoft.com/office/drawing/2014/main" id="{8E52D195-FC0F-A863-47D5-C34FB4AAF979}"/>
+                </a:ext>
+              </a:extLst>
+            </p:cNvPr>
+            <p:cNvCxnSpPr>
+              <a:cxnSpLocks/>
+            </p:cNvCxnSpPr>
+            <p:nvPr/>
+          </p:nvCxnSpPr>
+          <p:spPr>
+            <a:xfrm flipH="1">
+              <a:off x="7550259" y="933675"/>
+              <a:ext cx="11419" cy="3142044"/>
+            </a:xfrm>
+            <a:prstGeom prst="straightConnector1">
+              <a:avLst/>
+            </a:prstGeom>
+            <a:ln w="12700">
+              <a:solidFill>
+                <a:schemeClr val="tx1">
+                  <a:lumMod val="50000"/>
+                  <a:lumOff val="50000"/>
+                </a:schemeClr>
+              </a:solidFill>
+              <a:tailEnd type="triangle"/>
+            </a:ln>
+          </p:spPr>
+          <p:style>
+            <a:lnRef idx="1">
+              <a:schemeClr val="dk1"/>
+            </a:lnRef>
+            <a:fillRef idx="0">
+              <a:schemeClr val="dk1"/>
+            </a:fillRef>
+            <a:effectRef idx="0">
+              <a:schemeClr val="dk1"/>
+            </a:effectRef>
+            <a:fontRef idx="minor">
+              <a:schemeClr val="tx1"/>
+            </a:fontRef>
+          </p:style>
+        </p:cxnSp>
+        <p:grpSp>
+          <p:nvGrpSpPr>
+            <p:cNvPr id="9" name="Group 8">
+              <a:extLst>
+                <a:ext uri="{FF2B5EF4-FFF2-40B4-BE49-F238E27FC236}">
+                  <a16:creationId xmlns:a16="http://schemas.microsoft.com/office/drawing/2014/main" id="{30DE8BA6-FDD1-CE87-723C-0FAEC78A0741}"/>
+                </a:ext>
+              </a:extLst>
+            </p:cNvPr>
+            <p:cNvGrpSpPr/>
+            <p:nvPr/>
+          </p:nvGrpSpPr>
+          <p:grpSpPr>
+            <a:xfrm>
+              <a:off x="7561678" y="944790"/>
+              <a:ext cx="914707" cy="2457346"/>
+              <a:chOff x="10008847" y="2759105"/>
+              <a:chExt cx="914707" cy="2457346"/>
+            </a:xfrm>
+          </p:grpSpPr>
+          <p:sp>
+            <p:nvSpPr>
+              <p:cNvPr id="10" name="Freeform: Shape 9">
+                <a:extLst>
+                  <a:ext uri="{FF2B5EF4-FFF2-40B4-BE49-F238E27FC236}">
+                    <a16:creationId xmlns:a16="http://schemas.microsoft.com/office/drawing/2014/main" id="{B5C05E38-23C2-28CD-04F3-1EF4DBD3A941}"/>
+                  </a:ext>
+                </a:extLst>
+              </p:cNvPr>
+              <p:cNvSpPr/>
+              <p:nvPr/>
+            </p:nvSpPr>
+            <p:spPr>
+              <a:xfrm rot="5400000">
+                <a:off x="9237528" y="3530425"/>
+                <a:ext cx="2457346" cy="914706"/>
+              </a:xfrm>
+              <a:custGeom>
+                <a:avLst/>
+                <a:gdLst>
+                  <a:gd name="connsiteX0" fmla="*/ 0 w 3771900"/>
+                  <a:gd name="connsiteY0" fmla="*/ 1202561 h 1212086"/>
+                  <a:gd name="connsiteX1" fmla="*/ 733425 w 3771900"/>
+                  <a:gd name="connsiteY1" fmla="*/ 993011 h 1212086"/>
+                  <a:gd name="connsiteX2" fmla="*/ 1504950 w 3771900"/>
+                  <a:gd name="connsiteY2" fmla="*/ 107186 h 1212086"/>
+                  <a:gd name="connsiteX3" fmla="*/ 2066925 w 3771900"/>
+                  <a:gd name="connsiteY3" fmla="*/ 107186 h 1212086"/>
+                  <a:gd name="connsiteX4" fmla="*/ 2771775 w 3771900"/>
+                  <a:gd name="connsiteY4" fmla="*/ 935861 h 1212086"/>
+                  <a:gd name="connsiteX5" fmla="*/ 3771900 w 3771900"/>
+                  <a:gd name="connsiteY5" fmla="*/ 1212086 h 1212086"/>
+                </a:gdLst>
+                <a:ahLst/>
+                <a:cxnLst>
+                  <a:cxn ang="0">
+                    <a:pos x="connsiteX0" y="connsiteY0"/>
+                  </a:cxn>
+                  <a:cxn ang="0">
+                    <a:pos x="connsiteX1" y="connsiteY1"/>
+                  </a:cxn>
+                  <a:cxn ang="0">
+                    <a:pos x="connsiteX2" y="connsiteY2"/>
+                  </a:cxn>
+                  <a:cxn ang="0">
+                    <a:pos x="connsiteX3" y="connsiteY3"/>
+                  </a:cxn>
+                  <a:cxn ang="0">
+                    <a:pos x="connsiteX4" y="connsiteY4"/>
+                  </a:cxn>
+                  <a:cxn ang="0">
+                    <a:pos x="connsiteX5" y="connsiteY5"/>
+                  </a:cxn>
+                </a:cxnLst>
+                <a:rect l="l" t="t" r="r" b="b"/>
+                <a:pathLst>
+                  <a:path w="3771900" h="1212086">
+                    <a:moveTo>
+                      <a:pt x="0" y="1202561"/>
+                    </a:moveTo>
+                    <a:cubicBezTo>
+                      <a:pt x="241300" y="1189067"/>
+                      <a:pt x="482600" y="1175573"/>
+                      <a:pt x="733425" y="993011"/>
+                    </a:cubicBezTo>
+                    <a:cubicBezTo>
+                      <a:pt x="984250" y="810449"/>
+                      <a:pt x="1282700" y="254824"/>
+                      <a:pt x="1504950" y="107186"/>
+                    </a:cubicBezTo>
+                    <a:cubicBezTo>
+                      <a:pt x="1727200" y="-40452"/>
+                      <a:pt x="1855788" y="-30927"/>
+                      <a:pt x="2066925" y="107186"/>
+                    </a:cubicBezTo>
+                    <a:cubicBezTo>
+                      <a:pt x="2278063" y="245298"/>
+                      <a:pt x="2487613" y="751711"/>
+                      <a:pt x="2771775" y="935861"/>
+                    </a:cubicBezTo>
+                    <a:cubicBezTo>
+                      <a:pt x="3055938" y="1120011"/>
+                      <a:pt x="3413919" y="1166048"/>
+                      <a:pt x="3771900" y="1212086"/>
+                    </a:cubicBezTo>
+                  </a:path>
+                </a:pathLst>
+              </a:custGeom>
+              <a:solidFill>
+                <a:srgbClr val="996633"/>
+              </a:solidFill>
+              <a:ln>
+                <a:noFill/>
+              </a:ln>
+            </p:spPr>
+            <p:style>
+              <a:lnRef idx="2">
+                <a:schemeClr val="accent1">
+                  <a:shade val="50000"/>
+                </a:schemeClr>
+              </a:lnRef>
+              <a:fillRef idx="1">
+                <a:schemeClr val="accent1"/>
+              </a:fillRef>
+              <a:effectRef idx="0">
+                <a:schemeClr val="accent1"/>
+              </a:effectRef>
+              <a:fontRef idx="minor">
+                <a:schemeClr val="lt1"/>
+              </a:fontRef>
+            </p:style>
+            <p:txBody>
+              <a:bodyPr rtlCol="0" anchor="ctr"/>
+              <a:lstStyle/>
+              <a:p>
+                <a:pPr algn="ctr"/>
+                <a:endParaRPr lang="en-US"/>
+              </a:p>
+            </p:txBody>
+          </p:sp>
+          <p:sp>
+            <p:nvSpPr>
+              <p:cNvPr id="11" name="Freeform: Shape 10">
+                <a:extLst>
+                  <a:ext uri="{FF2B5EF4-FFF2-40B4-BE49-F238E27FC236}">
+                    <a16:creationId xmlns:a16="http://schemas.microsoft.com/office/drawing/2014/main" id="{4FAD1304-E722-4597-3F79-4BBFCD65DD4A}"/>
+                  </a:ext>
+                </a:extLst>
+              </p:cNvPr>
+              <p:cNvSpPr/>
+              <p:nvPr/>
+            </p:nvSpPr>
+            <p:spPr>
+              <a:xfrm rot="5400000">
+                <a:off x="9371898" y="3396056"/>
+                <a:ext cx="2044323" cy="770425"/>
+              </a:xfrm>
+              <a:custGeom>
+                <a:avLst/>
+                <a:gdLst>
+                  <a:gd name="connsiteX0" fmla="*/ 0 w 3771900"/>
+                  <a:gd name="connsiteY0" fmla="*/ 1202561 h 1212086"/>
+                  <a:gd name="connsiteX1" fmla="*/ 733425 w 3771900"/>
+                  <a:gd name="connsiteY1" fmla="*/ 993011 h 1212086"/>
+                  <a:gd name="connsiteX2" fmla="*/ 1504950 w 3771900"/>
+                  <a:gd name="connsiteY2" fmla="*/ 107186 h 1212086"/>
+                  <a:gd name="connsiteX3" fmla="*/ 2066925 w 3771900"/>
+                  <a:gd name="connsiteY3" fmla="*/ 107186 h 1212086"/>
+                  <a:gd name="connsiteX4" fmla="*/ 2771775 w 3771900"/>
+                  <a:gd name="connsiteY4" fmla="*/ 935861 h 1212086"/>
+                  <a:gd name="connsiteX5" fmla="*/ 3771900 w 3771900"/>
+                  <a:gd name="connsiteY5" fmla="*/ 1212086 h 1212086"/>
+                </a:gdLst>
+                <a:ahLst/>
+                <a:cxnLst>
+                  <a:cxn ang="0">
+                    <a:pos x="connsiteX0" y="connsiteY0"/>
+                  </a:cxn>
+                  <a:cxn ang="0">
+                    <a:pos x="connsiteX1" y="connsiteY1"/>
+                  </a:cxn>
+                  <a:cxn ang="0">
+                    <a:pos x="connsiteX2" y="connsiteY2"/>
+                  </a:cxn>
+                  <a:cxn ang="0">
+                    <a:pos x="connsiteX3" y="connsiteY3"/>
+                  </a:cxn>
+                  <a:cxn ang="0">
+                    <a:pos x="connsiteX4" y="connsiteY4"/>
+                  </a:cxn>
+                  <a:cxn ang="0">
+                    <a:pos x="connsiteX5" y="connsiteY5"/>
+                  </a:cxn>
+                </a:cxnLst>
+                <a:rect l="l" t="t" r="r" b="b"/>
+                <a:pathLst>
+                  <a:path w="3771900" h="1212086">
+                    <a:moveTo>
+                      <a:pt x="0" y="1202561"/>
+                    </a:moveTo>
+                    <a:cubicBezTo>
+                      <a:pt x="241300" y="1189067"/>
+                      <a:pt x="482600" y="1175573"/>
+                      <a:pt x="733425" y="993011"/>
+                    </a:cubicBezTo>
+                    <a:cubicBezTo>
+                      <a:pt x="984250" y="810449"/>
+                      <a:pt x="1282700" y="254824"/>
+                      <a:pt x="1504950" y="107186"/>
+                    </a:cubicBezTo>
+                    <a:cubicBezTo>
+                      <a:pt x="1727200" y="-40452"/>
+                      <a:pt x="1855788" y="-30927"/>
+                      <a:pt x="2066925" y="107186"/>
+                    </a:cubicBezTo>
+                    <a:cubicBezTo>
+                      <a:pt x="2278063" y="245298"/>
+                      <a:pt x="2487613" y="751711"/>
+                      <a:pt x="2771775" y="935861"/>
+                    </a:cubicBezTo>
+                    <a:cubicBezTo>
+                      <a:pt x="3055938" y="1120011"/>
+                      <a:pt x="3413919" y="1166048"/>
+                      <a:pt x="3771900" y="1212086"/>
+                    </a:cubicBezTo>
+                  </a:path>
+                </a:pathLst>
+              </a:custGeom>
+              <a:solidFill>
+                <a:srgbClr val="D9D9D9"/>
+              </a:solidFill>
+              <a:ln>
+                <a:noFill/>
+              </a:ln>
+            </p:spPr>
+            <p:style>
+              <a:lnRef idx="2">
+                <a:schemeClr val="accent1">
+                  <a:shade val="50000"/>
+                </a:schemeClr>
+              </a:lnRef>
+              <a:fillRef idx="1">
+                <a:schemeClr val="accent1"/>
+              </a:fillRef>
+              <a:effectRef idx="0">
+                <a:schemeClr val="accent1"/>
+              </a:effectRef>
+              <a:fontRef idx="minor">
+                <a:schemeClr val="lt1"/>
+              </a:fontRef>
+            </p:style>
+            <p:txBody>
+              <a:bodyPr rtlCol="0" anchor="ctr"/>
+              <a:lstStyle/>
+              <a:p>
+                <a:pPr algn="ctr"/>
+                <a:endParaRPr lang="en-US" dirty="0"/>
+              </a:p>
+            </p:txBody>
+          </p:sp>
+          <p:sp>
+            <p:nvSpPr>
+              <p:cNvPr id="12" name="Freeform: Shape 11">
+                <a:extLst>
+                  <a:ext uri="{FF2B5EF4-FFF2-40B4-BE49-F238E27FC236}">
+                    <a16:creationId xmlns:a16="http://schemas.microsoft.com/office/drawing/2014/main" id="{F16FE068-C652-AB5C-3010-53FB7217327E}"/>
+                  </a:ext>
+                </a:extLst>
+              </p:cNvPr>
+              <p:cNvSpPr/>
+              <p:nvPr/>
+            </p:nvSpPr>
+            <p:spPr>
+              <a:xfrm rot="5400000">
+                <a:off x="9244151" y="3525839"/>
+                <a:ext cx="1875180" cy="341713"/>
+              </a:xfrm>
+              <a:custGeom>
+                <a:avLst/>
+                <a:gdLst>
+                  <a:gd name="connsiteX0" fmla="*/ 0 w 3771900"/>
+                  <a:gd name="connsiteY0" fmla="*/ 1202561 h 1212086"/>
+                  <a:gd name="connsiteX1" fmla="*/ 733425 w 3771900"/>
+                  <a:gd name="connsiteY1" fmla="*/ 993011 h 1212086"/>
+                  <a:gd name="connsiteX2" fmla="*/ 1504950 w 3771900"/>
+                  <a:gd name="connsiteY2" fmla="*/ 107186 h 1212086"/>
+                  <a:gd name="connsiteX3" fmla="*/ 2066925 w 3771900"/>
+                  <a:gd name="connsiteY3" fmla="*/ 107186 h 1212086"/>
+                  <a:gd name="connsiteX4" fmla="*/ 2771775 w 3771900"/>
+                  <a:gd name="connsiteY4" fmla="*/ 935861 h 1212086"/>
+                  <a:gd name="connsiteX5" fmla="*/ 3771900 w 3771900"/>
+                  <a:gd name="connsiteY5" fmla="*/ 1212086 h 1212086"/>
+                </a:gdLst>
+                <a:ahLst/>
+                <a:cxnLst>
+                  <a:cxn ang="0">
+                    <a:pos x="connsiteX0" y="connsiteY0"/>
+                  </a:cxn>
+                  <a:cxn ang="0">
+                    <a:pos x="connsiteX1" y="connsiteY1"/>
+                  </a:cxn>
+                  <a:cxn ang="0">
+                    <a:pos x="connsiteX2" y="connsiteY2"/>
+                  </a:cxn>
+                  <a:cxn ang="0">
+                    <a:pos x="connsiteX3" y="connsiteY3"/>
+                  </a:cxn>
+                  <a:cxn ang="0">
+                    <a:pos x="connsiteX4" y="connsiteY4"/>
+                  </a:cxn>
+                  <a:cxn ang="0">
+                    <a:pos x="connsiteX5" y="connsiteY5"/>
+                  </a:cxn>
+                </a:cxnLst>
+                <a:rect l="l" t="t" r="r" b="b"/>
+                <a:pathLst>
+                  <a:path w="3771900" h="1212086">
+                    <a:moveTo>
+                      <a:pt x="0" y="1202561"/>
+                    </a:moveTo>
+                    <a:cubicBezTo>
+                      <a:pt x="241300" y="1189067"/>
+                      <a:pt x="482600" y="1175573"/>
+                      <a:pt x="733425" y="993011"/>
+                    </a:cubicBezTo>
+                    <a:cubicBezTo>
+                      <a:pt x="984250" y="810449"/>
+                      <a:pt x="1282700" y="254824"/>
+                      <a:pt x="1504950" y="107186"/>
+                    </a:cubicBezTo>
+                    <a:cubicBezTo>
+                      <a:pt x="1727200" y="-40452"/>
+                      <a:pt x="1855788" y="-30927"/>
+                      <a:pt x="2066925" y="107186"/>
+                    </a:cubicBezTo>
+                    <a:cubicBezTo>
+                      <a:pt x="2278063" y="245298"/>
+                      <a:pt x="2487613" y="751711"/>
+                      <a:pt x="2771775" y="935861"/>
+                    </a:cubicBezTo>
+                    <a:cubicBezTo>
+                      <a:pt x="3055938" y="1120011"/>
+                      <a:pt x="3413919" y="1166048"/>
+                      <a:pt x="3771900" y="1212086"/>
+                    </a:cubicBezTo>
+                  </a:path>
+                </a:pathLst>
+              </a:custGeom>
+              <a:solidFill>
+                <a:srgbClr val="016B4A"/>
+              </a:solidFill>
+              <a:ln>
+                <a:noFill/>
+              </a:ln>
+            </p:spPr>
+            <p:style>
+              <a:lnRef idx="2">
+                <a:schemeClr val="accent1">
+                  <a:shade val="50000"/>
+                </a:schemeClr>
+              </a:lnRef>
+              <a:fillRef idx="1">
+                <a:schemeClr val="accent1"/>
+              </a:fillRef>
+              <a:effectRef idx="0">
+                <a:schemeClr val="accent1"/>
+              </a:effectRef>
+              <a:fontRef idx="minor">
+                <a:schemeClr val="lt1"/>
+              </a:fontRef>
+            </p:style>
+            <p:txBody>
+              <a:bodyPr rtlCol="0" anchor="ctr"/>
+              <a:lstStyle/>
+              <a:p>
+                <a:pPr algn="ctr"/>
+                <a:endParaRPr lang="en-US"/>
+              </a:p>
+            </p:txBody>
+          </p:sp>
+        </p:grpSp>
+      </p:grpSp>
+      <p:pic>
+        <p:nvPicPr>
+          <p:cNvPr id="13" name="Picture 12">
+            <a:extLst>
+              <a:ext uri="{FF2B5EF4-FFF2-40B4-BE49-F238E27FC236}">
+                <a16:creationId xmlns:a16="http://schemas.microsoft.com/office/drawing/2014/main" id="{E7BB40C4-E1CA-3E78-0FC3-AE3EFF57A6E5}"/>
+              </a:ext>
+            </a:extLst>
+          </p:cNvPr>
+          <p:cNvPicPr>
+            <a:picLocks noChangeAspect="1"/>
+          </p:cNvPicPr>
+          <p:nvPr/>
+        </p:nvPicPr>
+        <p:blipFill>
+          <a:blip r:embed="rId2"/>
+          <a:stretch>
+            <a:fillRect/>
+          </a:stretch>
+        </p:blipFill>
+        <p:spPr>
+          <a:xfrm>
+            <a:off x="2752540" y="2563219"/>
+            <a:ext cx="5630783" cy="3546841"/>
+          </a:xfrm>
+          <a:prstGeom prst="rect">
+            <a:avLst/>
+          </a:prstGeom>
+        </p:spPr>
+      </p:pic>
+      <p:grpSp>
+        <p:nvGrpSpPr>
+          <p:cNvPr id="28" name="Group 27">
+            <a:extLst>
+              <a:ext uri="{FF2B5EF4-FFF2-40B4-BE49-F238E27FC236}">
+                <a16:creationId xmlns:a16="http://schemas.microsoft.com/office/drawing/2014/main" id="{028DDC76-C9CD-6446-2811-4CE1BD6EC7CE}"/>
+              </a:ext>
+            </a:extLst>
+          </p:cNvPr>
+          <p:cNvGrpSpPr/>
+          <p:nvPr/>
+        </p:nvGrpSpPr>
+        <p:grpSpPr>
+          <a:xfrm>
+            <a:off x="2521521" y="6082643"/>
+            <a:ext cx="1115129" cy="1105551"/>
+            <a:chOff x="1195966" y="4699376"/>
+            <a:chExt cx="1115129" cy="1105551"/>
+          </a:xfrm>
+        </p:grpSpPr>
+        <p:pic>
+          <p:nvPicPr>
+            <p:cNvPr id="29" name="Picture 28">
+              <a:extLst>
+                <a:ext uri="{FF2B5EF4-FFF2-40B4-BE49-F238E27FC236}">
+                  <a16:creationId xmlns:a16="http://schemas.microsoft.com/office/drawing/2014/main" id="{3947CF5B-6667-A527-8DC4-14CC59BC4E26}"/>
+                </a:ext>
+              </a:extLst>
+            </p:cNvPr>
+            <p:cNvPicPr>
+              <a:picLocks noChangeAspect="1"/>
+            </p:cNvPicPr>
+            <p:nvPr/>
+          </p:nvPicPr>
+          <p:blipFill>
+            <a:blip r:embed="rId3"/>
+            <a:stretch>
+              <a:fillRect/>
+            </a:stretch>
+          </p:blipFill>
+          <p:spPr>
+            <a:xfrm>
+              <a:off x="1279439" y="4800001"/>
+              <a:ext cx="926437" cy="904303"/>
+            </a:xfrm>
+            <a:prstGeom prst="rect">
+              <a:avLst/>
+            </a:prstGeom>
+            <a:ln>
+              <a:noFill/>
+            </a:ln>
+            <a:effectLst>
+              <a:outerShdw blurRad="292100" dist="139700" dir="2700000" algn="tl" rotWithShape="0">
+                <a:srgbClr val="333333">
+                  <a:alpha val="65000"/>
+                </a:srgbClr>
+              </a:outerShdw>
+            </a:effectLst>
+          </p:spPr>
+        </p:pic>
+        <p:sp>
+          <p:nvSpPr>
+            <p:cNvPr id="30" name="Oval 29">
+              <a:extLst>
+                <a:ext uri="{FF2B5EF4-FFF2-40B4-BE49-F238E27FC236}">
+                  <a16:creationId xmlns:a16="http://schemas.microsoft.com/office/drawing/2014/main" id="{8ED309DF-1FA7-DCFC-9C4C-3B9DE657C952}"/>
+                </a:ext>
+              </a:extLst>
+            </p:cNvPr>
+            <p:cNvSpPr/>
+            <p:nvPr/>
+          </p:nvSpPr>
+          <p:spPr>
+            <a:xfrm>
+              <a:off x="1195966" y="4699376"/>
+              <a:ext cx="1115129" cy="1105551"/>
+            </a:xfrm>
+            <a:prstGeom prst="ellipse">
+              <a:avLst/>
+            </a:prstGeom>
+            <a:solidFill>
+              <a:srgbClr val="FFFFFF">
+                <a:alpha val="40000"/>
+              </a:srgbClr>
+            </a:solidFill>
+            <a:ln>
+              <a:noFill/>
+            </a:ln>
+          </p:spPr>
+          <p:style>
+            <a:lnRef idx="2">
+              <a:schemeClr val="accent1">
+                <a:shade val="50000"/>
+              </a:schemeClr>
+            </a:lnRef>
+            <a:fillRef idx="1">
+              <a:schemeClr val="accent1"/>
+            </a:fillRef>
+            <a:effectRef idx="0">
+              <a:schemeClr val="accent1"/>
+            </a:effectRef>
+            <a:fontRef idx="minor">
+              <a:schemeClr val="lt1"/>
+            </a:fontRef>
+          </p:style>
+          <p:txBody>
+            <a:bodyPr rtlCol="0" anchor="ctr"/>
+            <a:lstStyle/>
+            <a:p>
+              <a:pPr algn="ctr"/>
+              <a:endParaRPr lang="en-US"/>
+            </a:p>
+          </p:txBody>
+        </p:sp>
+      </p:grpSp>
+      <p:sp>
+        <p:nvSpPr>
+          <p:cNvPr id="14" name="TextBox 13">
+            <a:extLst>
+              <a:ext uri="{FF2B5EF4-FFF2-40B4-BE49-F238E27FC236}">
+                <a16:creationId xmlns:a16="http://schemas.microsoft.com/office/drawing/2014/main" id="{4FB65338-4CD4-58C9-D949-3A9FD8F3745A}"/>
+              </a:ext>
+            </a:extLst>
+          </p:cNvPr>
+          <p:cNvSpPr txBox="1"/>
+          <p:nvPr/>
+        </p:nvSpPr>
+        <p:spPr>
+          <a:xfrm rot="5400000">
+            <a:off x="7919221" y="3202166"/>
+            <a:ext cx="780983" cy="276999"/>
+          </a:xfrm>
+          <a:prstGeom prst="rect">
+            <a:avLst/>
+          </a:prstGeom>
+          <a:noFill/>
+        </p:spPr>
+        <p:txBody>
+          <a:bodyPr wrap="none" rtlCol="0">
+            <a:spAutoFit/>
+          </a:bodyPr>
+          <a:lstStyle>
+            <a:defPPr>
+              <a:defRPr lang="en-US"/>
+            </a:defPPr>
+            <a:lvl1pPr>
+              <a:defRPr sz="1200">
+                <a:solidFill>
+                  <a:schemeClr val="tx1">
+                    <a:lumMod val="65000"/>
+                    <a:lumOff val="35000"/>
+                  </a:schemeClr>
+                </a:solidFill>
+              </a:defRPr>
+            </a:lvl1pPr>
+          </a:lstStyle>
+          <a:p>
+            <a:r>
+              <a:rPr lang="en-US" dirty="0"/>
+              <a:t>POC yield</a:t>
+            </a:r>
+          </a:p>
+        </p:txBody>
+      </p:sp>
+      <p:sp>
+        <p:nvSpPr>
+          <p:cNvPr id="15" name="TextBox 14">
+            <a:extLst>
+              <a:ext uri="{FF2B5EF4-FFF2-40B4-BE49-F238E27FC236}">
+                <a16:creationId xmlns:a16="http://schemas.microsoft.com/office/drawing/2014/main" id="{77D76CB1-6F4D-D282-1A0E-0442997FF229}"/>
+              </a:ext>
+            </a:extLst>
+          </p:cNvPr>
+          <p:cNvSpPr txBox="1"/>
+          <p:nvPr/>
+        </p:nvSpPr>
+        <p:spPr>
+          <a:xfrm>
+            <a:off x="8451464" y="2706607"/>
+            <a:ext cx="857029" cy="276999"/>
+          </a:xfrm>
+          <a:prstGeom prst="rect">
+            <a:avLst/>
+          </a:prstGeom>
+          <a:noFill/>
+        </p:spPr>
+        <p:txBody>
+          <a:bodyPr wrap="none" rtlCol="0">
+            <a:spAutoFit/>
+          </a:bodyPr>
+          <a:lstStyle>
+            <a:defPPr>
+              <a:defRPr lang="en-US"/>
+            </a:defPPr>
+            <a:lvl1pPr>
+              <a:defRPr sz="1200">
+                <a:solidFill>
+                  <a:schemeClr val="tx1">
+                    <a:lumMod val="65000"/>
+                    <a:lumOff val="35000"/>
+                  </a:schemeClr>
+                </a:solidFill>
+              </a:defRPr>
+            </a:lvl1pPr>
+          </a:lstStyle>
+          <a:p>
+            <a:r>
+              <a:rPr lang="en-US" dirty="0"/>
+              <a:t>Probability</a:t>
+            </a:r>
+          </a:p>
+        </p:txBody>
+      </p:sp>
+      <p:sp>
+        <p:nvSpPr>
+          <p:cNvPr id="16" name="TextBox 15">
+            <a:extLst>
+              <a:ext uri="{FF2B5EF4-FFF2-40B4-BE49-F238E27FC236}">
+                <a16:creationId xmlns:a16="http://schemas.microsoft.com/office/drawing/2014/main" id="{77504DAB-065D-9086-C8D8-98A6ECE19873}"/>
+              </a:ext>
+            </a:extLst>
+          </p:cNvPr>
+          <p:cNvSpPr txBox="1"/>
+          <p:nvPr/>
+        </p:nvSpPr>
+        <p:spPr>
+          <a:xfrm>
+            <a:off x="2466011" y="4161576"/>
+            <a:ext cx="595035" cy="400110"/>
+          </a:xfrm>
+          <a:prstGeom prst="rect">
+            <a:avLst/>
+          </a:prstGeom>
+          <a:noFill/>
+        </p:spPr>
+        <p:txBody>
+          <a:bodyPr wrap="none" rtlCol="0">
+            <a:spAutoFit/>
+          </a:bodyPr>
+          <a:lstStyle>
+            <a:defPPr>
+              <a:defRPr lang="en-US"/>
+            </a:defPPr>
+            <a:lvl1pPr>
+              <a:defRPr sz="1200">
+                <a:solidFill>
+                  <a:schemeClr val="tx1">
+                    <a:lumMod val="65000"/>
+                    <a:lumOff val="35000"/>
+                  </a:schemeClr>
+                </a:solidFill>
+              </a:defRPr>
+            </a:lvl1pPr>
+          </a:lstStyle>
+          <a:p>
+            <a:r>
+              <a:rPr lang="en-US" sz="1000" dirty="0"/>
+              <a:t>Stream</a:t>
+            </a:r>
+          </a:p>
+          <a:p>
+            <a:r>
+              <a:rPr lang="en-US" sz="1000" dirty="0"/>
+              <a:t>channel</a:t>
+            </a:r>
+          </a:p>
+        </p:txBody>
+      </p:sp>
+      <p:sp>
+        <p:nvSpPr>
+          <p:cNvPr id="17" name="Left Brace 16">
+            <a:extLst>
+              <a:ext uri="{FF2B5EF4-FFF2-40B4-BE49-F238E27FC236}">
+                <a16:creationId xmlns:a16="http://schemas.microsoft.com/office/drawing/2014/main" id="{9E1DE49C-139D-02C3-CDEE-7B805335469C}"/>
+              </a:ext>
+            </a:extLst>
+          </p:cNvPr>
+          <p:cNvSpPr/>
+          <p:nvPr/>
+        </p:nvSpPr>
+        <p:spPr>
+          <a:xfrm>
+            <a:off x="3205517" y="3032950"/>
+            <a:ext cx="129494" cy="1111697"/>
+          </a:xfrm>
+          <a:prstGeom prst="leftBrace">
+            <a:avLst/>
+          </a:prstGeom>
+          <a:ln>
+            <a:solidFill>
+              <a:schemeClr val="tx1">
+                <a:lumMod val="50000"/>
+                <a:lumOff val="50000"/>
+              </a:schemeClr>
+            </a:solidFill>
+          </a:ln>
+        </p:spPr>
+        <p:style>
+          <a:lnRef idx="1">
+            <a:schemeClr val="accent1"/>
+          </a:lnRef>
+          <a:fillRef idx="0">
+            <a:schemeClr val="accent1"/>
+          </a:fillRef>
+          <a:effectRef idx="0">
+            <a:schemeClr val="accent1"/>
+          </a:effectRef>
+          <a:fontRef idx="minor">
+            <a:schemeClr val="tx1"/>
+          </a:fontRef>
+        </p:style>
+        <p:txBody>
+          <a:bodyPr rtlCol="0" anchor="ctr"/>
+          <a:lstStyle/>
+          <a:p>
+            <a:pPr algn="ctr"/>
+            <a:endParaRPr lang="en-US"/>
+          </a:p>
+        </p:txBody>
+      </p:sp>
+      <p:sp>
+        <p:nvSpPr>
+          <p:cNvPr id="18" name="TextBox 17">
+            <a:extLst>
+              <a:ext uri="{FF2B5EF4-FFF2-40B4-BE49-F238E27FC236}">
+                <a16:creationId xmlns:a16="http://schemas.microsoft.com/office/drawing/2014/main" id="{AB88C3B8-C69F-5E41-8028-E7D89835F608}"/>
+              </a:ext>
+            </a:extLst>
+          </p:cNvPr>
+          <p:cNvSpPr txBox="1"/>
+          <p:nvPr/>
+        </p:nvSpPr>
+        <p:spPr>
+          <a:xfrm>
+            <a:off x="2462669" y="3483131"/>
+            <a:ext cx="628698" cy="246221"/>
+          </a:xfrm>
+          <a:prstGeom prst="rect">
+            <a:avLst/>
+          </a:prstGeom>
+          <a:noFill/>
+        </p:spPr>
+        <p:txBody>
+          <a:bodyPr wrap="none" rtlCol="0">
+            <a:spAutoFit/>
+          </a:bodyPr>
+          <a:lstStyle>
+            <a:defPPr>
+              <a:defRPr lang="en-US"/>
+            </a:defPPr>
+            <a:lvl1pPr>
+              <a:defRPr sz="1200">
+                <a:solidFill>
+                  <a:schemeClr val="tx1">
+                    <a:lumMod val="65000"/>
+                    <a:lumOff val="35000"/>
+                  </a:schemeClr>
+                </a:solidFill>
+              </a:defRPr>
+            </a:lvl1pPr>
+          </a:lstStyle>
+          <a:p>
+            <a:r>
+              <a:rPr lang="en-US" sz="1000" dirty="0"/>
+              <a:t>Hillslope</a:t>
+            </a:r>
+          </a:p>
+        </p:txBody>
+      </p:sp>
+      <p:sp>
+        <p:nvSpPr>
+          <p:cNvPr id="19" name="TextBox 18">
+            <a:extLst>
+              <a:ext uri="{FF2B5EF4-FFF2-40B4-BE49-F238E27FC236}">
+                <a16:creationId xmlns:a16="http://schemas.microsoft.com/office/drawing/2014/main" id="{93BF9DE1-186E-6826-2B13-752E24BF1F2A}"/>
+              </a:ext>
+            </a:extLst>
+          </p:cNvPr>
+          <p:cNvSpPr txBox="1"/>
+          <p:nvPr/>
+        </p:nvSpPr>
+        <p:spPr>
+          <a:xfrm>
+            <a:off x="2440508" y="4830921"/>
+            <a:ext cx="777777" cy="400110"/>
+          </a:xfrm>
+          <a:prstGeom prst="rect">
+            <a:avLst/>
+          </a:prstGeom>
+          <a:noFill/>
+        </p:spPr>
+        <p:txBody>
+          <a:bodyPr wrap="none" rtlCol="0">
+            <a:spAutoFit/>
+          </a:bodyPr>
+          <a:lstStyle/>
+          <a:p>
+            <a:r>
+              <a:rPr lang="en-US" sz="1000" dirty="0">
+                <a:solidFill>
+                  <a:schemeClr val="tx1">
+                    <a:lumMod val="65000"/>
+                    <a:lumOff val="35000"/>
+                  </a:schemeClr>
+                </a:solidFill>
+              </a:rPr>
+              <a:t>Coniferous </a:t>
+            </a:r>
+          </a:p>
+          <a:p>
+            <a:r>
+              <a:rPr lang="en-US" sz="1000" dirty="0">
+                <a:solidFill>
+                  <a:schemeClr val="tx1">
+                    <a:lumMod val="65000"/>
+                    <a:lumOff val="35000"/>
+                  </a:schemeClr>
+                </a:solidFill>
+              </a:rPr>
+              <a:t>vegetation</a:t>
+            </a:r>
+          </a:p>
+        </p:txBody>
+      </p:sp>
+      <p:sp>
+        <p:nvSpPr>
+          <p:cNvPr id="20" name="Oval 19">
+            <a:extLst>
+              <a:ext uri="{FF2B5EF4-FFF2-40B4-BE49-F238E27FC236}">
+                <a16:creationId xmlns:a16="http://schemas.microsoft.com/office/drawing/2014/main" id="{C8A0FC7D-DC41-4003-B66C-E13876C7F1BC}"/>
+              </a:ext>
+            </a:extLst>
+          </p:cNvPr>
+          <p:cNvSpPr/>
+          <p:nvPr/>
+        </p:nvSpPr>
+        <p:spPr>
+          <a:xfrm>
+            <a:off x="5977921" y="4297158"/>
+            <a:ext cx="173357" cy="190500"/>
+          </a:xfrm>
+          <a:prstGeom prst="ellipse">
+            <a:avLst/>
+          </a:prstGeom>
+          <a:noFill/>
+          <a:ln w="19050">
+            <a:solidFill>
+              <a:schemeClr val="bg2"/>
+            </a:solidFill>
+            <a:prstDash val="sysDash"/>
+          </a:ln>
+        </p:spPr>
+        <p:style>
+          <a:lnRef idx="2">
+            <a:schemeClr val="accent1">
+              <a:shade val="50000"/>
+            </a:schemeClr>
+          </a:lnRef>
+          <a:fillRef idx="1">
+            <a:schemeClr val="accent1"/>
+          </a:fillRef>
+          <a:effectRef idx="0">
+            <a:schemeClr val="accent1"/>
+          </a:effectRef>
+          <a:fontRef idx="minor">
+            <a:schemeClr val="lt1"/>
+          </a:fontRef>
+        </p:style>
+        <p:txBody>
+          <a:bodyPr rtlCol="0" anchor="ctr"/>
+          <a:lstStyle/>
+          <a:p>
+            <a:pPr algn="ctr"/>
+            <a:endParaRPr lang="en-US"/>
+          </a:p>
+        </p:txBody>
+      </p:sp>
+      <p:cxnSp>
+        <p:nvCxnSpPr>
+          <p:cNvPr id="21" name="Straight Connector 20">
+            <a:extLst>
+              <a:ext uri="{FF2B5EF4-FFF2-40B4-BE49-F238E27FC236}">
+                <a16:creationId xmlns:a16="http://schemas.microsoft.com/office/drawing/2014/main" id="{3959AF52-D1AB-86D2-56B5-F63FA4F751EF}"/>
+              </a:ext>
+            </a:extLst>
+          </p:cNvPr>
+          <p:cNvCxnSpPr>
+            <a:cxnSpLocks/>
+            <a:stCxn id="20" idx="1"/>
+            <a:endCxn id="30" idx="0"/>
+          </p:cNvCxnSpPr>
+          <p:nvPr/>
+        </p:nvCxnSpPr>
+        <p:spPr>
+          <a:xfrm flipH="1">
+            <a:off x="3079086" y="4325056"/>
+            <a:ext cx="2924223" cy="1757586"/>
+          </a:xfrm>
+          <a:prstGeom prst="line">
+            <a:avLst/>
+          </a:prstGeom>
+          <a:noFill/>
+          <a:ln w="19050">
+            <a:solidFill>
+              <a:schemeClr val="bg2"/>
+            </a:solidFill>
+            <a:prstDash val="sysDot"/>
+          </a:ln>
+        </p:spPr>
+        <p:style>
+          <a:lnRef idx="2">
+            <a:schemeClr val="accent1">
+              <a:shade val="50000"/>
+            </a:schemeClr>
+          </a:lnRef>
+          <a:fillRef idx="1">
+            <a:schemeClr val="accent1"/>
+          </a:fillRef>
+          <a:effectRef idx="0">
+            <a:schemeClr val="accent1"/>
+          </a:effectRef>
+          <a:fontRef idx="minor">
+            <a:schemeClr val="lt1"/>
+          </a:fontRef>
+        </p:style>
+      </p:cxnSp>
+      <p:cxnSp>
+        <p:nvCxnSpPr>
+          <p:cNvPr id="22" name="Straight Connector 21">
+            <a:extLst>
+              <a:ext uri="{FF2B5EF4-FFF2-40B4-BE49-F238E27FC236}">
+                <a16:creationId xmlns:a16="http://schemas.microsoft.com/office/drawing/2014/main" id="{A8C81E35-C3F1-E3C6-BE93-9258E3BCE497}"/>
+              </a:ext>
+            </a:extLst>
+          </p:cNvPr>
+          <p:cNvCxnSpPr>
+            <a:cxnSpLocks/>
+            <a:stCxn id="30" idx="5"/>
+            <a:endCxn id="20" idx="5"/>
+          </p:cNvCxnSpPr>
+          <p:nvPr/>
+        </p:nvCxnSpPr>
+        <p:spPr>
+          <a:xfrm flipV="1">
+            <a:off x="3473343" y="4459761"/>
+            <a:ext cx="2652547" cy="2566529"/>
+          </a:xfrm>
+          <a:prstGeom prst="line">
+            <a:avLst/>
+          </a:prstGeom>
+          <a:noFill/>
+          <a:ln w="19050">
+            <a:solidFill>
+              <a:schemeClr val="bg2"/>
+            </a:solidFill>
+            <a:prstDash val="sysDot"/>
+          </a:ln>
+        </p:spPr>
+        <p:style>
+          <a:lnRef idx="2">
+            <a:schemeClr val="accent1">
+              <a:shade val="50000"/>
+            </a:schemeClr>
+          </a:lnRef>
+          <a:fillRef idx="1">
+            <a:schemeClr val="accent1"/>
+          </a:fillRef>
+          <a:effectRef idx="0">
+            <a:schemeClr val="accent1"/>
+          </a:effectRef>
+          <a:fontRef idx="minor">
+            <a:schemeClr val="lt1"/>
+          </a:fontRef>
+        </p:style>
+      </p:cxnSp>
+      <p:cxnSp>
+        <p:nvCxnSpPr>
+          <p:cNvPr id="23" name="Connector: Elbow 22">
+            <a:extLst>
+              <a:ext uri="{FF2B5EF4-FFF2-40B4-BE49-F238E27FC236}">
+                <a16:creationId xmlns:a16="http://schemas.microsoft.com/office/drawing/2014/main" id="{F535E3B1-8955-941F-2DBD-45C5800EB62D}"/>
+              </a:ext>
+            </a:extLst>
+          </p:cNvPr>
+          <p:cNvCxnSpPr>
+            <a:stCxn id="19" idx="2"/>
+          </p:cNvCxnSpPr>
+          <p:nvPr/>
+        </p:nvCxnSpPr>
+        <p:spPr>
+          <a:xfrm rot="16200000" flipH="1">
+            <a:off x="2856279" y="5204149"/>
+            <a:ext cx="363221" cy="416984"/>
+          </a:xfrm>
+          <a:prstGeom prst="bentConnector2">
+            <a:avLst/>
+          </a:prstGeom>
+          <a:ln>
+            <a:solidFill>
+              <a:schemeClr val="tx1">
+                <a:lumMod val="50000"/>
+                <a:lumOff val="50000"/>
+              </a:schemeClr>
+            </a:solidFill>
+            <a:tailEnd type="triangle"/>
+          </a:ln>
+        </p:spPr>
+        <p:style>
+          <a:lnRef idx="1">
+            <a:schemeClr val="accent1"/>
+          </a:lnRef>
+          <a:fillRef idx="0">
+            <a:schemeClr val="accent1"/>
+          </a:fillRef>
+          <a:effectRef idx="0">
+            <a:schemeClr val="accent1"/>
+          </a:effectRef>
+          <a:fontRef idx="minor">
+            <a:schemeClr val="tx1"/>
+          </a:fontRef>
+        </p:style>
+      </p:cxnSp>
+      <p:sp>
+        <p:nvSpPr>
+          <p:cNvPr id="24" name="TextBox 23">
+            <a:extLst>
+              <a:ext uri="{FF2B5EF4-FFF2-40B4-BE49-F238E27FC236}">
+                <a16:creationId xmlns:a16="http://schemas.microsoft.com/office/drawing/2014/main" id="{7FDBB80C-DD0D-E677-4D03-0668F8970389}"/>
+              </a:ext>
+            </a:extLst>
+          </p:cNvPr>
+          <p:cNvSpPr txBox="1"/>
+          <p:nvPr/>
+        </p:nvSpPr>
+        <p:spPr>
+          <a:xfrm>
+            <a:off x="4009313" y="6743161"/>
+            <a:ext cx="1526380" cy="400110"/>
+          </a:xfrm>
+          <a:prstGeom prst="rect">
+            <a:avLst/>
+          </a:prstGeom>
+          <a:noFill/>
+        </p:spPr>
+        <p:txBody>
+          <a:bodyPr wrap="none" rtlCol="0">
+            <a:spAutoFit/>
+          </a:bodyPr>
+          <a:lstStyle>
+            <a:defPPr>
+              <a:defRPr lang="en-US"/>
+            </a:defPPr>
+            <a:lvl1pPr>
+              <a:defRPr sz="1200">
+                <a:solidFill>
+                  <a:schemeClr val="tx1">
+                    <a:lumMod val="65000"/>
+                    <a:lumOff val="35000"/>
+                  </a:schemeClr>
+                </a:solidFill>
+              </a:defRPr>
+            </a:lvl1pPr>
+          </a:lstStyle>
+          <a:p>
+            <a:r>
+              <a:rPr lang="en-US" sz="1000" dirty="0"/>
+              <a:t>Mineral Rich-Carbon Poor</a:t>
+            </a:r>
+          </a:p>
+          <a:p>
+            <a:r>
+              <a:rPr lang="en-US" sz="1000" dirty="0"/>
+              <a:t>(e.g., mineral soil)</a:t>
+            </a:r>
+          </a:p>
+        </p:txBody>
+      </p:sp>
+      <p:sp>
+        <p:nvSpPr>
+          <p:cNvPr id="25" name="TextBox 24">
+            <a:extLst>
+              <a:ext uri="{FF2B5EF4-FFF2-40B4-BE49-F238E27FC236}">
+                <a16:creationId xmlns:a16="http://schemas.microsoft.com/office/drawing/2014/main" id="{7A11CA2E-CFC2-FF65-F9F5-D45AAFBAD657}"/>
+              </a:ext>
+            </a:extLst>
+          </p:cNvPr>
+          <p:cNvSpPr txBox="1"/>
+          <p:nvPr/>
+        </p:nvSpPr>
+        <p:spPr>
+          <a:xfrm>
+            <a:off x="4009313" y="6158754"/>
+            <a:ext cx="1526380" cy="400110"/>
+          </a:xfrm>
+          <a:prstGeom prst="rect">
+            <a:avLst/>
+          </a:prstGeom>
+          <a:noFill/>
+        </p:spPr>
+        <p:txBody>
+          <a:bodyPr wrap="none" rtlCol="0">
+            <a:spAutoFit/>
+          </a:bodyPr>
+          <a:lstStyle>
+            <a:defPPr>
+              <a:defRPr lang="en-US"/>
+            </a:defPPr>
+            <a:lvl1pPr>
+              <a:defRPr sz="1200">
+                <a:solidFill>
+                  <a:schemeClr val="tx1">
+                    <a:lumMod val="65000"/>
+                    <a:lumOff val="35000"/>
+                  </a:schemeClr>
+                </a:solidFill>
+              </a:defRPr>
+            </a:lvl1pPr>
+          </a:lstStyle>
+          <a:p>
+            <a:r>
+              <a:rPr lang="en-US" sz="1000" dirty="0"/>
+              <a:t>Carbon Rich-Mineral Poor</a:t>
+            </a:r>
+          </a:p>
+          <a:p>
+            <a:r>
+              <a:rPr lang="en-US" sz="1000" dirty="0"/>
+              <a:t>(e.g., fresh litter inputs)</a:t>
+            </a:r>
+          </a:p>
+        </p:txBody>
+      </p:sp>
+      <p:sp>
+        <p:nvSpPr>
+          <p:cNvPr id="26" name="TextBox 25">
+            <a:extLst>
+              <a:ext uri="{FF2B5EF4-FFF2-40B4-BE49-F238E27FC236}">
+                <a16:creationId xmlns:a16="http://schemas.microsoft.com/office/drawing/2014/main" id="{85FE75A5-38A7-C9BE-C827-99716C5E44D2}"/>
+              </a:ext>
+            </a:extLst>
+          </p:cNvPr>
+          <p:cNvSpPr txBox="1"/>
+          <p:nvPr/>
+        </p:nvSpPr>
+        <p:spPr>
+          <a:xfrm>
+            <a:off x="5790643" y="6118804"/>
+            <a:ext cx="1726755" cy="400110"/>
+          </a:xfrm>
+          <a:prstGeom prst="rect">
+            <a:avLst/>
+          </a:prstGeom>
+          <a:noFill/>
+        </p:spPr>
+        <p:txBody>
+          <a:bodyPr wrap="none" rtlCol="0">
+            <a:spAutoFit/>
+          </a:bodyPr>
+          <a:lstStyle>
+            <a:defPPr>
+              <a:defRPr lang="en-US"/>
+            </a:defPPr>
+            <a:lvl1pPr>
+              <a:defRPr sz="1200">
+                <a:solidFill>
+                  <a:schemeClr val="tx1">
+                    <a:lumMod val="65000"/>
+                    <a:lumOff val="35000"/>
+                  </a:schemeClr>
+                </a:solidFill>
+              </a:defRPr>
+            </a:lvl1pPr>
+          </a:lstStyle>
+          <a:p>
+            <a:r>
+              <a:rPr lang="en-US" sz="1000" dirty="0"/>
+              <a:t>Instream retention structures</a:t>
+            </a:r>
+          </a:p>
+          <a:p>
+            <a:r>
+              <a:rPr lang="en-US" sz="1000" dirty="0"/>
+              <a:t>(e.g., large woody debris)</a:t>
+            </a:r>
+          </a:p>
+        </p:txBody>
+      </p:sp>
+      <p:cxnSp>
+        <p:nvCxnSpPr>
+          <p:cNvPr id="27" name="Straight Arrow Connector 26">
+            <a:extLst>
+              <a:ext uri="{FF2B5EF4-FFF2-40B4-BE49-F238E27FC236}">
+                <a16:creationId xmlns:a16="http://schemas.microsoft.com/office/drawing/2014/main" id="{CB957617-1E6F-0379-99CB-B6D6A25725DD}"/>
+              </a:ext>
+            </a:extLst>
+          </p:cNvPr>
+          <p:cNvCxnSpPr>
+            <a:cxnSpLocks/>
+          </p:cNvCxnSpPr>
+          <p:nvPr/>
+        </p:nvCxnSpPr>
+        <p:spPr>
+          <a:xfrm>
+            <a:off x="6395055" y="4504633"/>
+            <a:ext cx="0" cy="1605426"/>
+          </a:xfrm>
+          <a:prstGeom prst="straightConnector1">
+            <a:avLst/>
+          </a:prstGeom>
+          <a:ln>
+            <a:solidFill>
+              <a:schemeClr val="tx1">
+                <a:lumMod val="50000"/>
+                <a:lumOff val="50000"/>
+              </a:schemeClr>
+            </a:solidFill>
+            <a:tailEnd type="triangle"/>
+          </a:ln>
+        </p:spPr>
+        <p:style>
+          <a:lnRef idx="1">
+            <a:schemeClr val="accent1"/>
+          </a:lnRef>
+          <a:fillRef idx="0">
+            <a:schemeClr val="accent1"/>
+          </a:fillRef>
+          <a:effectRef idx="0">
+            <a:schemeClr val="accent1"/>
+          </a:effectRef>
+          <a:fontRef idx="minor">
+            <a:schemeClr val="tx1"/>
+          </a:fontRef>
+        </p:style>
+      </p:cxnSp>
+      <p:cxnSp>
+        <p:nvCxnSpPr>
+          <p:cNvPr id="31" name="Straight Arrow Connector 30">
+            <a:extLst>
+              <a:ext uri="{FF2B5EF4-FFF2-40B4-BE49-F238E27FC236}">
+                <a16:creationId xmlns:a16="http://schemas.microsoft.com/office/drawing/2014/main" id="{AD3696E5-E9AC-F461-6E88-54EAE5F6B5A7}"/>
+              </a:ext>
+            </a:extLst>
+          </p:cNvPr>
+          <p:cNvCxnSpPr>
+            <a:cxnSpLocks/>
+            <a:endCxn id="25" idx="1"/>
+          </p:cNvCxnSpPr>
+          <p:nvPr/>
+        </p:nvCxnSpPr>
+        <p:spPr>
+          <a:xfrm flipV="1">
+            <a:off x="3292489" y="6358810"/>
+            <a:ext cx="716824" cy="0"/>
+          </a:xfrm>
+          <a:prstGeom prst="straightConnector1">
+            <a:avLst/>
+          </a:prstGeom>
+          <a:ln>
+            <a:solidFill>
+              <a:schemeClr val="tx1">
+                <a:lumMod val="50000"/>
+                <a:lumOff val="50000"/>
+              </a:schemeClr>
+            </a:solidFill>
+            <a:tailEnd type="triangle"/>
+          </a:ln>
+        </p:spPr>
+        <p:style>
+          <a:lnRef idx="1">
+            <a:schemeClr val="accent1"/>
+          </a:lnRef>
+          <a:fillRef idx="0">
+            <a:schemeClr val="accent1"/>
+          </a:fillRef>
+          <a:effectRef idx="0">
+            <a:schemeClr val="accent1"/>
+          </a:effectRef>
+          <a:fontRef idx="minor">
+            <a:schemeClr val="tx1"/>
+          </a:fontRef>
+        </p:style>
+      </p:cxnSp>
+      <p:cxnSp>
+        <p:nvCxnSpPr>
+          <p:cNvPr id="32" name="Straight Arrow Connector 31">
+            <a:extLst>
+              <a:ext uri="{FF2B5EF4-FFF2-40B4-BE49-F238E27FC236}">
+                <a16:creationId xmlns:a16="http://schemas.microsoft.com/office/drawing/2014/main" id="{2F3D2AD8-36DA-8B45-7032-5EF06EDE2C44}"/>
+              </a:ext>
+            </a:extLst>
+          </p:cNvPr>
+          <p:cNvCxnSpPr>
+            <a:cxnSpLocks/>
+          </p:cNvCxnSpPr>
+          <p:nvPr/>
+        </p:nvCxnSpPr>
+        <p:spPr>
+          <a:xfrm>
+            <a:off x="3460726" y="6881661"/>
+            <a:ext cx="548588" cy="0"/>
+          </a:xfrm>
+          <a:prstGeom prst="straightConnector1">
+            <a:avLst/>
+          </a:prstGeom>
+          <a:ln>
+            <a:solidFill>
+              <a:schemeClr val="tx1">
+                <a:lumMod val="50000"/>
+                <a:lumOff val="50000"/>
+              </a:schemeClr>
+            </a:solidFill>
+            <a:tailEnd type="triangle"/>
+          </a:ln>
+        </p:spPr>
+        <p:style>
+          <a:lnRef idx="1">
+            <a:schemeClr val="accent1"/>
+          </a:lnRef>
+          <a:fillRef idx="0">
+            <a:schemeClr val="accent1"/>
+          </a:fillRef>
+          <a:effectRef idx="0">
+            <a:schemeClr val="accent1"/>
+          </a:effectRef>
+          <a:fontRef idx="minor">
+            <a:schemeClr val="tx1"/>
+          </a:fontRef>
+        </p:style>
+      </p:cxnSp>
+      <p:sp>
+        <p:nvSpPr>
+          <p:cNvPr id="33" name="TextBox 32">
+            <a:extLst>
+              <a:ext uri="{FF2B5EF4-FFF2-40B4-BE49-F238E27FC236}">
+                <a16:creationId xmlns:a16="http://schemas.microsoft.com/office/drawing/2014/main" id="{380EB956-D487-DF8D-ADDB-685508BA4A70}"/>
+              </a:ext>
+            </a:extLst>
+          </p:cNvPr>
+          <p:cNvSpPr txBox="1"/>
+          <p:nvPr/>
+        </p:nvSpPr>
+        <p:spPr>
+          <a:xfrm>
+            <a:off x="2474866" y="5682223"/>
+            <a:ext cx="777969" cy="400110"/>
+          </a:xfrm>
+          <a:prstGeom prst="rect">
+            <a:avLst/>
+          </a:prstGeom>
+          <a:noFill/>
+        </p:spPr>
+        <p:txBody>
+          <a:bodyPr wrap="square" rtlCol="0">
+            <a:spAutoFit/>
+          </a:bodyPr>
+          <a:lstStyle>
+            <a:defPPr>
+              <a:defRPr lang="en-US"/>
+            </a:defPPr>
+            <a:lvl1pPr>
+              <a:defRPr sz="1200">
+                <a:solidFill>
+                  <a:schemeClr val="tx1">
+                    <a:lumMod val="65000"/>
+                    <a:lumOff val="35000"/>
+                  </a:schemeClr>
+                </a:solidFill>
+              </a:defRPr>
+            </a:lvl1pPr>
+          </a:lstStyle>
+          <a:p>
+            <a:r>
+              <a:rPr lang="en-US" sz="1000" dirty="0"/>
+              <a:t>Sediment</a:t>
+            </a:r>
+          </a:p>
+          <a:p>
+            <a:r>
+              <a:rPr lang="en-US" sz="1000" dirty="0"/>
+              <a:t>particles</a:t>
+            </a:r>
+          </a:p>
+        </p:txBody>
+      </p:sp>
+      <p:sp>
+        <p:nvSpPr>
+          <p:cNvPr id="34" name="TextBox 33">
+            <a:extLst>
+              <a:ext uri="{FF2B5EF4-FFF2-40B4-BE49-F238E27FC236}">
+                <a16:creationId xmlns:a16="http://schemas.microsoft.com/office/drawing/2014/main" id="{5CF1ADFD-2652-F38A-B684-049206A23558}"/>
+              </a:ext>
+            </a:extLst>
+          </p:cNvPr>
+          <p:cNvSpPr txBox="1"/>
+          <p:nvPr/>
+        </p:nvSpPr>
+        <p:spPr>
+          <a:xfrm>
+            <a:off x="9187684" y="3439185"/>
+            <a:ext cx="723275" cy="246221"/>
+          </a:xfrm>
+          <a:prstGeom prst="rect">
+            <a:avLst/>
+          </a:prstGeom>
+          <a:noFill/>
+        </p:spPr>
+        <p:txBody>
+          <a:bodyPr wrap="none" rtlCol="0">
+            <a:spAutoFit/>
+          </a:bodyPr>
+          <a:lstStyle>
+            <a:defPPr>
+              <a:defRPr lang="en-US"/>
+            </a:defPPr>
+            <a:lvl1pPr>
+              <a:defRPr sz="1200">
+                <a:solidFill>
+                  <a:schemeClr val="tx1">
+                    <a:lumMod val="65000"/>
+                    <a:lumOff val="35000"/>
+                  </a:schemeClr>
+                </a:solidFill>
+              </a:defRPr>
+            </a:lvl1pPr>
+          </a:lstStyle>
+          <a:p>
+            <a:r>
+              <a:rPr lang="en-US" sz="1000" dirty="0"/>
+              <a:t>Total yield</a:t>
+            </a:r>
+          </a:p>
+        </p:txBody>
+      </p:sp>
+      <p:sp>
+        <p:nvSpPr>
+          <p:cNvPr id="35" name="TextBox 34">
+            <a:extLst>
+              <a:ext uri="{FF2B5EF4-FFF2-40B4-BE49-F238E27FC236}">
+                <a16:creationId xmlns:a16="http://schemas.microsoft.com/office/drawing/2014/main" id="{9E601A77-AB14-48C5-AE47-9C8CD3EA96CA}"/>
+              </a:ext>
+            </a:extLst>
+          </p:cNvPr>
+          <p:cNvSpPr txBox="1"/>
+          <p:nvPr/>
+        </p:nvSpPr>
+        <p:spPr>
+          <a:xfrm>
+            <a:off x="8682376" y="5452184"/>
+            <a:ext cx="1317990" cy="400110"/>
+          </a:xfrm>
+          <a:prstGeom prst="rect">
+            <a:avLst/>
+          </a:prstGeom>
+          <a:noFill/>
+        </p:spPr>
+        <p:txBody>
+          <a:bodyPr wrap="none" rtlCol="0">
+            <a:spAutoFit/>
+          </a:bodyPr>
+          <a:lstStyle>
+            <a:defPPr>
+              <a:defRPr lang="en-US"/>
+            </a:defPPr>
+            <a:lvl1pPr>
+              <a:defRPr sz="1200">
+                <a:solidFill>
+                  <a:schemeClr val="tx1">
+                    <a:lumMod val="65000"/>
+                    <a:lumOff val="35000"/>
+                  </a:schemeClr>
+                </a:solidFill>
+              </a:defRPr>
+            </a:lvl1pPr>
+          </a:lstStyle>
+          <a:p>
+            <a:r>
+              <a:rPr lang="en-US" sz="1000" dirty="0"/>
+              <a:t>Carbon-poor particles</a:t>
+            </a:r>
+          </a:p>
+          <a:p>
+            <a:r>
+              <a:rPr lang="en-US" sz="1000" dirty="0"/>
+              <a:t> at high POC yields</a:t>
+            </a:r>
+          </a:p>
+        </p:txBody>
+      </p:sp>
+      <p:cxnSp>
+        <p:nvCxnSpPr>
+          <p:cNvPr id="36" name="Connector: Elbow 35">
+            <a:extLst>
+              <a:ext uri="{FF2B5EF4-FFF2-40B4-BE49-F238E27FC236}">
+                <a16:creationId xmlns:a16="http://schemas.microsoft.com/office/drawing/2014/main" id="{1A14D13C-D08D-0DE2-0394-DE659F4AD8BB}"/>
+              </a:ext>
+            </a:extLst>
+          </p:cNvPr>
+          <p:cNvCxnSpPr>
+            <a:cxnSpLocks/>
+            <a:endCxn id="34" idx="1"/>
+          </p:cNvCxnSpPr>
+          <p:nvPr/>
+        </p:nvCxnSpPr>
+        <p:spPr>
+          <a:xfrm rot="5400000" flipH="1" flipV="1">
+            <a:off x="9040203" y="3627003"/>
+            <a:ext cx="212189" cy="82774"/>
+          </a:xfrm>
+          <a:prstGeom prst="bentConnector2">
+            <a:avLst/>
+          </a:prstGeom>
+          <a:ln>
+            <a:solidFill>
+              <a:schemeClr val="bg1">
+                <a:lumMod val="65000"/>
+              </a:schemeClr>
+            </a:solidFill>
+          </a:ln>
+        </p:spPr>
+        <p:style>
+          <a:lnRef idx="1">
+            <a:schemeClr val="accent1"/>
+          </a:lnRef>
+          <a:fillRef idx="0">
+            <a:schemeClr val="accent1"/>
+          </a:fillRef>
+          <a:effectRef idx="0">
+            <a:schemeClr val="accent1"/>
+          </a:effectRef>
+          <a:fontRef idx="minor">
+            <a:schemeClr val="tx1"/>
+          </a:fontRef>
+        </p:style>
+      </p:cxnSp>
+      <p:cxnSp>
+        <p:nvCxnSpPr>
+          <p:cNvPr id="37" name="Connector: Elbow 36">
+            <a:extLst>
+              <a:ext uri="{FF2B5EF4-FFF2-40B4-BE49-F238E27FC236}">
+                <a16:creationId xmlns:a16="http://schemas.microsoft.com/office/drawing/2014/main" id="{6F2D6D2F-EE21-DF00-BD30-F58EC6B8F0FF}"/>
+              </a:ext>
+            </a:extLst>
+          </p:cNvPr>
+          <p:cNvCxnSpPr>
+            <a:cxnSpLocks/>
+            <a:endCxn id="35" idx="1"/>
+          </p:cNvCxnSpPr>
+          <p:nvPr/>
+        </p:nvCxnSpPr>
+        <p:spPr>
+          <a:xfrm rot="16200000" flipH="1">
+            <a:off x="8275711" y="5245574"/>
+            <a:ext cx="607226" cy="206104"/>
+          </a:xfrm>
+          <a:prstGeom prst="bentConnector2">
+            <a:avLst/>
+          </a:prstGeom>
+          <a:ln>
+            <a:solidFill>
+              <a:schemeClr val="bg1">
+                <a:lumMod val="65000"/>
+              </a:schemeClr>
+            </a:solidFill>
+          </a:ln>
+        </p:spPr>
+        <p:style>
+          <a:lnRef idx="1">
+            <a:schemeClr val="accent1"/>
+          </a:lnRef>
+          <a:fillRef idx="0">
+            <a:schemeClr val="accent1"/>
+          </a:fillRef>
+          <a:effectRef idx="0">
+            <a:schemeClr val="accent1"/>
+          </a:effectRef>
+          <a:fontRef idx="minor">
+            <a:schemeClr val="tx1"/>
+          </a:fontRef>
+        </p:style>
+      </p:cxnSp>
+      <p:sp>
+        <p:nvSpPr>
+          <p:cNvPr id="38" name="Left Brace 37">
+            <a:extLst>
+              <a:ext uri="{FF2B5EF4-FFF2-40B4-BE49-F238E27FC236}">
+                <a16:creationId xmlns:a16="http://schemas.microsoft.com/office/drawing/2014/main" id="{0A3258F4-986D-9BD3-8470-C4EDE31472AA}"/>
+              </a:ext>
+            </a:extLst>
+          </p:cNvPr>
+          <p:cNvSpPr/>
+          <p:nvPr/>
+        </p:nvSpPr>
+        <p:spPr>
+          <a:xfrm>
+            <a:off x="3199528" y="4169806"/>
+            <a:ext cx="140117" cy="516299"/>
+          </a:xfrm>
+          <a:prstGeom prst="leftBrace">
+            <a:avLst/>
+          </a:prstGeom>
+          <a:ln>
+            <a:solidFill>
+              <a:schemeClr val="tx1">
+                <a:lumMod val="50000"/>
+                <a:lumOff val="50000"/>
+              </a:schemeClr>
+            </a:solidFill>
+          </a:ln>
+        </p:spPr>
+        <p:style>
+          <a:lnRef idx="1">
+            <a:schemeClr val="accent1"/>
+          </a:lnRef>
+          <a:fillRef idx="0">
+            <a:schemeClr val="accent1"/>
+          </a:fillRef>
+          <a:effectRef idx="0">
+            <a:schemeClr val="accent1"/>
+          </a:effectRef>
+          <a:fontRef idx="minor">
+            <a:schemeClr val="tx1"/>
+          </a:fontRef>
+        </p:style>
+        <p:txBody>
+          <a:bodyPr rtlCol="0" anchor="ctr"/>
+          <a:lstStyle/>
+          <a:p>
+            <a:pPr algn="ctr"/>
+            <a:endParaRPr lang="en-US"/>
+          </a:p>
+        </p:txBody>
+      </p:sp>
+      <p:sp>
+        <p:nvSpPr>
+          <p:cNvPr id="39" name="TextBox 38">
+            <a:extLst>
+              <a:ext uri="{FF2B5EF4-FFF2-40B4-BE49-F238E27FC236}">
+                <a16:creationId xmlns:a16="http://schemas.microsoft.com/office/drawing/2014/main" id="{E5ADF177-1292-4FAB-5C6E-F727A3329830}"/>
+              </a:ext>
+            </a:extLst>
+          </p:cNvPr>
+          <p:cNvSpPr txBox="1"/>
+          <p:nvPr/>
+        </p:nvSpPr>
+        <p:spPr>
+          <a:xfrm>
+            <a:off x="9158028" y="4704118"/>
+            <a:ext cx="593432" cy="400110"/>
+          </a:xfrm>
+          <a:prstGeom prst="rect">
+            <a:avLst/>
+          </a:prstGeom>
+          <a:noFill/>
+        </p:spPr>
+        <p:txBody>
+          <a:bodyPr wrap="none" rtlCol="0">
+            <a:spAutoFit/>
+          </a:bodyPr>
+          <a:lstStyle>
+            <a:defPPr>
+              <a:defRPr lang="en-US"/>
+            </a:defPPr>
+            <a:lvl1pPr>
+              <a:defRPr sz="1200">
+                <a:solidFill>
+                  <a:schemeClr val="tx1">
+                    <a:lumMod val="65000"/>
+                    <a:lumOff val="35000"/>
+                  </a:schemeClr>
+                </a:solidFill>
+              </a:defRPr>
+            </a:lvl1pPr>
+          </a:lstStyle>
+          <a:p>
+            <a:pPr algn="ctr"/>
+            <a:r>
+              <a:rPr lang="en-US" sz="1000" dirty="0"/>
+              <a:t>Mixed </a:t>
+            </a:r>
+          </a:p>
+          <a:p>
+            <a:pPr algn="ctr"/>
+            <a:r>
+              <a:rPr lang="en-US" sz="1000" dirty="0"/>
+              <a:t>detritus</a:t>
+            </a:r>
+          </a:p>
+        </p:txBody>
+      </p:sp>
+      <p:cxnSp>
+        <p:nvCxnSpPr>
+          <p:cNvPr id="40" name="Connector: Elbow 39">
+            <a:extLst>
+              <a:ext uri="{FF2B5EF4-FFF2-40B4-BE49-F238E27FC236}">
+                <a16:creationId xmlns:a16="http://schemas.microsoft.com/office/drawing/2014/main" id="{B102D83D-4751-851D-6EBC-E32284EE2D63}"/>
+              </a:ext>
+            </a:extLst>
+          </p:cNvPr>
+          <p:cNvCxnSpPr>
+            <a:cxnSpLocks/>
+            <a:stCxn id="11" idx="4"/>
+            <a:endCxn id="39" idx="1"/>
+          </p:cNvCxnSpPr>
+          <p:nvPr/>
+        </p:nvCxnSpPr>
+        <p:spPr>
+          <a:xfrm rot="16200000" flipH="1">
+            <a:off x="8670140" y="4416284"/>
+            <a:ext cx="401217" cy="574561"/>
+          </a:xfrm>
+          <a:prstGeom prst="bentConnector2">
+            <a:avLst/>
+          </a:prstGeom>
+          <a:ln>
+            <a:solidFill>
+              <a:schemeClr val="bg1">
+                <a:lumMod val="65000"/>
+              </a:schemeClr>
+            </a:solidFill>
+          </a:ln>
+        </p:spPr>
+        <p:style>
+          <a:lnRef idx="1">
+            <a:schemeClr val="accent1"/>
+          </a:lnRef>
+          <a:fillRef idx="0">
+            <a:schemeClr val="accent1"/>
+          </a:fillRef>
+          <a:effectRef idx="0">
+            <a:schemeClr val="accent1"/>
+          </a:effectRef>
+          <a:fontRef idx="minor">
+            <a:schemeClr val="tx1"/>
+          </a:fontRef>
+        </p:style>
+      </p:cxnSp>
+      <p:sp>
+        <p:nvSpPr>
+          <p:cNvPr id="45" name="TextBox 44">
+            <a:extLst>
+              <a:ext uri="{FF2B5EF4-FFF2-40B4-BE49-F238E27FC236}">
+                <a16:creationId xmlns:a16="http://schemas.microsoft.com/office/drawing/2014/main" id="{C7A22C0A-175B-CE74-C831-81066E48E842}"/>
+              </a:ext>
+            </a:extLst>
+          </p:cNvPr>
+          <p:cNvSpPr txBox="1"/>
+          <p:nvPr/>
+        </p:nvSpPr>
+        <p:spPr>
+          <a:xfrm>
+            <a:off x="8716019" y="2961199"/>
+            <a:ext cx="1266693" cy="400110"/>
+          </a:xfrm>
+          <a:prstGeom prst="rect">
+            <a:avLst/>
+          </a:prstGeom>
+          <a:noFill/>
+        </p:spPr>
+        <p:txBody>
+          <a:bodyPr wrap="none" rtlCol="0">
+            <a:spAutoFit/>
+          </a:bodyPr>
+          <a:lstStyle>
+            <a:defPPr>
+              <a:defRPr lang="en-US"/>
+            </a:defPPr>
+            <a:lvl1pPr>
+              <a:defRPr sz="1200">
+                <a:solidFill>
+                  <a:schemeClr val="tx1">
+                    <a:lumMod val="65000"/>
+                    <a:lumOff val="35000"/>
+                  </a:schemeClr>
+                </a:solidFill>
+              </a:defRPr>
+            </a:lvl1pPr>
+          </a:lstStyle>
+          <a:p>
+            <a:r>
+              <a:rPr lang="en-US" sz="1000" dirty="0"/>
+              <a:t>Carbon-rich particles</a:t>
+            </a:r>
+          </a:p>
+          <a:p>
+            <a:r>
+              <a:rPr lang="en-US" sz="1000" dirty="0"/>
+              <a:t>at low POC yields</a:t>
+            </a:r>
+          </a:p>
+        </p:txBody>
+      </p:sp>
+      <p:cxnSp>
+        <p:nvCxnSpPr>
+          <p:cNvPr id="46" name="Connector: Elbow 45">
+            <a:extLst>
+              <a:ext uri="{FF2B5EF4-FFF2-40B4-BE49-F238E27FC236}">
+                <a16:creationId xmlns:a16="http://schemas.microsoft.com/office/drawing/2014/main" id="{E07E687E-2619-CEC6-3374-9B3C90D43DE7}"/>
+              </a:ext>
+            </a:extLst>
+          </p:cNvPr>
+          <p:cNvCxnSpPr>
+            <a:cxnSpLocks/>
+            <a:endCxn id="45" idx="1"/>
+          </p:cNvCxnSpPr>
+          <p:nvPr/>
+        </p:nvCxnSpPr>
+        <p:spPr>
+          <a:xfrm rot="5400000" flipH="1" flipV="1">
+            <a:off x="8425972" y="3272248"/>
+            <a:ext cx="401040" cy="179052"/>
+          </a:xfrm>
+          <a:prstGeom prst="bentConnector2">
+            <a:avLst/>
+          </a:prstGeom>
+          <a:ln>
+            <a:solidFill>
+              <a:schemeClr val="bg1">
+                <a:lumMod val="50000"/>
+              </a:schemeClr>
+            </a:solidFill>
+          </a:ln>
+        </p:spPr>
+        <p:style>
+          <a:lnRef idx="1">
+            <a:schemeClr val="accent1"/>
+          </a:lnRef>
+          <a:fillRef idx="0">
+            <a:schemeClr val="accent1"/>
+          </a:fillRef>
+          <a:effectRef idx="0">
+            <a:schemeClr val="accent1"/>
+          </a:effectRef>
+          <a:fontRef idx="minor">
+            <a:schemeClr val="tx1"/>
+          </a:fontRef>
+        </p:style>
+      </p:cxnSp>
+      <p:sp>
+        <p:nvSpPr>
+          <p:cNvPr id="55" name="Freeform: Shape 54">
+            <a:extLst>
+              <a:ext uri="{FF2B5EF4-FFF2-40B4-BE49-F238E27FC236}">
+                <a16:creationId xmlns:a16="http://schemas.microsoft.com/office/drawing/2014/main" id="{A0A4145B-4A05-7C3A-1ED3-41D1E7EF8D7E}"/>
+              </a:ext>
+            </a:extLst>
+          </p:cNvPr>
+          <p:cNvSpPr/>
+          <p:nvPr/>
+        </p:nvSpPr>
+        <p:spPr>
+          <a:xfrm rot="5400000">
+            <a:off x="7629942" y="3772385"/>
+            <a:ext cx="2457346" cy="914707"/>
+          </a:xfrm>
+          <a:custGeom>
+            <a:avLst/>
+            <a:gdLst>
+              <a:gd name="connsiteX0" fmla="*/ 0 w 2457346"/>
+              <a:gd name="connsiteY0" fmla="*/ 907518 h 914707"/>
+              <a:gd name="connsiteX1" fmla="*/ 108247 w 2457346"/>
+              <a:gd name="connsiteY1" fmla="*/ 898683 h 914707"/>
+              <a:gd name="connsiteX2" fmla="*/ 196820 w 2457346"/>
+              <a:gd name="connsiteY2" fmla="*/ 882354 h 914707"/>
+              <a:gd name="connsiteX3" fmla="*/ 397509 w 2457346"/>
+              <a:gd name="connsiteY3" fmla="*/ 775459 h 914707"/>
+              <a:gd name="connsiteX4" fmla="*/ 815666 w 2457346"/>
+              <a:gd name="connsiteY4" fmla="*/ 212412 h 914707"/>
+              <a:gd name="connsiteX5" fmla="*/ 897983 w 2457346"/>
+              <a:gd name="connsiteY5" fmla="*/ 160477 h 914707"/>
+              <a:gd name="connsiteX6" fmla="*/ 907284 w 2457346"/>
+              <a:gd name="connsiteY6" fmla="*/ 157332 h 914707"/>
+              <a:gd name="connsiteX7" fmla="*/ 923989 w 2457346"/>
+              <a:gd name="connsiteY7" fmla="*/ 135951 h 914707"/>
+              <a:gd name="connsiteX8" fmla="*/ 980456 w 2457346"/>
+              <a:gd name="connsiteY8" fmla="*/ 80889 h 914707"/>
+              <a:gd name="connsiteX9" fmla="*/ 1346576 w 2457346"/>
+              <a:gd name="connsiteY9" fmla="*/ 80889 h 914707"/>
+              <a:gd name="connsiteX10" fmla="*/ 1805777 w 2457346"/>
+              <a:gd name="connsiteY10" fmla="*/ 706252 h 914707"/>
+              <a:gd name="connsiteX11" fmla="*/ 2457346 w 2457346"/>
+              <a:gd name="connsiteY11" fmla="*/ 914706 h 914707"/>
+              <a:gd name="connsiteX12" fmla="*/ 2036673 w 2457346"/>
+              <a:gd name="connsiteY12" fmla="*/ 913476 h 914707"/>
+              <a:gd name="connsiteX13" fmla="*/ 2044325 w 2457346"/>
+              <a:gd name="connsiteY13" fmla="*/ 914707 h 914707"/>
+              <a:gd name="connsiteX14" fmla="*/ 870371 w 2457346"/>
+              <a:gd name="connsiteY14" fmla="*/ 911231 h 914707"/>
+              <a:gd name="connsiteX15" fmla="*/ 1 w 2457346"/>
+              <a:gd name="connsiteY15" fmla="*/ 909984 h 914707"/>
+              <a:gd name="connsiteX16" fmla="*/ 31014 w 2457346"/>
+              <a:gd name="connsiteY16" fmla="*/ 908745 h 914707"/>
+              <a:gd name="connsiteX17" fmla="*/ 2 w 2457346"/>
+              <a:gd name="connsiteY17" fmla="*/ 908653 h 914707"/>
+              <a:gd name="connsiteX18" fmla="*/ 13267 w 2457346"/>
+              <a:gd name="connsiteY18" fmla="*/ 907557 h 914707"/>
+            </a:gdLst>
+            <a:ahLst/>
+            <a:cxnLst>
+              <a:cxn ang="0">
+                <a:pos x="connsiteX0" y="connsiteY0"/>
+              </a:cxn>
+              <a:cxn ang="0">
+                <a:pos x="connsiteX1" y="connsiteY1"/>
+              </a:cxn>
+              <a:cxn ang="0">
+                <a:pos x="connsiteX2" y="connsiteY2"/>
+              </a:cxn>
+              <a:cxn ang="0">
+                <a:pos x="connsiteX3" y="connsiteY3"/>
+              </a:cxn>
+              <a:cxn ang="0">
+                <a:pos x="connsiteX4" y="connsiteY4"/>
+              </a:cxn>
+              <a:cxn ang="0">
+                <a:pos x="connsiteX5" y="connsiteY5"/>
+              </a:cxn>
+              <a:cxn ang="0">
+                <a:pos x="connsiteX6" y="connsiteY6"/>
+              </a:cxn>
+              <a:cxn ang="0">
+                <a:pos x="connsiteX7" y="connsiteY7"/>
+              </a:cxn>
+              <a:cxn ang="0">
+                <a:pos x="connsiteX8" y="connsiteY8"/>
+              </a:cxn>
+              <a:cxn ang="0">
+                <a:pos x="connsiteX9" y="connsiteY9"/>
+              </a:cxn>
+              <a:cxn ang="0">
+                <a:pos x="connsiteX10" y="connsiteY10"/>
+              </a:cxn>
+              <a:cxn ang="0">
+                <a:pos x="connsiteX11" y="connsiteY11"/>
+              </a:cxn>
+              <a:cxn ang="0">
+                <a:pos x="connsiteX12" y="connsiteY12"/>
+              </a:cxn>
+              <a:cxn ang="0">
+                <a:pos x="connsiteX13" y="connsiteY13"/>
+              </a:cxn>
+              <a:cxn ang="0">
+                <a:pos x="connsiteX14" y="connsiteY14"/>
+              </a:cxn>
+              <a:cxn ang="0">
+                <a:pos x="connsiteX15" y="connsiteY15"/>
+              </a:cxn>
+              <a:cxn ang="0">
+                <a:pos x="connsiteX16" y="connsiteY16"/>
+              </a:cxn>
+              <a:cxn ang="0">
+                <a:pos x="connsiteX17" y="connsiteY17"/>
+              </a:cxn>
+              <a:cxn ang="0">
+                <a:pos x="connsiteX18" y="connsiteY18"/>
+              </a:cxn>
+            </a:cxnLst>
+            <a:rect l="l" t="t" r="r" b="b"/>
+            <a:pathLst>
+              <a:path w="2457346" h="914707">
+                <a:moveTo>
+                  <a:pt x="0" y="907518"/>
+                </a:moveTo>
+                <a:lnTo>
+                  <a:pt x="108247" y="898683"/>
+                </a:lnTo>
+                <a:lnTo>
+                  <a:pt x="196820" y="882354"/>
+                </a:lnTo>
+                <a:cubicBezTo>
+                  <a:pt x="262856" y="864633"/>
+                  <a:pt x="329537" y="833479"/>
+                  <a:pt x="397509" y="775459"/>
+                </a:cubicBezTo>
+                <a:cubicBezTo>
+                  <a:pt x="533453" y="659419"/>
+                  <a:pt x="695210" y="306253"/>
+                  <a:pt x="815666" y="212412"/>
+                </a:cubicBezTo>
+                <a:cubicBezTo>
+                  <a:pt x="845781" y="188951"/>
+                  <a:pt x="872722" y="171734"/>
+                  <a:pt x="897983" y="160477"/>
+                </a:cubicBezTo>
+                <a:lnTo>
+                  <a:pt x="907284" y="157332"/>
+                </a:lnTo>
+                <a:lnTo>
+                  <a:pt x="923989" y="135951"/>
+                </a:lnTo>
+                <a:cubicBezTo>
+                  <a:pt x="943482" y="113553"/>
+                  <a:pt x="962357" y="94816"/>
+                  <a:pt x="980456" y="80889"/>
+                </a:cubicBezTo>
+                <a:cubicBezTo>
+                  <a:pt x="1125250" y="-30528"/>
+                  <a:pt x="1209023" y="-23339"/>
+                  <a:pt x="1346576" y="80889"/>
+                </a:cubicBezTo>
+                <a:cubicBezTo>
+                  <a:pt x="1484130" y="185115"/>
+                  <a:pt x="1620649" y="567282"/>
+                  <a:pt x="1805777" y="706252"/>
+                </a:cubicBezTo>
+                <a:cubicBezTo>
+                  <a:pt x="1990906" y="845221"/>
+                  <a:pt x="2224126" y="879963"/>
+                  <a:pt x="2457346" y="914706"/>
+                </a:cubicBezTo>
+                <a:lnTo>
+                  <a:pt x="2036673" y="913476"/>
+                </a:lnTo>
+                <a:lnTo>
+                  <a:pt x="2044325" y="914707"/>
+                </a:lnTo>
+                <a:lnTo>
+                  <a:pt x="870371" y="911231"/>
+                </a:lnTo>
+                <a:lnTo>
+                  <a:pt x="1" y="909984"/>
+                </a:lnTo>
+                <a:lnTo>
+                  <a:pt x="31014" y="908745"/>
+                </a:lnTo>
+                <a:lnTo>
+                  <a:pt x="2" y="908653"/>
+                </a:lnTo>
+                <a:lnTo>
+                  <a:pt x="13267" y="907557"/>
+                </a:lnTo>
+                <a:close/>
+              </a:path>
+            </a:pathLst>
+          </a:custGeom>
+          <a:noFill/>
+          <a:ln>
+            <a:solidFill>
+              <a:schemeClr val="tx1">
+                <a:lumMod val="75000"/>
+                <a:lumOff val="25000"/>
+              </a:schemeClr>
+            </a:solidFill>
+          </a:ln>
+        </p:spPr>
+        <p:style>
+          <a:lnRef idx="2">
+            <a:schemeClr val="accent1">
+              <a:shade val="50000"/>
+            </a:schemeClr>
+          </a:lnRef>
+          <a:fillRef idx="1">
+            <a:schemeClr val="accent1"/>
+          </a:fillRef>
+          <a:effectRef idx="0">
+            <a:schemeClr val="accent1"/>
+          </a:effectRef>
+          <a:fontRef idx="minor">
+            <a:schemeClr val="lt1"/>
+          </a:fontRef>
+        </p:style>
+        <p:txBody>
+          <a:bodyPr wrap="square" rtlCol="0" anchor="ctr">
+            <a:noAutofit/>
+          </a:bodyPr>
+          <a:lstStyle/>
+          <a:p>
+            <a:pPr algn="ctr"/>
+            <a:endParaRPr lang="en-US"/>
+          </a:p>
+        </p:txBody>
+      </p:sp>
+      <p:sp>
+        <p:nvSpPr>
+          <p:cNvPr id="61" name="TextBox 60">
+            <a:extLst>
+              <a:ext uri="{FF2B5EF4-FFF2-40B4-BE49-F238E27FC236}">
+                <a16:creationId xmlns:a16="http://schemas.microsoft.com/office/drawing/2014/main" id="{71CFDFE8-3C1E-BCC7-A3AD-2D9065F57D59}"/>
+              </a:ext>
+            </a:extLst>
+          </p:cNvPr>
+          <p:cNvSpPr txBox="1"/>
+          <p:nvPr/>
+        </p:nvSpPr>
+        <p:spPr>
+          <a:xfrm>
+            <a:off x="2521521" y="1752289"/>
+            <a:ext cx="7508775" cy="923330"/>
+          </a:xfrm>
+          <a:prstGeom prst="rect">
+            <a:avLst/>
+          </a:prstGeom>
+          <a:noFill/>
+        </p:spPr>
+        <p:txBody>
+          <a:bodyPr wrap="square">
+            <a:spAutoFit/>
+          </a:bodyPr>
+          <a:lstStyle/>
+          <a:p>
+            <a:r>
+              <a:rPr lang="en-GB" b="1" dirty="0">
+                <a:solidFill>
+                  <a:schemeClr val="tx1">
+                    <a:lumMod val="50000"/>
+                    <a:lumOff val="50000"/>
+                  </a:schemeClr>
+                </a:solidFill>
+                <a:latin typeface="Arial Narrow" panose="020B0606020202030204" pitchFamily="34" charset="0"/>
+              </a:rPr>
+              <a:t>A 30-year record of </a:t>
+            </a:r>
+            <a:r>
+              <a:rPr lang="en-GB" b="1" dirty="0" err="1">
+                <a:solidFill>
+                  <a:schemeClr val="tx1">
+                    <a:lumMod val="50000"/>
+                    <a:lumOff val="50000"/>
+                  </a:schemeClr>
+                </a:solidFill>
+                <a:latin typeface="Arial Narrow" panose="020B0606020202030204" pitchFamily="34" charset="0"/>
+              </a:rPr>
+              <a:t>Biospheric</a:t>
+            </a:r>
+            <a:r>
+              <a:rPr lang="en-GB" b="1" dirty="0">
+                <a:solidFill>
+                  <a:schemeClr val="tx1">
+                    <a:lumMod val="50000"/>
+                    <a:lumOff val="50000"/>
+                  </a:schemeClr>
+                </a:solidFill>
+                <a:latin typeface="Arial Narrow" panose="020B0606020202030204" pitchFamily="34" charset="0"/>
+              </a:rPr>
+              <a:t> Particulate Organic Carbon Export from Two Small Forested Catchments with Contrasting Landscape Organization and Disturbance History</a:t>
+            </a:r>
+            <a:endParaRPr lang="en-US" b="1" dirty="0">
+              <a:solidFill>
+                <a:schemeClr val="tx1">
+                  <a:lumMod val="50000"/>
+                  <a:lumOff val="50000"/>
+                </a:schemeClr>
+              </a:solidFill>
+              <a:latin typeface="Arial Narrow" panose="020B0606020202030204" pitchFamily="34" charset="0"/>
+            </a:endParaRPr>
+          </a:p>
+        </p:txBody>
+      </p:sp>
+    </p:spTree>
+    <p:extLst>
+      <p:ext uri="{BB962C8B-B14F-4D97-AF65-F5344CB8AC3E}">
+        <p14:creationId xmlns:p14="http://schemas.microsoft.com/office/powerpoint/2010/main" val="827905779"/>
+      </p:ext>
+    </p:extLst>
+  </p:cSld>
+  <p:clrMapOvr>
+    <a:masterClrMapping/>
+  </p:clrMapOvr>
+</p:sld>
+</file>
+
 <file path=ppt/theme/theme1.xml><?xml version="1.0" encoding="utf-8"?>
 <a:theme xmlns:a="http://schemas.openxmlformats.org/drawingml/2006/main" name="Office Theme">
   <a:themeElements>

</xml_diff>